<commit_message>
Add notes to AGREE event semantics
</commit_message>
<xml_diff>
--- a/TA2/AGREE_event_ports/agree_event_semantics.pptx
+++ b/TA2/AGREE_event_ports/agree_event_semantics.pptx
@@ -116,6 +116,11 @@
       </a:defRPr>
     </a:lvl9pPr>
   </p:defaultTextStyle>
+  <p:extLst>
+    <p:ext uri="{EFAFB233-063F-42B5-8137-9DF3F51BA10A}">
+      <p15:sldGuideLst xmlns:p15="http://schemas.microsoft.com/office/powerpoint/2012/main"/>
+    </p:ext>
+  </p:extLst>
 </p:presentation>
 </file>
 
@@ -469,6 +474,118 @@
 </file>
 
 <file path=ppt/notesSlides/notesSlide1.xml><?xml version="1.0" encoding="utf-8"?>
+<p:notes xmlns:a="http://schemas.openxmlformats.org/drawingml/2006/main" xmlns:r="http://schemas.openxmlformats.org/officeDocument/2006/relationships" xmlns:p="http://schemas.openxmlformats.org/presentationml/2006/main">
+  <p:cSld>
+    <p:spTree>
+      <p:nvGrpSpPr>
+        <p:cNvPr id="1" name=""/>
+        <p:cNvGrpSpPr/>
+        <p:nvPr/>
+      </p:nvGrpSpPr>
+      <p:grpSpPr>
+        <a:xfrm>
+          <a:off x="0" y="0"/>
+          <a:ext cx="0" cy="0"/>
+          <a:chOff x="0" y="0"/>
+          <a:chExt cx="0" cy="0"/>
+        </a:xfrm>
+      </p:grpSpPr>
+      <p:sp>
+        <p:nvSpPr>
+          <p:cNvPr id="2" name="Slide Image Placeholder 1"/>
+          <p:cNvSpPr>
+            <a:spLocks noGrp="1" noRot="1" noChangeAspect="1"/>
+          </p:cNvSpPr>
+          <p:nvPr>
+            <p:ph type="sldImg"/>
+          </p:nvPr>
+        </p:nvSpPr>
+        <p:spPr/>
+      </p:sp>
+      <p:sp>
+        <p:nvSpPr>
+          <p:cNvPr id="3" name="Notes Placeholder 2"/>
+          <p:cNvSpPr>
+            <a:spLocks noGrp="1"/>
+          </p:cNvSpPr>
+          <p:nvPr>
+            <p:ph type="body" idx="1"/>
+          </p:nvPr>
+        </p:nvSpPr>
+        <p:spPr/>
+        <p:txBody>
+          <a:bodyPr/>
+          <a:lstStyle/>
+          <a:p>
+            <a:pPr marL="171450" indent="-171450">
+              <a:buFont typeface="Arial" panose="020B0604020202020204" pitchFamily="34" charset="0"/>
+              <a:buChar char="•"/>
+            </a:pPr>
+            <a:r>
+              <a:rPr lang="en-US" dirty="0"/>
+              <a:t>event_out1(…) is a </a:t>
+            </a:r>
+            <a:r>
+              <a:rPr lang="en-US" dirty="0" err="1"/>
+              <a:t>fuction</a:t>
+            </a:r>
+            <a:r>
+              <a:rPr lang="en-US" dirty="0"/>
+              <a:t> defined over input and output values that determine when the output should fire.</a:t>
+            </a:r>
+          </a:p>
+          <a:p>
+            <a:pPr marL="171450" indent="-171450">
+              <a:buFont typeface="Arial" panose="020B0604020202020204" pitchFamily="34" charset="0"/>
+              <a:buChar char="•"/>
+            </a:pPr>
+            <a:r>
+              <a:rPr lang="en-US" dirty="0"/>
+              <a:t>Constraint_out1(…) is a function defined over input and output values that determine what the output should look at the time the output event fires.</a:t>
+            </a:r>
+          </a:p>
+          <a:p>
+            <a:endParaRPr lang="en-US" dirty="0"/>
+          </a:p>
+        </p:txBody>
+      </p:sp>
+      <p:sp>
+        <p:nvSpPr>
+          <p:cNvPr id="4" name="Slide Number Placeholder 3"/>
+          <p:cNvSpPr>
+            <a:spLocks noGrp="1"/>
+          </p:cNvSpPr>
+          <p:nvPr>
+            <p:ph type="sldNum" sz="quarter" idx="5"/>
+          </p:nvPr>
+        </p:nvSpPr>
+        <p:spPr/>
+        <p:txBody>
+          <a:bodyPr/>
+          <a:lstStyle/>
+          <a:p>
+            <a:fld id="{B222266E-AA87-A247-8974-081C5A3E2A21}" type="slidenum">
+              <a:rPr lang="en-US" smtClean="0"/>
+              <a:t>5</a:t>
+            </a:fld>
+            <a:endParaRPr lang="en-US"/>
+          </a:p>
+        </p:txBody>
+      </p:sp>
+    </p:spTree>
+    <p:extLst>
+      <p:ext uri="{BB962C8B-B14F-4D97-AF65-F5344CB8AC3E}">
+        <p14:creationId xmlns:p14="http://schemas.microsoft.com/office/powerpoint/2010/main" val="668153425"/>
+      </p:ext>
+    </p:extLst>
+  </p:cSld>
+  <p:clrMapOvr>
+    <a:masterClrMapping/>
+  </p:clrMapOvr>
+</p:notes>
+</file>
+
+<file path=ppt/notesSlides/notesSlide2.xml><?xml version="1.0" encoding="utf-8"?>
 <p:notes xmlns:a="http://schemas.openxmlformats.org/drawingml/2006/main" xmlns:r="http://schemas.openxmlformats.org/officeDocument/2006/relationships" xmlns:p="http://schemas.openxmlformats.org/presentationml/2006/main">
   <p:cSld>
     <p:spTree>

</xml_diff>

<commit_message>
Add more on event alternative
</commit_message>
<xml_diff>
--- a/TA2/AGREE_event_ports/agree_event_semantics.pptx
+++ b/TA2/AGREE_event_ports/agree_event_semantics.pptx
@@ -5,7 +5,7 @@
     <p:sldMasterId id="2147483648" r:id="rId1"/>
   </p:sldMasterIdLst>
   <p:notesMasterIdLst>
-    <p:notesMasterId r:id="rId17"/>
+    <p:notesMasterId r:id="rId18"/>
   </p:notesMasterIdLst>
   <p:sldIdLst>
     <p:sldId id="256" r:id="rId2"/>
@@ -19,10 +19,11 @@
     <p:sldId id="267" r:id="rId10"/>
     <p:sldId id="268" r:id="rId11"/>
     <p:sldId id="269" r:id="rId12"/>
-    <p:sldId id="263" r:id="rId13"/>
-    <p:sldId id="264" r:id="rId14"/>
-    <p:sldId id="265" r:id="rId15"/>
-    <p:sldId id="266" r:id="rId16"/>
+    <p:sldId id="271" r:id="rId13"/>
+    <p:sldId id="263" r:id="rId14"/>
+    <p:sldId id="264" r:id="rId15"/>
+    <p:sldId id="265" r:id="rId16"/>
+    <p:sldId id="266" r:id="rId17"/>
   </p:sldIdLst>
   <p:sldSz cx="12192000" cy="6858000"/>
   <p:notesSz cx="6858000" cy="9144000"/>
@@ -709,31 +710,10 @@
           <a:bodyPr/>
           <a:lstStyle/>
           <a:p>
-            <a:pPr marL="171450" indent="-171450">
-              <a:buFont typeface="Arial" panose="020B0604020202020204" pitchFamily="34" charset="0"/>
-              <a:buChar char="•"/>
-            </a:pPr>
-            <a:r>
-              <a:rPr lang="en-US" dirty="0" err="1"/>
-              <a:t>Constraint_in</a:t>
-            </a:r>
             <a:r>
               <a:rPr lang="en-US" dirty="0"/>
-              <a:t>() is some function over the inputs that participate in the constraint</a:t>
-            </a:r>
-          </a:p>
-          <a:p>
-            <a:pPr marL="171450" indent="-171450">
-              <a:buFont typeface="Arial" panose="020B0604020202020204" pitchFamily="34" charset="0"/>
-              <a:buChar char="•"/>
-            </a:pPr>
-            <a:r>
-              <a:rPr lang="en-US" dirty="0"/>
-              <a:t>It still is not clear that events add any real meaning to the proof: the proof certificate provides no additional assurance over that without events.</a:t>
-            </a:r>
-          </a:p>
-          <a:p>
-            <a:endParaRPr lang="en-US" dirty="0"/>
+              <a:t>It is possible to connect inputs to outputs without events but the modeler would need to introduce an initial message that is valid and well-formed so that the output can stutter in the absence of valid input—initialization problem…</a:t>
+            </a:r>
           </a:p>
         </p:txBody>
       </p:sp>
@@ -754,7 +734,7 @@
           <a:p>
             <a:fld id="{B222266E-AA87-A247-8974-081C5A3E2A21}" type="slidenum">
               <a:rPr lang="en-US" smtClean="0"/>
-              <a:t>7</a:t>
+              <a:t>6</a:t>
             </a:fld>
             <a:endParaRPr lang="en-US"/>
           </a:p>
@@ -763,7 +743,7 @@
     </p:spTree>
     <p:extLst>
       <p:ext uri="{BB962C8B-B14F-4D97-AF65-F5344CB8AC3E}">
-        <p14:creationId xmlns:p14="http://schemas.microsoft.com/office/powerpoint/2010/main" val="668153425"/>
+        <p14:creationId xmlns:p14="http://schemas.microsoft.com/office/powerpoint/2010/main" val="1631223909"/>
       </p:ext>
     </p:extLst>
   </p:cSld>
@@ -822,16 +802,12 @@
               <a:buChar char="•"/>
             </a:pPr>
             <a:r>
+              <a:rPr lang="en-US" dirty="0" err="1"/>
+              <a:t>Constraint_in</a:t>
+            </a:r>
+            <a:r>
               <a:rPr lang="en-US" dirty="0"/>
-              <a:t>event_out1(…) is a </a:t>
-            </a:r>
-            <a:r>
-              <a:rPr lang="en-US" dirty="0" err="1"/>
-              <a:t>fuction</a:t>
-            </a:r>
-            <a:r>
-              <a:rPr lang="en-US" dirty="0"/>
-              <a:t> defined over input and output values that determine when the output should fire.</a:t>
+              <a:t>() is some function over the inputs that participate in the constraint</a:t>
             </a:r>
           </a:p>
           <a:p>
@@ -841,17 +817,7 @@
             </a:pPr>
             <a:r>
               <a:rPr lang="en-US" dirty="0"/>
-              <a:t>Constraint_out1(…) is a function defined over input and output values that determine what the output should look at the time the output event fires.</a:t>
-            </a:r>
-          </a:p>
-          <a:p>
-            <a:pPr marL="171450" indent="-171450">
-              <a:buFont typeface="Arial" panose="020B0604020202020204" pitchFamily="34" charset="0"/>
-              <a:buChar char="•"/>
-            </a:pPr>
-            <a:r>
-              <a:rPr lang="en-US" dirty="0"/>
-              <a:t>Only include input event ports in the condition trigger as with assume statements.</a:t>
+              <a:t>It still is not clear that events add any real meaning to the proof: the proof certificate provides no additional assurance over that without events.</a:t>
             </a:r>
           </a:p>
           <a:p>
@@ -876,7 +842,7 @@
           <a:p>
             <a:fld id="{B222266E-AA87-A247-8974-081C5A3E2A21}" type="slidenum">
               <a:rPr lang="en-US" smtClean="0"/>
-              <a:t>9</a:t>
+              <a:t>7</a:t>
             </a:fld>
             <a:endParaRPr lang="en-US"/>
           </a:p>
@@ -885,7 +851,7 @@
     </p:spTree>
     <p:extLst>
       <p:ext uri="{BB962C8B-B14F-4D97-AF65-F5344CB8AC3E}">
-        <p14:creationId xmlns:p14="http://schemas.microsoft.com/office/powerpoint/2010/main" val="591971289"/>
+        <p14:creationId xmlns:p14="http://schemas.microsoft.com/office/powerpoint/2010/main" val="668153425"/>
       </p:ext>
     </p:extLst>
   </p:cSld>
@@ -939,14 +905,44 @@
           <a:bodyPr/>
           <a:lstStyle/>
           <a:p>
+            <a:pPr marL="171450" indent="-171450">
+              <a:buFont typeface="Arial" panose="020B0604020202020204" pitchFamily="34" charset="0"/>
+              <a:buChar char="•"/>
+            </a:pPr>
             <a:r>
               <a:rPr lang="en-US" dirty="0"/>
-              <a:t>See SW_FLT_EVENT::</a:t>
+              <a:t>event_out1(…) is a </a:t>
             </a:r>
             <a:r>
               <a:rPr lang="en-US" dirty="0" err="1"/>
-              <a:t>SW.Impl</a:t>
-            </a:r>
+              <a:t>fuction</a:t>
+            </a:r>
+            <a:r>
+              <a:rPr lang="en-US" dirty="0"/>
+              <a:t> defined over input and output values that determine when the output should fire.</a:t>
+            </a:r>
+          </a:p>
+          <a:p>
+            <a:pPr marL="171450" indent="-171450">
+              <a:buFont typeface="Arial" panose="020B0604020202020204" pitchFamily="34" charset="0"/>
+              <a:buChar char="•"/>
+            </a:pPr>
+            <a:r>
+              <a:rPr lang="en-US" dirty="0"/>
+              <a:t>Constraint_out1(…) is a function defined over input and output values that determine what the output should look at the time the output event fires.</a:t>
+            </a:r>
+          </a:p>
+          <a:p>
+            <a:pPr marL="171450" indent="-171450">
+              <a:buFont typeface="Arial" panose="020B0604020202020204" pitchFamily="34" charset="0"/>
+              <a:buChar char="•"/>
+            </a:pPr>
+            <a:r>
+              <a:rPr lang="en-US" dirty="0"/>
+              <a:t>Only include input event ports in the condition trigger as with assume statements.</a:t>
+            </a:r>
+          </a:p>
+          <a:p>
             <a:endParaRPr lang="en-US" dirty="0"/>
           </a:p>
         </p:txBody>
@@ -968,7 +964,7 @@
           <a:p>
             <a:fld id="{B222266E-AA87-A247-8974-081C5A3E2A21}" type="slidenum">
               <a:rPr lang="en-US" smtClean="0"/>
-              <a:t>11</a:t>
+              <a:t>9</a:t>
             </a:fld>
             <a:endParaRPr lang="en-US"/>
           </a:p>
@@ -977,7 +973,7 @@
     </p:spTree>
     <p:extLst>
       <p:ext uri="{BB962C8B-B14F-4D97-AF65-F5344CB8AC3E}">
-        <p14:creationId xmlns:p14="http://schemas.microsoft.com/office/powerpoint/2010/main" val="3306422247"/>
+        <p14:creationId xmlns:p14="http://schemas.microsoft.com/office/powerpoint/2010/main" val="591971289"/>
       </p:ext>
     </p:extLst>
   </p:cSld>
@@ -1031,100 +1027,14 @@
           <a:bodyPr/>
           <a:lstStyle/>
           <a:p>
-            <a:pPr marL="0" indent="0">
-              <a:buNone/>
-            </a:pPr>
             <a:r>
               <a:rPr lang="en-US" dirty="0"/>
-              <a:t>The formal semantics would enable us to</a:t>
-            </a:r>
-          </a:p>
-          <a:p>
-            <a:pPr marL="228600" indent="-228600">
-              <a:buAutoNum type="arabicPeriod"/>
-            </a:pPr>
-            <a:endParaRPr lang="en-US" dirty="0"/>
-          </a:p>
-          <a:p>
-            <a:pPr marL="228600" indent="-228600">
-              <a:buAutoNum type="arabicPeriod"/>
-            </a:pPr>
-            <a:r>
-              <a:rPr lang="en-US" dirty="0"/>
-              <a:t>Verify that </a:t>
+              <a:t>See SW_FLT_EVENT::</a:t>
             </a:r>
             <a:r>
               <a:rPr lang="en-US" dirty="0" err="1"/>
-              <a:t>Filter.Impl</a:t>
-            </a:r>
-            <a:r>
-              <a:rPr lang="en-US" dirty="0"/>
-              <a:t> satisfies the Filter contract</a:t>
-            </a:r>
-          </a:p>
-          <a:p>
-            <a:pPr marL="228600" indent="-228600">
-              <a:buAutoNum type="arabicPeriod"/>
-            </a:pPr>
-            <a:r>
-              <a:rPr lang="en-US" dirty="0"/>
-              <a:t>Compile </a:t>
-            </a:r>
-            <a:r>
-              <a:rPr lang="en-US" dirty="0" err="1"/>
-              <a:t>Filter.Impl</a:t>
-            </a:r>
-            <a:r>
-              <a:rPr lang="en-US" dirty="0"/>
-              <a:t> down to actual code for the filter</a:t>
-            </a:r>
-          </a:p>
-          <a:p>
-            <a:pPr marL="228600" indent="-228600">
-              <a:buAutoNum type="arabicPeriod"/>
-            </a:pPr>
-            <a:endParaRPr lang="en-US" dirty="0"/>
-          </a:p>
-          <a:p>
-            <a:pPr marL="171450" indent="-171450">
-              <a:buFont typeface="Arial" panose="020B0604020202020204" pitchFamily="34" charset="0"/>
-              <a:buChar char="•"/>
-            </a:pPr>
-            <a:r>
-              <a:rPr lang="en-US" dirty="0"/>
-              <a:t>AGREE is a simple language…</a:t>
-            </a:r>
-          </a:p>
-          <a:p>
-            <a:pPr marL="171450" indent="-171450">
-              <a:buFont typeface="Arial" panose="020B0604020202020204" pitchFamily="34" charset="0"/>
-              <a:buChar char="•"/>
-            </a:pPr>
-            <a:r>
-              <a:rPr lang="en-US" dirty="0"/>
-              <a:t>Would need to give more control to specifying output event behavior in the implementation.</a:t>
-            </a:r>
-          </a:p>
-          <a:p>
-            <a:pPr marL="171450" indent="-171450">
-              <a:buFont typeface="Arial" panose="020B0604020202020204" pitchFamily="34" charset="0"/>
-              <a:buChar char="•"/>
-            </a:pPr>
-            <a:r>
-              <a:rPr lang="en-US" dirty="0"/>
-              <a:t>Would need something more than contracts to indicate the implementation does more than just meet the contract---liveness maybe?</a:t>
-            </a:r>
-          </a:p>
-          <a:p>
-            <a:pPr marL="0" indent="0">
-              <a:buNone/>
-            </a:pPr>
-            <a:endParaRPr lang="en-US" dirty="0"/>
-          </a:p>
-          <a:p>
-            <a:pPr marL="0" indent="0">
-              <a:buNone/>
-            </a:pPr>
+              <a:t>SW.Impl</a:t>
+            </a:r>
             <a:endParaRPr lang="en-US" dirty="0"/>
           </a:p>
         </p:txBody>
@@ -1146,7 +1056,185 @@
           <a:p>
             <a:fld id="{B222266E-AA87-A247-8974-081C5A3E2A21}" type="slidenum">
               <a:rPr lang="en-US" smtClean="0"/>
-              <a:t>14</a:t>
+              <a:t>11</a:t>
+            </a:fld>
+            <a:endParaRPr lang="en-US"/>
+          </a:p>
+        </p:txBody>
+      </p:sp>
+    </p:spTree>
+    <p:extLst>
+      <p:ext uri="{BB962C8B-B14F-4D97-AF65-F5344CB8AC3E}">
+        <p14:creationId xmlns:p14="http://schemas.microsoft.com/office/powerpoint/2010/main" val="3306422247"/>
+      </p:ext>
+    </p:extLst>
+  </p:cSld>
+  <p:clrMapOvr>
+    <a:masterClrMapping/>
+  </p:clrMapOvr>
+</p:notes>
+</file>
+
+<file path=ppt/notesSlides/notesSlide7.xml><?xml version="1.0" encoding="utf-8"?>
+<p:notes xmlns:a="http://schemas.openxmlformats.org/drawingml/2006/main" xmlns:r="http://schemas.openxmlformats.org/officeDocument/2006/relationships" xmlns:p="http://schemas.openxmlformats.org/presentationml/2006/main">
+  <p:cSld>
+    <p:spTree>
+      <p:nvGrpSpPr>
+        <p:cNvPr id="1" name=""/>
+        <p:cNvGrpSpPr/>
+        <p:nvPr/>
+      </p:nvGrpSpPr>
+      <p:grpSpPr>
+        <a:xfrm>
+          <a:off x="0" y="0"/>
+          <a:ext cx="0" cy="0"/>
+          <a:chOff x="0" y="0"/>
+          <a:chExt cx="0" cy="0"/>
+        </a:xfrm>
+      </p:grpSpPr>
+      <p:sp>
+        <p:nvSpPr>
+          <p:cNvPr id="2" name="Slide Image Placeholder 1"/>
+          <p:cNvSpPr>
+            <a:spLocks noGrp="1" noRot="1" noChangeAspect="1"/>
+          </p:cNvSpPr>
+          <p:nvPr>
+            <p:ph type="sldImg"/>
+          </p:nvPr>
+        </p:nvSpPr>
+        <p:spPr/>
+      </p:sp>
+      <p:sp>
+        <p:nvSpPr>
+          <p:cNvPr id="3" name="Notes Placeholder 2"/>
+          <p:cNvSpPr>
+            <a:spLocks noGrp="1"/>
+          </p:cNvSpPr>
+          <p:nvPr>
+            <p:ph type="body" idx="1"/>
+          </p:nvPr>
+        </p:nvSpPr>
+        <p:spPr/>
+        <p:txBody>
+          <a:bodyPr/>
+          <a:lstStyle/>
+          <a:p>
+            <a:pPr marL="0" indent="0">
+              <a:buNone/>
+            </a:pPr>
+            <a:r>
+              <a:rPr lang="en-US" dirty="0"/>
+              <a:t>The formal semantics would enable us to</a:t>
+            </a:r>
+          </a:p>
+          <a:p>
+            <a:pPr marL="228600" indent="-228600">
+              <a:buAutoNum type="arabicPeriod"/>
+            </a:pPr>
+            <a:endParaRPr lang="en-US" dirty="0"/>
+          </a:p>
+          <a:p>
+            <a:pPr marL="228600" indent="-228600">
+              <a:buAutoNum type="arabicPeriod"/>
+            </a:pPr>
+            <a:r>
+              <a:rPr lang="en-US" dirty="0"/>
+              <a:t>Verify that </a:t>
+            </a:r>
+            <a:r>
+              <a:rPr lang="en-US" dirty="0" err="1"/>
+              <a:t>Filter.Impl</a:t>
+            </a:r>
+            <a:r>
+              <a:rPr lang="en-US" dirty="0"/>
+              <a:t> satisfies the Filter contract</a:t>
+            </a:r>
+          </a:p>
+          <a:p>
+            <a:pPr marL="228600" indent="-228600">
+              <a:buAutoNum type="arabicPeriod"/>
+            </a:pPr>
+            <a:r>
+              <a:rPr lang="en-US" dirty="0"/>
+              <a:t>Compile </a:t>
+            </a:r>
+            <a:r>
+              <a:rPr lang="en-US" dirty="0" err="1"/>
+              <a:t>Filter.Impl</a:t>
+            </a:r>
+            <a:r>
+              <a:rPr lang="en-US" dirty="0"/>
+              <a:t> down to actual code for the filter</a:t>
+            </a:r>
+          </a:p>
+          <a:p>
+            <a:pPr marL="228600" indent="-228600">
+              <a:buAutoNum type="arabicPeriod"/>
+            </a:pPr>
+            <a:endParaRPr lang="en-US" dirty="0"/>
+          </a:p>
+          <a:p>
+            <a:pPr marL="171450" indent="-171450">
+              <a:buFont typeface="Arial" panose="020B0604020202020204" pitchFamily="34" charset="0"/>
+              <a:buChar char="•"/>
+            </a:pPr>
+            <a:r>
+              <a:rPr lang="en-US" dirty="0"/>
+              <a:t>AGREE is a simple language…</a:t>
+            </a:r>
+          </a:p>
+          <a:p>
+            <a:pPr marL="171450" indent="-171450">
+              <a:buFont typeface="Arial" panose="020B0604020202020204" pitchFamily="34" charset="0"/>
+              <a:buChar char="•"/>
+            </a:pPr>
+            <a:r>
+              <a:rPr lang="en-US" dirty="0"/>
+              <a:t>Would need to give more control to specifying output event behavior in the implementation.</a:t>
+            </a:r>
+          </a:p>
+          <a:p>
+            <a:pPr marL="171450" indent="-171450">
+              <a:buFont typeface="Arial" panose="020B0604020202020204" pitchFamily="34" charset="0"/>
+              <a:buChar char="•"/>
+            </a:pPr>
+            <a:r>
+              <a:rPr lang="en-US" dirty="0"/>
+              <a:t>Would need something more than contracts to indicate the implementation does more than just meet the contract---liveness maybe?</a:t>
+            </a:r>
+          </a:p>
+          <a:p>
+            <a:pPr marL="0" indent="0">
+              <a:buNone/>
+            </a:pPr>
+            <a:endParaRPr lang="en-US" dirty="0"/>
+          </a:p>
+          <a:p>
+            <a:pPr marL="0" indent="0">
+              <a:buNone/>
+            </a:pPr>
+            <a:endParaRPr lang="en-US" dirty="0"/>
+          </a:p>
+        </p:txBody>
+      </p:sp>
+      <p:sp>
+        <p:nvSpPr>
+          <p:cNvPr id="4" name="Slide Number Placeholder 3"/>
+          <p:cNvSpPr>
+            <a:spLocks noGrp="1"/>
+          </p:cNvSpPr>
+          <p:nvPr>
+            <p:ph type="sldNum" sz="quarter" idx="5"/>
+          </p:nvPr>
+        </p:nvSpPr>
+        <p:spPr/>
+        <p:txBody>
+          <a:bodyPr/>
+          <a:lstStyle/>
+          <a:p>
+            <a:fld id="{B222266E-AA87-A247-8974-081C5A3E2A21}" type="slidenum">
+              <a:rPr lang="en-US" smtClean="0"/>
+              <a:t>15</a:t>
             </a:fld>
             <a:endParaRPr lang="en-US"/>
           </a:p>
@@ -5543,6 +5631,64 @@
           <p:cNvPr id="2" name="Title 1">
             <a:extLst>
               <a:ext uri="{FF2B5EF4-FFF2-40B4-BE49-F238E27FC236}">
+                <a16:creationId xmlns:a16="http://schemas.microsoft.com/office/drawing/2014/main" id="{77E7C42D-3C30-8D4A-B00B-71EBFF16FD60}"/>
+              </a:ext>
+            </a:extLst>
+          </p:cNvPr>
+          <p:cNvSpPr>
+            <a:spLocks noGrp="1"/>
+          </p:cNvSpPr>
+          <p:nvPr>
+            <p:ph type="title"/>
+          </p:nvPr>
+        </p:nvSpPr>
+        <p:spPr/>
+        <p:txBody>
+          <a:bodyPr/>
+          <a:lstStyle/>
+          <a:p>
+            <a:r>
+              <a:rPr lang="en-US" dirty="0"/>
+              <a:t>Does AGREE Analysis Actually Fire an Event?</a:t>
+            </a:r>
+          </a:p>
+        </p:txBody>
+      </p:sp>
+    </p:spTree>
+    <p:extLst>
+      <p:ext uri="{BB962C8B-B14F-4D97-AF65-F5344CB8AC3E}">
+        <p14:creationId xmlns:p14="http://schemas.microsoft.com/office/powerpoint/2010/main" val="1186290581"/>
+      </p:ext>
+    </p:extLst>
+  </p:cSld>
+  <p:clrMapOvr>
+    <a:masterClrMapping/>
+  </p:clrMapOvr>
+</p:sld>
+</file>
+
+<file path=ppt/slides/slide13.xml><?xml version="1.0" encoding="utf-8"?>
+<p:sld xmlns:a="http://schemas.openxmlformats.org/drawingml/2006/main" xmlns:r="http://schemas.openxmlformats.org/officeDocument/2006/relationships" xmlns:p="http://schemas.openxmlformats.org/presentationml/2006/main">
+  <p:cSld>
+    <p:spTree>
+      <p:nvGrpSpPr>
+        <p:cNvPr id="1" name=""/>
+        <p:cNvGrpSpPr/>
+        <p:nvPr/>
+      </p:nvGrpSpPr>
+      <p:grpSpPr>
+        <a:xfrm>
+          <a:off x="0" y="0"/>
+          <a:ext cx="0" cy="0"/>
+          <a:chOff x="0" y="0"/>
+          <a:chExt cx="0" cy="0"/>
+        </a:xfrm>
+      </p:grpSpPr>
+      <p:sp>
+        <p:nvSpPr>
+          <p:cNvPr id="2" name="Title 1">
+            <a:extLst>
+              <a:ext uri="{FF2B5EF4-FFF2-40B4-BE49-F238E27FC236}">
                 <a16:creationId xmlns:a16="http://schemas.microsoft.com/office/drawing/2014/main" id="{EA7180C1-6B04-1F4C-A1F2-9CF23B6ED9A7}"/>
               </a:ext>
             </a:extLst>
@@ -5631,7 +5777,7 @@
 </p:sld>
 </file>
 
-<file path=ppt/slides/slide13.xml><?xml version="1.0" encoding="utf-8"?>
+<file path=ppt/slides/slide14.xml><?xml version="1.0" encoding="utf-8"?>
 <p:sld xmlns:a="http://schemas.openxmlformats.org/drawingml/2006/main" xmlns:r="http://schemas.openxmlformats.org/officeDocument/2006/relationships" xmlns:p="http://schemas.openxmlformats.org/presentationml/2006/main">
   <p:cSld>
     <p:spTree>
@@ -5788,7 +5934,7 @@
 </p:sld>
 </file>
 
-<file path=ppt/slides/slide14.xml><?xml version="1.0" encoding="utf-8"?>
+<file path=ppt/slides/slide15.xml><?xml version="1.0" encoding="utf-8"?>
 <p:sld xmlns:a="http://schemas.openxmlformats.org/drawingml/2006/main" xmlns:r="http://schemas.openxmlformats.org/officeDocument/2006/relationships" xmlns:p="http://schemas.openxmlformats.org/presentationml/2006/main">
   <p:cSld>
     <p:spTree>
@@ -7575,7 +7721,7 @@
 </p:sld>
 </file>
 
-<file path=ppt/slides/slide15.xml><?xml version="1.0" encoding="utf-8"?>
+<file path=ppt/slides/slide16.xml><?xml version="1.0" encoding="utf-8"?>
 <p:sld xmlns:a="http://schemas.openxmlformats.org/drawingml/2006/main" xmlns:r="http://schemas.openxmlformats.org/officeDocument/2006/relationships" xmlns:p="http://schemas.openxmlformats.org/presentationml/2006/main">
   <p:cSld>
     <p:spTree>
@@ -8804,8 +8950,8 @@
         </p:nvSpPr>
         <p:spPr>
           <a:xfrm>
-            <a:off x="267127" y="4659920"/>
-            <a:ext cx="12493375" cy="2031325"/>
+            <a:off x="267127" y="3999016"/>
+            <a:ext cx="12493375" cy="2862322"/>
           </a:xfrm>
           <a:prstGeom prst="rect">
             <a:avLst/>
@@ -9021,6 +9167,427 @@
             </a:r>
           </a:p>
           <a:p>
+            <a:r>
+              <a:rPr lang="en-US" b="1" dirty="0">
+                <a:solidFill>
+                  <a:srgbClr val="7F0055"/>
+                </a:solidFill>
+                <a:latin typeface="Menlo" panose="020B0609030804020204" pitchFamily="49" charset="0"/>
+              </a:rPr>
+              <a:t>guarantee</a:t>
+            </a:r>
+            <a:r>
+              <a:rPr lang="en-US" b="1" dirty="0">
+                <a:solidFill>
+                  <a:srgbClr val="000000"/>
+                </a:solidFill>
+                <a:latin typeface="Menlo" panose="020B0609030804020204" pitchFamily="49" charset="0"/>
+              </a:rPr>
+              <a:t> SW_FLT_Req001_FLT </a:t>
+            </a:r>
+          </a:p>
+          <a:p>
+            <a:r>
+              <a:rPr lang="en-US" b="1" dirty="0">
+                <a:solidFill>
+                  <a:srgbClr val="2A00FF"/>
+                </a:solidFill>
+                <a:latin typeface="Menlo" panose="020B0609030804020204" pitchFamily="49" charset="0"/>
+              </a:rPr>
+              <a:t>  "Only well-formed messages shall be forwarded to message destination"</a:t>
+            </a:r>
+            <a:r>
+              <a:rPr lang="en-US" b="1" dirty="0">
+                <a:solidFill>
+                  <a:srgbClr val="7F0055"/>
+                </a:solidFill>
+                <a:latin typeface="Menlo" panose="020B0609030804020204" pitchFamily="49" charset="0"/>
+              </a:rPr>
+              <a:t>:</a:t>
+            </a:r>
+            <a:endParaRPr lang="en-US" b="1" dirty="0">
+              <a:solidFill>
+                <a:srgbClr val="000000"/>
+              </a:solidFill>
+              <a:latin typeface="Menlo" panose="020B0609030804020204" pitchFamily="49" charset="0"/>
+            </a:endParaRPr>
+          </a:p>
+          <a:p>
+            <a:r>
+              <a:rPr lang="en-US" b="1" dirty="0">
+                <a:solidFill>
+                  <a:srgbClr val="000000"/>
+                </a:solidFill>
+                <a:latin typeface="Menlo" panose="020B0609030804020204" pitchFamily="49" charset="0"/>
+              </a:rPr>
+              <a:t>  SW</a:t>
+            </a:r>
+            <a:r>
+              <a:rPr lang="en-US" b="1" dirty="0">
+                <a:solidFill>
+                  <a:srgbClr val="7F0055"/>
+                </a:solidFill>
+                <a:latin typeface="Menlo" panose="020B0609030804020204" pitchFamily="49" charset="0"/>
+              </a:rPr>
+              <a:t>::</a:t>
+            </a:r>
+            <a:r>
+              <a:rPr lang="en-US" b="1" dirty="0">
+                <a:solidFill>
+                  <a:srgbClr val="000000"/>
+                </a:solidFill>
+                <a:latin typeface="Menlo" panose="020B0609030804020204" pitchFamily="49" charset="0"/>
+              </a:rPr>
+              <a:t>WELL_FORMED_MESSAGE</a:t>
+            </a:r>
+            <a:r>
+              <a:rPr lang="en-US" b="1" dirty="0">
+                <a:solidFill>
+                  <a:srgbClr val="7F0055"/>
+                </a:solidFill>
+                <a:latin typeface="Menlo" panose="020B0609030804020204" pitchFamily="49" charset="0"/>
+              </a:rPr>
+              <a:t>(</a:t>
+            </a:r>
+            <a:r>
+              <a:rPr lang="en-US" b="1" dirty="0" err="1">
+                <a:solidFill>
+                  <a:srgbClr val="000000"/>
+                </a:solidFill>
+                <a:latin typeface="Menlo" panose="020B0609030804020204" pitchFamily="49" charset="0"/>
+              </a:rPr>
+              <a:t>filter_in</a:t>
+            </a:r>
+            <a:r>
+              <a:rPr lang="en-US" b="1" dirty="0">
+                <a:solidFill>
+                  <a:srgbClr val="7F0055"/>
+                </a:solidFill>
+                <a:latin typeface="Menlo" panose="020B0609030804020204" pitchFamily="49" charset="0"/>
+              </a:rPr>
+              <a:t>)</a:t>
+            </a:r>
+            <a:r>
+              <a:rPr lang="en-US" b="1" dirty="0">
+                <a:solidFill>
+                  <a:srgbClr val="000000"/>
+                </a:solidFill>
+                <a:latin typeface="Menlo" panose="020B0609030804020204" pitchFamily="49" charset="0"/>
+              </a:rPr>
+              <a:t> </a:t>
+            </a:r>
+            <a:r>
+              <a:rPr lang="en-US" b="1" dirty="0">
+                <a:solidFill>
+                  <a:srgbClr val="7F0055"/>
+                </a:solidFill>
+                <a:latin typeface="Menlo" panose="020B0609030804020204" pitchFamily="49" charset="0"/>
+              </a:rPr>
+              <a:t>=&gt;</a:t>
+            </a:r>
+            <a:r>
+              <a:rPr lang="en-US" b="1" dirty="0">
+                <a:solidFill>
+                  <a:srgbClr val="000000"/>
+                </a:solidFill>
+                <a:latin typeface="Menlo" panose="020B0609030804020204" pitchFamily="49" charset="0"/>
+              </a:rPr>
+              <a:t> </a:t>
+            </a:r>
+            <a:r>
+              <a:rPr lang="en-US" b="1" dirty="0">
+                <a:solidFill>
+                  <a:srgbClr val="7F0055"/>
+                </a:solidFill>
+                <a:latin typeface="Menlo" panose="020B0609030804020204" pitchFamily="49" charset="0"/>
+              </a:rPr>
+              <a:t>(</a:t>
+            </a:r>
+            <a:r>
+              <a:rPr lang="en-US" b="1" dirty="0" err="1">
+                <a:solidFill>
+                  <a:srgbClr val="000000"/>
+                </a:solidFill>
+                <a:latin typeface="Menlo" panose="020B0609030804020204" pitchFamily="49" charset="0"/>
+              </a:rPr>
+              <a:t>filter_out</a:t>
+            </a:r>
+            <a:r>
+              <a:rPr lang="en-US" b="1" dirty="0">
+                <a:solidFill>
+                  <a:srgbClr val="000000"/>
+                </a:solidFill>
+                <a:latin typeface="Menlo" panose="020B0609030804020204" pitchFamily="49" charset="0"/>
+              </a:rPr>
+              <a:t> </a:t>
+            </a:r>
+            <a:r>
+              <a:rPr lang="en-US" b="1" dirty="0">
+                <a:solidFill>
+                  <a:srgbClr val="7F0055"/>
+                </a:solidFill>
+                <a:latin typeface="Menlo" panose="020B0609030804020204" pitchFamily="49" charset="0"/>
+              </a:rPr>
+              <a:t>=</a:t>
+            </a:r>
+            <a:r>
+              <a:rPr lang="en-US" b="1" dirty="0">
+                <a:solidFill>
+                  <a:srgbClr val="000000"/>
+                </a:solidFill>
+                <a:latin typeface="Menlo" panose="020B0609030804020204" pitchFamily="49" charset="0"/>
+              </a:rPr>
+              <a:t> </a:t>
+            </a:r>
+            <a:r>
+              <a:rPr lang="en-US" b="1" dirty="0" err="1">
+                <a:solidFill>
+                  <a:srgbClr val="000000"/>
+                </a:solidFill>
+                <a:latin typeface="Menlo" panose="020B0609030804020204" pitchFamily="49" charset="0"/>
+              </a:rPr>
+              <a:t>filter_in</a:t>
+            </a:r>
+            <a:r>
+              <a:rPr lang="en-US" b="1" dirty="0">
+                <a:solidFill>
+                  <a:srgbClr val="7F0055"/>
+                </a:solidFill>
+                <a:latin typeface="Menlo" panose="020B0609030804020204" pitchFamily="49" charset="0"/>
+              </a:rPr>
+              <a:t>);</a:t>
+            </a:r>
+          </a:p>
+          <a:p>
+            <a:r>
+              <a:rPr lang="en-US" b="1" dirty="0">
+                <a:solidFill>
+                  <a:srgbClr val="7F0055"/>
+                </a:solidFill>
+                <a:latin typeface="Menlo" panose="020B0609030804020204" pitchFamily="49" charset="0"/>
+              </a:rPr>
+              <a:t>guarantee</a:t>
+            </a:r>
+            <a:r>
+              <a:rPr lang="en-US" b="1" dirty="0">
+                <a:solidFill>
+                  <a:srgbClr val="000000"/>
+                </a:solidFill>
+                <a:latin typeface="Menlo" panose="020B0609030804020204" pitchFamily="49" charset="0"/>
+              </a:rPr>
+              <a:t> SW_FLT_STUTTER </a:t>
+            </a:r>
+          </a:p>
+          <a:p>
+            <a:r>
+              <a:rPr lang="en-US" b="1" dirty="0">
+                <a:solidFill>
+                  <a:srgbClr val="000000"/>
+                </a:solidFill>
+                <a:latin typeface="Menlo" panose="020B0609030804020204" pitchFamily="49" charset="0"/>
+              </a:rPr>
+              <a:t>  </a:t>
+            </a:r>
+            <a:r>
+              <a:rPr lang="en-US" b="1" dirty="0">
+                <a:solidFill>
+                  <a:srgbClr val="2A00FF"/>
+                </a:solidFill>
+                <a:latin typeface="Menlo" panose="020B0609030804020204" pitchFamily="49" charset="0"/>
+              </a:rPr>
+              <a:t>"Stutter in input is not a valid and well-formed message"</a:t>
+            </a:r>
+            <a:r>
+              <a:rPr lang="en-US" b="1" dirty="0">
+                <a:solidFill>
+                  <a:srgbClr val="7F0055"/>
+                </a:solidFill>
+                <a:latin typeface="Menlo" panose="020B0609030804020204" pitchFamily="49" charset="0"/>
+              </a:rPr>
+              <a:t>:</a:t>
+            </a:r>
+            <a:r>
+              <a:rPr lang="en-US" b="1" dirty="0">
+                <a:solidFill>
+                  <a:srgbClr val="000000"/>
+                </a:solidFill>
+                <a:latin typeface="Menlo" panose="020B0609030804020204" pitchFamily="49" charset="0"/>
+              </a:rPr>
+              <a:t> </a:t>
+            </a:r>
+          </a:p>
+          <a:p>
+            <a:r>
+              <a:rPr lang="en-US" b="1" dirty="0">
+                <a:solidFill>
+                  <a:srgbClr val="000000"/>
+                </a:solidFill>
+                <a:latin typeface="Menlo" panose="020B0609030804020204" pitchFamily="49" charset="0"/>
+              </a:rPr>
+              <a:t>  </a:t>
+            </a:r>
+            <a:r>
+              <a:rPr lang="en-US" b="1" dirty="0">
+                <a:solidFill>
+                  <a:srgbClr val="7F0055"/>
+                </a:solidFill>
+                <a:latin typeface="Menlo" panose="020B0609030804020204" pitchFamily="49" charset="0"/>
+              </a:rPr>
+              <a:t>not(</a:t>
+            </a:r>
+            <a:r>
+              <a:rPr lang="en-US" b="1" dirty="0">
+                <a:solidFill>
+                  <a:srgbClr val="000000"/>
+                </a:solidFill>
+                <a:latin typeface="Menlo" panose="020B0609030804020204" pitchFamily="49" charset="0"/>
+              </a:rPr>
+              <a:t>SW</a:t>
+            </a:r>
+            <a:r>
+              <a:rPr lang="en-US" b="1" dirty="0">
+                <a:solidFill>
+                  <a:srgbClr val="7F0055"/>
+                </a:solidFill>
+                <a:latin typeface="Menlo" panose="020B0609030804020204" pitchFamily="49" charset="0"/>
+              </a:rPr>
+              <a:t>::</a:t>
+            </a:r>
+            <a:r>
+              <a:rPr lang="en-US" b="1" dirty="0">
+                <a:solidFill>
+                  <a:srgbClr val="000000"/>
+                </a:solidFill>
+                <a:latin typeface="Menlo" panose="020B0609030804020204" pitchFamily="49" charset="0"/>
+              </a:rPr>
+              <a:t>VALID_MESSAGE</a:t>
+            </a:r>
+            <a:r>
+              <a:rPr lang="en-US" b="1" dirty="0">
+                <a:solidFill>
+                  <a:srgbClr val="7F0055"/>
+                </a:solidFill>
+                <a:latin typeface="Menlo" panose="020B0609030804020204" pitchFamily="49" charset="0"/>
+              </a:rPr>
+              <a:t>(</a:t>
+            </a:r>
+            <a:r>
+              <a:rPr lang="en-US" b="1" dirty="0" err="1">
+                <a:solidFill>
+                  <a:srgbClr val="000000"/>
+                </a:solidFill>
+                <a:latin typeface="Menlo" panose="020B0609030804020204" pitchFamily="49" charset="0"/>
+              </a:rPr>
+              <a:t>filter_out</a:t>
+            </a:r>
+            <a:r>
+              <a:rPr lang="en-US" b="1" dirty="0">
+                <a:solidFill>
+                  <a:srgbClr val="7F0055"/>
+                </a:solidFill>
+                <a:latin typeface="Menlo" panose="020B0609030804020204" pitchFamily="49" charset="0"/>
+              </a:rPr>
+              <a:t>)</a:t>
+            </a:r>
+            <a:r>
+              <a:rPr lang="en-US" b="1" dirty="0">
+                <a:solidFill>
+                  <a:srgbClr val="000000"/>
+                </a:solidFill>
+                <a:latin typeface="Menlo" panose="020B0609030804020204" pitchFamily="49" charset="0"/>
+              </a:rPr>
+              <a:t> </a:t>
+            </a:r>
+            <a:r>
+              <a:rPr lang="en-US" b="1" dirty="0">
+                <a:solidFill>
+                  <a:srgbClr val="7F0055"/>
+                </a:solidFill>
+                <a:latin typeface="Menlo" panose="020B0609030804020204" pitchFamily="49" charset="0"/>
+              </a:rPr>
+              <a:t>and</a:t>
+            </a:r>
+            <a:r>
+              <a:rPr lang="en-US" b="1" dirty="0">
+                <a:solidFill>
+                  <a:srgbClr val="000000"/>
+                </a:solidFill>
+                <a:latin typeface="Menlo" panose="020B0609030804020204" pitchFamily="49" charset="0"/>
+              </a:rPr>
+              <a:t> SW</a:t>
+            </a:r>
+            <a:r>
+              <a:rPr lang="en-US" b="1" dirty="0">
+                <a:solidFill>
+                  <a:srgbClr val="7F0055"/>
+                </a:solidFill>
+                <a:latin typeface="Menlo" panose="020B0609030804020204" pitchFamily="49" charset="0"/>
+              </a:rPr>
+              <a:t>::</a:t>
+            </a:r>
+            <a:r>
+              <a:rPr lang="en-US" b="1" dirty="0">
+                <a:solidFill>
+                  <a:srgbClr val="000000"/>
+                </a:solidFill>
+                <a:latin typeface="Menlo" panose="020B0609030804020204" pitchFamily="49" charset="0"/>
+              </a:rPr>
+              <a:t>WELL_FORMED_MESSAGE</a:t>
+            </a:r>
+            <a:r>
+              <a:rPr lang="en-US" b="1" dirty="0">
+                <a:solidFill>
+                  <a:srgbClr val="7F0055"/>
+                </a:solidFill>
+                <a:latin typeface="Menlo" panose="020B0609030804020204" pitchFamily="49" charset="0"/>
+              </a:rPr>
+              <a:t>(</a:t>
+            </a:r>
+            <a:r>
+              <a:rPr lang="en-US" b="1" dirty="0" err="1">
+                <a:solidFill>
+                  <a:srgbClr val="000000"/>
+                </a:solidFill>
+                <a:latin typeface="Menlo" panose="020B0609030804020204" pitchFamily="49" charset="0"/>
+              </a:rPr>
+              <a:t>filter_out</a:t>
+            </a:r>
+            <a:r>
+              <a:rPr lang="en-US" b="1" dirty="0">
+                <a:solidFill>
+                  <a:srgbClr val="7F0055"/>
+                </a:solidFill>
+                <a:latin typeface="Menlo" panose="020B0609030804020204" pitchFamily="49" charset="0"/>
+              </a:rPr>
+              <a:t>))</a:t>
+            </a:r>
+            <a:r>
+              <a:rPr lang="en-US" b="1" dirty="0">
+                <a:solidFill>
+                  <a:srgbClr val="000000"/>
+                </a:solidFill>
+                <a:latin typeface="Menlo" panose="020B0609030804020204" pitchFamily="49" charset="0"/>
+              </a:rPr>
+              <a:t> </a:t>
+            </a:r>
+            <a:r>
+              <a:rPr lang="en-US" b="1" dirty="0">
+                <a:solidFill>
+                  <a:srgbClr val="7F0055"/>
+                </a:solidFill>
+                <a:latin typeface="Menlo" panose="020B0609030804020204" pitchFamily="49" charset="0"/>
+              </a:rPr>
+              <a:t>=&gt;</a:t>
+            </a:r>
+            <a:r>
+              <a:rPr lang="en-US" b="1" dirty="0">
+                <a:solidFill>
+                  <a:srgbClr val="000000"/>
+                </a:solidFill>
+                <a:latin typeface="Menlo" panose="020B0609030804020204" pitchFamily="49" charset="0"/>
+              </a:rPr>
+              <a:t> </a:t>
+            </a:r>
             <a:endParaRPr lang="en-US" b="1" dirty="0">
               <a:solidFill>
                 <a:srgbClr val="7F0055"/>
@@ -9032,192 +9599,20 @@
             <a:r>
               <a:rPr lang="en-US" b="1" dirty="0">
                 <a:solidFill>
-                  <a:srgbClr val="7F0055"/>
-                </a:solidFill>
-                <a:latin typeface="Menlo" panose="020B0609030804020204" pitchFamily="49" charset="0"/>
-              </a:rPr>
-              <a:t>guarantee</a:t>
-            </a:r>
-            <a:r>
-              <a:rPr lang="en-US" b="1" dirty="0">
-                <a:solidFill>
-                  <a:srgbClr val="000000"/>
-                </a:solidFill>
-                <a:latin typeface="Menlo" panose="020B0609030804020204" pitchFamily="49" charset="0"/>
-              </a:rPr>
-              <a:t> SW_FLT_Req001_FLT </a:t>
-            </a:r>
-          </a:p>
-          <a:p>
-            <a:r>
-              <a:rPr lang="en-US" b="1" dirty="0">
-                <a:solidFill>
-                  <a:srgbClr val="2A00FF"/>
-                </a:solidFill>
-                <a:latin typeface="Menlo" panose="020B0609030804020204" pitchFamily="49" charset="0"/>
-              </a:rPr>
-              <a:t>  "Only well-formed messages shall be forwarded to message destination"</a:t>
-            </a:r>
-            <a:r>
-              <a:rPr lang="en-US" b="1" dirty="0">
-                <a:solidFill>
-                  <a:srgbClr val="7F0055"/>
-                </a:solidFill>
-                <a:latin typeface="Menlo" panose="020B0609030804020204" pitchFamily="49" charset="0"/>
-              </a:rPr>
-              <a:t>:</a:t>
-            </a:r>
-            <a:endParaRPr lang="en-US" b="1" dirty="0">
-              <a:solidFill>
-                <a:srgbClr val="000000"/>
-              </a:solidFill>
-              <a:latin typeface="Menlo" panose="020B0609030804020204" pitchFamily="49" charset="0"/>
-            </a:endParaRPr>
-          </a:p>
-          <a:p>
-            <a:r>
-              <a:rPr lang="en-US" b="1" dirty="0">
-                <a:solidFill>
-                  <a:srgbClr val="000000"/>
-                </a:solidFill>
-                <a:latin typeface="Menlo" panose="020B0609030804020204" pitchFamily="49" charset="0"/>
-              </a:rPr>
-              <a:t>  SW</a:t>
-            </a:r>
-            <a:r>
-              <a:rPr lang="en-US" b="1" dirty="0">
-                <a:solidFill>
-                  <a:srgbClr val="7F0055"/>
-                </a:solidFill>
-                <a:latin typeface="Menlo" panose="020B0609030804020204" pitchFamily="49" charset="0"/>
-              </a:rPr>
-              <a:t>::</a:t>
-            </a:r>
-            <a:r>
-              <a:rPr lang="en-US" b="1" dirty="0">
-                <a:solidFill>
-                  <a:srgbClr val="000000"/>
-                </a:solidFill>
-                <a:latin typeface="Menlo" panose="020B0609030804020204" pitchFamily="49" charset="0"/>
-              </a:rPr>
-              <a:t>WELL_FORMED_MESSAGE</a:t>
-            </a:r>
-            <a:r>
-              <a:rPr lang="en-US" b="1" dirty="0">
-                <a:solidFill>
-                  <a:srgbClr val="7F0055"/>
-                </a:solidFill>
-                <a:latin typeface="Menlo" panose="020B0609030804020204" pitchFamily="49" charset="0"/>
-              </a:rPr>
-              <a:t>(</a:t>
-            </a:r>
-            <a:r>
-              <a:rPr lang="en-US" b="1" dirty="0" err="1">
-                <a:solidFill>
-                  <a:srgbClr val="000000"/>
-                </a:solidFill>
-                <a:latin typeface="Menlo" panose="020B0609030804020204" pitchFamily="49" charset="0"/>
-              </a:rPr>
-              <a:t>filter_in</a:t>
-            </a:r>
-            <a:r>
-              <a:rPr lang="en-US" b="1" dirty="0">
-                <a:solidFill>
-                  <a:srgbClr val="7F0055"/>
-                </a:solidFill>
-                <a:latin typeface="Menlo" panose="020B0609030804020204" pitchFamily="49" charset="0"/>
-              </a:rPr>
-              <a:t>)</a:t>
-            </a:r>
-            <a:r>
-              <a:rPr lang="en-US" b="1" dirty="0">
-                <a:solidFill>
-                  <a:srgbClr val="000000"/>
-                </a:solidFill>
-                <a:latin typeface="Menlo" panose="020B0609030804020204" pitchFamily="49" charset="0"/>
-              </a:rPr>
-              <a:t> </a:t>
-            </a:r>
-            <a:r>
-              <a:rPr lang="en-US" b="1" dirty="0">
-                <a:solidFill>
-                  <a:srgbClr val="7F0055"/>
-                </a:solidFill>
-                <a:latin typeface="Menlo" panose="020B0609030804020204" pitchFamily="49" charset="0"/>
-              </a:rPr>
-              <a:t>=&gt;</a:t>
-            </a:r>
-            <a:r>
-              <a:rPr lang="en-US" b="1" dirty="0">
-                <a:solidFill>
-                  <a:srgbClr val="000000"/>
-                </a:solidFill>
-                <a:latin typeface="Menlo" panose="020B0609030804020204" pitchFamily="49" charset="0"/>
-              </a:rPr>
-              <a:t> </a:t>
-            </a:r>
-            <a:r>
-              <a:rPr lang="en-US" b="1" dirty="0">
-                <a:solidFill>
-                  <a:srgbClr val="7F0055"/>
-                </a:solidFill>
-                <a:latin typeface="Menlo" panose="020B0609030804020204" pitchFamily="49" charset="0"/>
-              </a:rPr>
-              <a:t>(</a:t>
-            </a:r>
-            <a:r>
-              <a:rPr lang="en-US" b="1" dirty="0" err="1">
-                <a:solidFill>
-                  <a:srgbClr val="000000"/>
-                </a:solidFill>
-                <a:latin typeface="Menlo" panose="020B0609030804020204" pitchFamily="49" charset="0"/>
-              </a:rPr>
-              <a:t>filter_out</a:t>
-            </a:r>
-            <a:r>
-              <a:rPr lang="en-US" b="1" dirty="0">
-                <a:solidFill>
-                  <a:srgbClr val="000000"/>
-                </a:solidFill>
-                <a:latin typeface="Menlo" panose="020B0609030804020204" pitchFamily="49" charset="0"/>
-              </a:rPr>
-              <a:t> </a:t>
-            </a:r>
-            <a:r>
-              <a:rPr lang="en-US" b="1" dirty="0">
-                <a:solidFill>
-                  <a:srgbClr val="7F0055"/>
-                </a:solidFill>
-                <a:latin typeface="Menlo" panose="020B0609030804020204" pitchFamily="49" charset="0"/>
-              </a:rPr>
-              <a:t>=</a:t>
-            </a:r>
-            <a:r>
-              <a:rPr lang="en-US" b="1" dirty="0">
-                <a:solidFill>
-                  <a:srgbClr val="000000"/>
-                </a:solidFill>
-                <a:latin typeface="Menlo" panose="020B0609030804020204" pitchFamily="49" charset="0"/>
-              </a:rPr>
-              <a:t> </a:t>
-            </a:r>
-            <a:r>
-              <a:rPr lang="en-US" b="1" dirty="0" err="1">
-                <a:solidFill>
-                  <a:srgbClr val="000000"/>
-                </a:solidFill>
-                <a:latin typeface="Menlo" panose="020B0609030804020204" pitchFamily="49" charset="0"/>
-              </a:rPr>
-              <a:t>filter_in</a:t>
-            </a:r>
-            <a:r>
-              <a:rPr lang="en-US" b="1" dirty="0">
-                <a:solidFill>
-                  <a:srgbClr val="7F0055"/>
-                </a:solidFill>
-                <a:latin typeface="Menlo" panose="020B0609030804020204" pitchFamily="49" charset="0"/>
-              </a:rPr>
-              <a:t>);</a:t>
+                  <a:srgbClr val="000000"/>
+                </a:solidFill>
+                <a:latin typeface="Menlo" panose="020B0609030804020204" pitchFamily="49" charset="0"/>
+              </a:rPr>
+              <a:t>  </a:t>
+            </a:r>
+            <a:r>
+              <a:rPr lang="en-US" b="1" dirty="0">
+                <a:solidFill>
+                  <a:srgbClr val="3F7F5F"/>
+                </a:solidFill>
+                <a:latin typeface="Menlo" panose="020B0609030804020204" pitchFamily="49" charset="0"/>
+              </a:rPr>
+              <a:t>-- What should this be? </a:t>
             </a:r>
             <a:endParaRPr lang="en-US" dirty="0"/>
           </a:p>
@@ -9527,8 +9922,8 @@
         </p:nvSpPr>
         <p:spPr>
           <a:xfrm>
-            <a:off x="3075397" y="3960100"/>
-            <a:ext cx="6575460" cy="523220"/>
+            <a:off x="994880" y="3390057"/>
+            <a:ext cx="10202239" cy="523220"/>
           </a:xfrm>
           <a:prstGeom prst="rect">
             <a:avLst/>
@@ -9544,7 +9939,7 @@
             <a:pPr algn="ctr"/>
             <a:r>
               <a:rPr lang="en-US" sz="2800" b="1" dirty="0"/>
-              <a:t>Events Needed (does not pass AGREE)</a:t>
+              <a:t>Events or Stream Initialization Needed</a:t>
             </a:r>
           </a:p>
         </p:txBody>

</xml_diff>

<commit_message>
Add vacuity discussion on events
</commit_message>
<xml_diff>
--- a/TA2/AGREE_event_ports/agree_event_semantics.pptx
+++ b/TA2/AGREE_event_ports/agree_event_semantics.pptx
@@ -5,7 +5,7 @@
     <p:sldMasterId id="2147483648" r:id="rId1"/>
   </p:sldMasterIdLst>
   <p:notesMasterIdLst>
-    <p:notesMasterId r:id="rId18"/>
+    <p:notesMasterId r:id="rId21"/>
   </p:notesMasterIdLst>
   <p:sldIdLst>
     <p:sldId id="256" r:id="rId2"/>
@@ -19,11 +19,14 @@
     <p:sldId id="267" r:id="rId10"/>
     <p:sldId id="268" r:id="rId11"/>
     <p:sldId id="269" r:id="rId12"/>
-    <p:sldId id="271" r:id="rId13"/>
-    <p:sldId id="263" r:id="rId14"/>
-    <p:sldId id="264" r:id="rId15"/>
-    <p:sldId id="265" r:id="rId16"/>
-    <p:sldId id="266" r:id="rId17"/>
+    <p:sldId id="272" r:id="rId13"/>
+    <p:sldId id="271" r:id="rId14"/>
+    <p:sldId id="273" r:id="rId15"/>
+    <p:sldId id="274" r:id="rId16"/>
+    <p:sldId id="263" r:id="rId17"/>
+    <p:sldId id="264" r:id="rId18"/>
+    <p:sldId id="265" r:id="rId19"/>
+    <p:sldId id="266" r:id="rId20"/>
   </p:sldIdLst>
   <p:sldSz cx="12192000" cy="6858000"/>
   <p:notesSz cx="6858000" cy="9144000"/>
@@ -574,6 +577,184 @@
 </p:notes>
 </file>
 
+<file path=ppt/notesSlides/notesSlide10.xml><?xml version="1.0" encoding="utf-8"?>
+<p:notes xmlns:a="http://schemas.openxmlformats.org/drawingml/2006/main" xmlns:r="http://schemas.openxmlformats.org/officeDocument/2006/relationships" xmlns:p="http://schemas.openxmlformats.org/presentationml/2006/main">
+  <p:cSld>
+    <p:spTree>
+      <p:nvGrpSpPr>
+        <p:cNvPr id="1" name=""/>
+        <p:cNvGrpSpPr/>
+        <p:nvPr/>
+      </p:nvGrpSpPr>
+      <p:grpSpPr>
+        <a:xfrm>
+          <a:off x="0" y="0"/>
+          <a:ext cx="0" cy="0"/>
+          <a:chOff x="0" y="0"/>
+          <a:chExt cx="0" cy="0"/>
+        </a:xfrm>
+      </p:grpSpPr>
+      <p:sp>
+        <p:nvSpPr>
+          <p:cNvPr id="2" name="Slide Image Placeholder 1"/>
+          <p:cNvSpPr>
+            <a:spLocks noGrp="1" noRot="1" noChangeAspect="1"/>
+          </p:cNvSpPr>
+          <p:nvPr>
+            <p:ph type="sldImg"/>
+          </p:nvPr>
+        </p:nvSpPr>
+        <p:spPr/>
+      </p:sp>
+      <p:sp>
+        <p:nvSpPr>
+          <p:cNvPr id="3" name="Notes Placeholder 2"/>
+          <p:cNvSpPr>
+            <a:spLocks noGrp="1"/>
+          </p:cNvSpPr>
+          <p:nvPr>
+            <p:ph type="body" idx="1"/>
+          </p:nvPr>
+        </p:nvSpPr>
+        <p:spPr/>
+        <p:txBody>
+          <a:bodyPr/>
+          <a:lstStyle/>
+          <a:p>
+            <a:pPr marL="0" indent="0">
+              <a:buNone/>
+            </a:pPr>
+            <a:r>
+              <a:rPr lang="en-US" dirty="0"/>
+              <a:t>The formal semantics would enable us to</a:t>
+            </a:r>
+          </a:p>
+          <a:p>
+            <a:pPr marL="228600" indent="-228600">
+              <a:buAutoNum type="arabicPeriod"/>
+            </a:pPr>
+            <a:endParaRPr lang="en-US" dirty="0"/>
+          </a:p>
+          <a:p>
+            <a:pPr marL="228600" indent="-228600">
+              <a:buAutoNum type="arabicPeriod"/>
+            </a:pPr>
+            <a:r>
+              <a:rPr lang="en-US" dirty="0"/>
+              <a:t>Verify that </a:t>
+            </a:r>
+            <a:r>
+              <a:rPr lang="en-US" dirty="0" err="1"/>
+              <a:t>Filter.Impl</a:t>
+            </a:r>
+            <a:r>
+              <a:rPr lang="en-US" dirty="0"/>
+              <a:t> satisfies the Filter contract</a:t>
+            </a:r>
+          </a:p>
+          <a:p>
+            <a:pPr marL="228600" indent="-228600">
+              <a:buAutoNum type="arabicPeriod"/>
+            </a:pPr>
+            <a:r>
+              <a:rPr lang="en-US" dirty="0"/>
+              <a:t>Compile </a:t>
+            </a:r>
+            <a:r>
+              <a:rPr lang="en-US" dirty="0" err="1"/>
+              <a:t>Filter.Impl</a:t>
+            </a:r>
+            <a:r>
+              <a:rPr lang="en-US" dirty="0"/>
+              <a:t> down to actual code for the filter</a:t>
+            </a:r>
+          </a:p>
+          <a:p>
+            <a:pPr marL="228600" indent="-228600">
+              <a:buAutoNum type="arabicPeriod"/>
+            </a:pPr>
+            <a:endParaRPr lang="en-US" dirty="0"/>
+          </a:p>
+          <a:p>
+            <a:pPr marL="171450" indent="-171450">
+              <a:buFont typeface="Arial" panose="020B0604020202020204" pitchFamily="34" charset="0"/>
+              <a:buChar char="•"/>
+            </a:pPr>
+            <a:r>
+              <a:rPr lang="en-US" dirty="0"/>
+              <a:t>AGREE is a simple language…</a:t>
+            </a:r>
+          </a:p>
+          <a:p>
+            <a:pPr marL="171450" indent="-171450">
+              <a:buFont typeface="Arial" panose="020B0604020202020204" pitchFamily="34" charset="0"/>
+              <a:buChar char="•"/>
+            </a:pPr>
+            <a:r>
+              <a:rPr lang="en-US" dirty="0"/>
+              <a:t>Would need to give more control to specifying output event behavior in the implementation.</a:t>
+            </a:r>
+          </a:p>
+          <a:p>
+            <a:pPr marL="171450" indent="-171450">
+              <a:buFont typeface="Arial" panose="020B0604020202020204" pitchFamily="34" charset="0"/>
+              <a:buChar char="•"/>
+            </a:pPr>
+            <a:r>
+              <a:rPr lang="en-US" dirty="0"/>
+              <a:t>Would need something more than contracts to indicate the implementation does more than just meet the contract---liveness maybe?</a:t>
+            </a:r>
+          </a:p>
+          <a:p>
+            <a:pPr marL="0" indent="0">
+              <a:buNone/>
+            </a:pPr>
+            <a:endParaRPr lang="en-US" dirty="0"/>
+          </a:p>
+          <a:p>
+            <a:pPr marL="0" indent="0">
+              <a:buNone/>
+            </a:pPr>
+            <a:endParaRPr lang="en-US" dirty="0"/>
+          </a:p>
+        </p:txBody>
+      </p:sp>
+      <p:sp>
+        <p:nvSpPr>
+          <p:cNvPr id="4" name="Slide Number Placeholder 3"/>
+          <p:cNvSpPr>
+            <a:spLocks noGrp="1"/>
+          </p:cNvSpPr>
+          <p:nvPr>
+            <p:ph type="sldNum" sz="quarter" idx="5"/>
+          </p:nvPr>
+        </p:nvSpPr>
+        <p:spPr/>
+        <p:txBody>
+          <a:bodyPr/>
+          <a:lstStyle/>
+          <a:p>
+            <a:fld id="{B222266E-AA87-A247-8974-081C5A3E2A21}" type="slidenum">
+              <a:rPr lang="en-US" smtClean="0"/>
+              <a:t>18</a:t>
+            </a:fld>
+            <a:endParaRPr lang="en-US"/>
+          </a:p>
+        </p:txBody>
+      </p:sp>
+    </p:spTree>
+    <p:extLst>
+      <p:ext uri="{BB962C8B-B14F-4D97-AF65-F5344CB8AC3E}">
+        <p14:creationId xmlns:p14="http://schemas.microsoft.com/office/powerpoint/2010/main" val="3600316576"/>
+      </p:ext>
+    </p:extLst>
+  </p:cSld>
+  <p:clrMapOvr>
+    <a:masterClrMapping/>
+  </p:clrMapOvr>
+</p:notes>
+</file>
+
 <file path=ppt/notesSlides/notesSlide2.xml><?xml version="1.0" encoding="utf-8"?>
 <p:notes xmlns:a="http://schemas.openxmlformats.org/drawingml/2006/main" xmlns:r="http://schemas.openxmlformats.org/officeDocument/2006/relationships" xmlns:p="http://schemas.openxmlformats.org/presentationml/2006/main">
   <p:cSld>
@@ -1119,100 +1300,21 @@
           <a:bodyPr/>
           <a:lstStyle/>
           <a:p>
-            <a:pPr marL="0" indent="0">
-              <a:buNone/>
-            </a:pPr>
             <a:r>
               <a:rPr lang="en-US" dirty="0"/>
-              <a:t>The formal semantics would enable us to</a:t>
-            </a:r>
-          </a:p>
-          <a:p>
-            <a:pPr marL="228600" indent="-228600">
-              <a:buAutoNum type="arabicPeriod"/>
-            </a:pPr>
+              <a:t>Write contract that fires no output event: trigger condition is always false.</a:t>
+            </a:r>
+          </a:p>
+          <a:p>
             <a:endParaRPr lang="en-US" dirty="0"/>
           </a:p>
           <a:p>
-            <a:pPr marL="228600" indent="-228600">
-              <a:buAutoNum type="arabicPeriod"/>
-            </a:pPr>
             <a:r>
               <a:rPr lang="en-US" dirty="0"/>
-              <a:t>Verify that </a:t>
-            </a:r>
-            <a:r>
-              <a:rPr lang="en-US" dirty="0" err="1"/>
-              <a:t>Filter.Impl</a:t>
-            </a:r>
-            <a:r>
-              <a:rPr lang="en-US" dirty="0"/>
-              <a:t> satisfies the Filter contract</a:t>
-            </a:r>
-          </a:p>
-          <a:p>
-            <a:pPr marL="228600" indent="-228600">
-              <a:buAutoNum type="arabicPeriod"/>
-            </a:pPr>
-            <a:r>
-              <a:rPr lang="en-US" dirty="0"/>
-              <a:t>Compile </a:t>
-            </a:r>
-            <a:r>
-              <a:rPr lang="en-US" dirty="0" err="1"/>
-              <a:t>Filter.Impl</a:t>
-            </a:r>
-            <a:r>
-              <a:rPr lang="en-US" dirty="0"/>
-              <a:t> down to actual code for the filter</a:t>
-            </a:r>
-          </a:p>
-          <a:p>
-            <a:pPr marL="228600" indent="-228600">
-              <a:buAutoNum type="arabicPeriod"/>
-            </a:pPr>
-            <a:endParaRPr lang="en-US" dirty="0"/>
-          </a:p>
-          <a:p>
-            <a:pPr marL="171450" indent="-171450">
-              <a:buFont typeface="Arial" panose="020B0604020202020204" pitchFamily="34" charset="0"/>
-              <a:buChar char="•"/>
-            </a:pPr>
-            <a:r>
-              <a:rPr lang="en-US" dirty="0"/>
-              <a:t>AGREE is a simple language…</a:t>
-            </a:r>
-          </a:p>
-          <a:p>
-            <a:pPr marL="171450" indent="-171450">
-              <a:buFont typeface="Arial" panose="020B0604020202020204" pitchFamily="34" charset="0"/>
-              <a:buChar char="•"/>
-            </a:pPr>
-            <a:r>
-              <a:rPr lang="en-US" dirty="0"/>
-              <a:t>Would need to give more control to specifying output event behavior in the implementation.</a:t>
-            </a:r>
-          </a:p>
-          <a:p>
-            <a:pPr marL="171450" indent="-171450">
-              <a:buFont typeface="Arial" panose="020B0604020202020204" pitchFamily="34" charset="0"/>
-              <a:buChar char="•"/>
-            </a:pPr>
-            <a:r>
-              <a:rPr lang="en-US" dirty="0"/>
-              <a:t>Would need something more than contracts to indicate the implementation does more than just meet the contract---liveness maybe?</a:t>
-            </a:r>
-          </a:p>
-          <a:p>
-            <a:pPr marL="0" indent="0">
-              <a:buNone/>
-            </a:pPr>
-            <a:endParaRPr lang="en-US" dirty="0"/>
-          </a:p>
-          <a:p>
-            <a:pPr marL="0" indent="0">
-              <a:buNone/>
-            </a:pPr>
+              <a:t>Look at the contract semantics to see if it is possible to have an always false trigger condition. If yes, then how would it be verified? Does consistency catch it?</a:t>
+            </a:r>
+          </a:p>
+          <a:p>
             <a:endParaRPr lang="en-US" dirty="0"/>
           </a:p>
         </p:txBody>
@@ -1234,7 +1336,7 @@
           <a:p>
             <a:fld id="{B222266E-AA87-A247-8974-081C5A3E2A21}" type="slidenum">
               <a:rPr lang="en-US" smtClean="0"/>
-              <a:t>15</a:t>
+              <a:t>13</a:t>
             </a:fld>
             <a:endParaRPr lang="en-US"/>
           </a:p>
@@ -1243,7 +1345,194 @@
     </p:spTree>
     <p:extLst>
       <p:ext uri="{BB962C8B-B14F-4D97-AF65-F5344CB8AC3E}">
-        <p14:creationId xmlns:p14="http://schemas.microsoft.com/office/powerpoint/2010/main" val="3600316576"/>
+        <p14:creationId xmlns:p14="http://schemas.microsoft.com/office/powerpoint/2010/main" val="3819880797"/>
+      </p:ext>
+    </p:extLst>
+  </p:cSld>
+  <p:clrMapOvr>
+    <a:masterClrMapping/>
+  </p:clrMapOvr>
+</p:notes>
+</file>
+
+<file path=ppt/notesSlides/notesSlide8.xml><?xml version="1.0" encoding="utf-8"?>
+<p:notes xmlns:a="http://schemas.openxmlformats.org/drawingml/2006/main" xmlns:r="http://schemas.openxmlformats.org/officeDocument/2006/relationships" xmlns:p="http://schemas.openxmlformats.org/presentationml/2006/main">
+  <p:cSld>
+    <p:spTree>
+      <p:nvGrpSpPr>
+        <p:cNvPr id="1" name=""/>
+        <p:cNvGrpSpPr/>
+        <p:nvPr/>
+      </p:nvGrpSpPr>
+      <p:grpSpPr>
+        <a:xfrm>
+          <a:off x="0" y="0"/>
+          <a:ext cx="0" cy="0"/>
+          <a:chOff x="0" y="0"/>
+          <a:chExt cx="0" cy="0"/>
+        </a:xfrm>
+      </p:grpSpPr>
+      <p:sp>
+        <p:nvSpPr>
+          <p:cNvPr id="2" name="Slide Image Placeholder 1"/>
+          <p:cNvSpPr>
+            <a:spLocks noGrp="1" noRot="1" noChangeAspect="1"/>
+          </p:cNvSpPr>
+          <p:nvPr>
+            <p:ph type="sldImg"/>
+          </p:nvPr>
+        </p:nvSpPr>
+        <p:spPr/>
+      </p:sp>
+      <p:sp>
+        <p:nvSpPr>
+          <p:cNvPr id="3" name="Notes Placeholder 2"/>
+          <p:cNvSpPr>
+            <a:spLocks noGrp="1"/>
+          </p:cNvSpPr>
+          <p:nvPr>
+            <p:ph type="body" idx="1"/>
+          </p:nvPr>
+        </p:nvSpPr>
+        <p:spPr/>
+        <p:txBody>
+          <a:bodyPr/>
+          <a:lstStyle/>
+          <a:p>
+            <a:r>
+              <a:rPr lang="en-US" dirty="0"/>
+              <a:t>See Vacuity::</a:t>
+            </a:r>
+            <a:r>
+              <a:rPr lang="en-US" dirty="0" err="1"/>
+              <a:t>Sys.NoEvent</a:t>
+            </a:r>
+            <a:endParaRPr lang="en-US" dirty="0"/>
+          </a:p>
+        </p:txBody>
+      </p:sp>
+      <p:sp>
+        <p:nvSpPr>
+          <p:cNvPr id="4" name="Slide Number Placeholder 3"/>
+          <p:cNvSpPr>
+            <a:spLocks noGrp="1"/>
+          </p:cNvSpPr>
+          <p:nvPr>
+            <p:ph type="sldNum" sz="quarter" idx="5"/>
+          </p:nvPr>
+        </p:nvSpPr>
+        <p:spPr/>
+        <p:txBody>
+          <a:bodyPr/>
+          <a:lstStyle/>
+          <a:p>
+            <a:fld id="{B222266E-AA87-A247-8974-081C5A3E2A21}" type="slidenum">
+              <a:rPr lang="en-US" smtClean="0"/>
+              <a:t>14</a:t>
+            </a:fld>
+            <a:endParaRPr lang="en-US"/>
+          </a:p>
+        </p:txBody>
+      </p:sp>
+    </p:spTree>
+    <p:extLst>
+      <p:ext uri="{BB962C8B-B14F-4D97-AF65-F5344CB8AC3E}">
+        <p14:creationId xmlns:p14="http://schemas.microsoft.com/office/powerpoint/2010/main" val="1303651242"/>
+      </p:ext>
+    </p:extLst>
+  </p:cSld>
+  <p:clrMapOvr>
+    <a:masterClrMapping/>
+  </p:clrMapOvr>
+</p:notes>
+</file>
+
+<file path=ppt/notesSlides/notesSlide9.xml><?xml version="1.0" encoding="utf-8"?>
+<p:notes xmlns:a="http://schemas.openxmlformats.org/drawingml/2006/main" xmlns:r="http://schemas.openxmlformats.org/officeDocument/2006/relationships" xmlns:p="http://schemas.openxmlformats.org/presentationml/2006/main">
+  <p:cSld>
+    <p:spTree>
+      <p:nvGrpSpPr>
+        <p:cNvPr id="1" name=""/>
+        <p:cNvGrpSpPr/>
+        <p:nvPr/>
+      </p:nvGrpSpPr>
+      <p:grpSpPr>
+        <a:xfrm>
+          <a:off x="0" y="0"/>
+          <a:ext cx="0" cy="0"/>
+          <a:chOff x="0" y="0"/>
+          <a:chExt cx="0" cy="0"/>
+        </a:xfrm>
+      </p:grpSpPr>
+      <p:sp>
+        <p:nvSpPr>
+          <p:cNvPr id="2" name="Slide Image Placeholder 1"/>
+          <p:cNvSpPr>
+            <a:spLocks noGrp="1" noRot="1" noChangeAspect="1"/>
+          </p:cNvSpPr>
+          <p:nvPr>
+            <p:ph type="sldImg"/>
+          </p:nvPr>
+        </p:nvSpPr>
+        <p:spPr/>
+      </p:sp>
+      <p:sp>
+        <p:nvSpPr>
+          <p:cNvPr id="3" name="Notes Placeholder 2"/>
+          <p:cNvSpPr>
+            <a:spLocks noGrp="1"/>
+          </p:cNvSpPr>
+          <p:nvPr>
+            <p:ph type="body" idx="1"/>
+          </p:nvPr>
+        </p:nvSpPr>
+        <p:spPr/>
+        <p:txBody>
+          <a:bodyPr/>
+          <a:lstStyle/>
+          <a:p>
+            <a:r>
+              <a:rPr lang="en-US" dirty="0"/>
+              <a:t>See Vacuity::</a:t>
+            </a:r>
+            <a:r>
+              <a:rPr lang="en-US" dirty="0" err="1"/>
+              <a:t>Sys.Toggles</a:t>
+            </a:r>
+            <a:r>
+              <a:rPr lang="en-US" dirty="0"/>
+              <a:t>.</a:t>
+            </a:r>
+          </a:p>
+        </p:txBody>
+      </p:sp>
+      <p:sp>
+        <p:nvSpPr>
+          <p:cNvPr id="4" name="Slide Number Placeholder 3"/>
+          <p:cNvSpPr>
+            <a:spLocks noGrp="1"/>
+          </p:cNvSpPr>
+          <p:nvPr>
+            <p:ph type="sldNum" sz="quarter" idx="5"/>
+          </p:nvPr>
+        </p:nvSpPr>
+        <p:spPr/>
+        <p:txBody>
+          <a:bodyPr/>
+          <a:lstStyle/>
+          <a:p>
+            <a:fld id="{B222266E-AA87-A247-8974-081C5A3E2A21}" type="slidenum">
+              <a:rPr lang="en-US" smtClean="0"/>
+              <a:t>15</a:t>
+            </a:fld>
+            <a:endParaRPr lang="en-US"/>
+          </a:p>
+        </p:txBody>
+      </p:sp>
+    </p:spTree>
+    <p:extLst>
+      <p:ext uri="{BB962C8B-B14F-4D97-AF65-F5344CB8AC3E}">
+        <p14:creationId xmlns:p14="http://schemas.microsoft.com/office/powerpoint/2010/main" val="608930013"/>
       </p:ext>
     </p:extLst>
   </p:cSld>
@@ -5612,6 +5901,14 @@
 <file path=ppt/slides/slide12.xml><?xml version="1.0" encoding="utf-8"?>
 <p:sld xmlns:a="http://schemas.openxmlformats.org/drawingml/2006/main" xmlns:r="http://schemas.openxmlformats.org/officeDocument/2006/relationships" xmlns:p="http://schemas.openxmlformats.org/presentationml/2006/main">
   <p:cSld>
+    <p:bg>
+      <p:bgPr>
+        <a:solidFill>
+          <a:schemeClr val="bg1"/>
+        </a:solidFill>
+        <a:effectLst/>
+      </p:bgPr>
+    </p:bg>
     <p:spTree>
       <p:nvGrpSpPr>
         <p:cNvPr id="1" name=""/>
@@ -5628,10 +5925,140 @@
       </p:grpSpPr>
       <p:sp>
         <p:nvSpPr>
+          <p:cNvPr id="7" name="Rectangle 6">
+            <a:extLst>
+              <a:ext uri="{FF2B5EF4-FFF2-40B4-BE49-F238E27FC236}">
+                <a16:creationId xmlns:a16="http://schemas.microsoft.com/office/drawing/2014/main" id="{23962611-DFD5-4092-AAFD-559E3DFCE2C9}"/>
+              </a:ext>
+              <a:ext uri="{C183D7F6-B498-43B3-948B-1728B52AA6E4}">
+                <adec:decorative xmlns:adec="http://schemas.microsoft.com/office/drawing/2017/decorative" val="1"/>
+              </a:ext>
+            </a:extLst>
+          </p:cNvPr>
+          <p:cNvSpPr>
+            <a:spLocks noGrp="1" noRot="1" noChangeAspect="1" noMove="1" noResize="1" noEditPoints="1" noAdjustHandles="1" noChangeArrowheads="1" noChangeShapeType="1" noTextEdit="1"/>
+          </p:cNvSpPr>
+          <p:nvPr>
+            <p:extLst>
+              <p:ext uri="{386F3935-93C4-4BCD-93E2-E3B085C9AB24}">
+                <p16:designElem xmlns:p16="http://schemas.microsoft.com/office/powerpoint/2015/main" val="1"/>
+              </p:ext>
+            </p:extLst>
+          </p:nvPr>
+        </p:nvSpPr>
+        <p:spPr>
+          <a:xfrm>
+            <a:off x="475488" y="0"/>
+            <a:ext cx="10910292" cy="6858000"/>
+          </a:xfrm>
+          <a:prstGeom prst="rect">
+            <a:avLst/>
+          </a:prstGeom>
+          <a:gradFill>
+            <a:gsLst>
+              <a:gs pos="0">
+                <a:schemeClr val="accent1">
+                  <a:lumMod val="90000"/>
+                </a:schemeClr>
+              </a:gs>
+              <a:gs pos="25000">
+                <a:schemeClr val="accent1">
+                  <a:lumMod val="90000"/>
+                </a:schemeClr>
+              </a:gs>
+              <a:gs pos="94000">
+                <a:schemeClr val="bg2">
+                  <a:lumMod val="25000"/>
+                </a:schemeClr>
+              </a:gs>
+              <a:gs pos="100000">
+                <a:schemeClr val="bg2">
+                  <a:lumMod val="25000"/>
+                </a:schemeClr>
+              </a:gs>
+            </a:gsLst>
+            <a:lin ang="4200000" scaled="0"/>
+          </a:gradFill>
+          <a:ln>
+            <a:noFill/>
+          </a:ln>
+        </p:spPr>
+        <p:style>
+          <a:lnRef idx="2">
+            <a:schemeClr val="accent1">
+              <a:shade val="50000"/>
+            </a:schemeClr>
+          </a:lnRef>
+          <a:fillRef idx="1">
+            <a:schemeClr val="accent1"/>
+          </a:fillRef>
+          <a:effectRef idx="0">
+            <a:schemeClr val="accent1"/>
+          </a:effectRef>
+          <a:fontRef idx="minor">
+            <a:schemeClr val="lt1"/>
+          </a:fontRef>
+        </p:style>
+        <p:txBody>
+          <a:bodyPr rtlCol="0" anchor="ctr"/>
+          <a:lstStyle/>
+          <a:p>
+            <a:pPr algn="ctr"/>
+            <a:endParaRPr lang="en-US"/>
+          </a:p>
+        </p:txBody>
+      </p:sp>
+      <p:pic>
+        <p:nvPicPr>
+          <p:cNvPr id="9" name="Picture 8">
+            <a:extLst>
+              <a:ext uri="{FF2B5EF4-FFF2-40B4-BE49-F238E27FC236}">
+                <a16:creationId xmlns:a16="http://schemas.microsoft.com/office/drawing/2014/main" id="{2270F1FA-0425-408F-9861-80BF5AFB276D}"/>
+              </a:ext>
+              <a:ext uri="{C183D7F6-B498-43B3-948B-1728B52AA6E4}">
+                <adec:decorative xmlns:adec="http://schemas.microsoft.com/office/drawing/2017/decorative" val="1"/>
+              </a:ext>
+            </a:extLst>
+          </p:cNvPr>
+          <p:cNvPicPr>
+            <a:picLocks noGrp="1" noRot="1" noChangeAspect="1" noMove="1" noResize="1" noEditPoints="1" noAdjustHandles="1" noChangeArrowheads="1" noChangeShapeType="1" noCrop="1"/>
+          </p:cNvPicPr>
+          <p:nvPr>
+            <p:extLst>
+              <p:ext uri="{386F3935-93C4-4BCD-93E2-E3B085C9AB24}">
+                <p16:designElem xmlns:p16="http://schemas.microsoft.com/office/powerpoint/2015/main" val="1"/>
+              </p:ext>
+            </p:extLst>
+          </p:nvPr>
+        </p:nvPicPr>
+        <p:blipFill>
+          <a:blip r:embed="rId2">
+            <a:extLst>
+              <a:ext uri="{28A0092B-C50C-407E-A947-70E740481C1C}">
+                <a14:useLocalDpi xmlns:a14="http://schemas.microsoft.com/office/drawing/2010/main" val="0"/>
+              </a:ext>
+            </a:extLst>
+          </a:blip>
+          <a:stretch>
+            <a:fillRect/>
+          </a:stretch>
+        </p:blipFill>
+        <p:spPr>
+          <a:xfrm>
+            <a:off x="0" y="0"/>
+            <a:ext cx="12192000" cy="6858000"/>
+          </a:xfrm>
+          <a:prstGeom prst="rect">
+            <a:avLst/>
+          </a:prstGeom>
+        </p:spPr>
+      </p:pic>
+      <p:sp>
+        <p:nvSpPr>
           <p:cNvPr id="2" name="Title 1">
             <a:extLst>
               <a:ext uri="{FF2B5EF4-FFF2-40B4-BE49-F238E27FC236}">
-                <a16:creationId xmlns:a16="http://schemas.microsoft.com/office/drawing/2014/main" id="{77E7C42D-3C30-8D4A-B00B-71EBFF16FD60}"/>
+                <a16:creationId xmlns:a16="http://schemas.microsoft.com/office/drawing/2014/main" id="{B713C460-CEC3-4141-8E30-B7F667C87BB7}"/>
               </a:ext>
             </a:extLst>
           </p:cNvPr>
@@ -5642,14 +6069,202 @@
             <p:ph type="title"/>
           </p:nvPr>
         </p:nvSpPr>
-        <p:spPr/>
+        <p:spPr>
+          <a:xfrm>
+            <a:off x="3045368" y="2043663"/>
+            <a:ext cx="6105194" cy="2031055"/>
+          </a:xfrm>
+        </p:spPr>
         <p:txBody>
-          <a:bodyPr/>
+          <a:bodyPr vert="horz" lIns="91440" tIns="45720" rIns="91440" bIns="45720" rtlCol="0" anchor="b">
+            <a:normAutofit/>
+          </a:bodyPr>
           <a:lstStyle/>
           <a:p>
+            <a:pPr algn="ctr"/>
+            <a:r>
+              <a:rPr lang="en-US" sz="6000" dirty="0">
+                <a:solidFill>
+                  <a:srgbClr val="FFFFFF"/>
+                </a:solidFill>
+              </a:rPr>
+              <a:t>If no events, does the contract hold?</a:t>
+            </a:r>
+            <a:endParaRPr lang="en-US" sz="6000" kern="1200" dirty="0">
+              <a:solidFill>
+                <a:srgbClr val="FFFFFF"/>
+              </a:solidFill>
+              <a:latin typeface="+mj-lt"/>
+              <a:ea typeface="+mj-ea"/>
+              <a:cs typeface="+mj-cs"/>
+            </a:endParaRPr>
+          </a:p>
+        </p:txBody>
+      </p:sp>
+    </p:spTree>
+    <p:extLst>
+      <p:ext uri="{BB962C8B-B14F-4D97-AF65-F5344CB8AC3E}">
+        <p14:creationId xmlns:p14="http://schemas.microsoft.com/office/powerpoint/2010/main" val="3302294626"/>
+      </p:ext>
+    </p:extLst>
+  </p:cSld>
+  <p:clrMapOvr>
+    <a:masterClrMapping/>
+  </p:clrMapOvr>
+</p:sld>
+</file>
+
+<file path=ppt/slides/slide13.xml><?xml version="1.0" encoding="utf-8"?>
+<p:sld xmlns:a="http://schemas.openxmlformats.org/drawingml/2006/main" xmlns:r="http://schemas.openxmlformats.org/officeDocument/2006/relationships" xmlns:p="http://schemas.openxmlformats.org/presentationml/2006/main">
+  <p:cSld>
+    <p:spTree>
+      <p:nvGrpSpPr>
+        <p:cNvPr id="1" name=""/>
+        <p:cNvGrpSpPr/>
+        <p:nvPr/>
+      </p:nvGrpSpPr>
+      <p:grpSpPr>
+        <a:xfrm>
+          <a:off x="0" y="0"/>
+          <a:ext cx="0" cy="0"/>
+          <a:chOff x="0" y="0"/>
+          <a:chExt cx="0" cy="0"/>
+        </a:xfrm>
+      </p:grpSpPr>
+      <p:pic>
+        <p:nvPicPr>
+          <p:cNvPr id="5" name="Picture 4">
+            <a:extLst>
+              <a:ext uri="{FF2B5EF4-FFF2-40B4-BE49-F238E27FC236}">
+                <a16:creationId xmlns:a16="http://schemas.microsoft.com/office/drawing/2014/main" id="{F6BA5B1B-5059-DE46-910E-290B74397F13}"/>
+              </a:ext>
+            </a:extLst>
+          </p:cNvPr>
+          <p:cNvPicPr>
+            <a:picLocks noChangeAspect="1"/>
+          </p:cNvPicPr>
+          <p:nvPr/>
+        </p:nvPicPr>
+        <p:blipFill>
+          <a:blip r:embed="rId3"/>
+          <a:stretch>
+            <a:fillRect/>
+          </a:stretch>
+        </p:blipFill>
+        <p:spPr>
+          <a:xfrm>
+            <a:off x="1010945" y="-277402"/>
+            <a:ext cx="10170109" cy="7738127"/>
+          </a:xfrm>
+          <a:prstGeom prst="rect">
+            <a:avLst/>
+          </a:prstGeom>
+        </p:spPr>
+      </p:pic>
+      <p:sp>
+        <p:nvSpPr>
+          <p:cNvPr id="9" name="Down Arrow Callout 8">
+            <a:extLst>
+              <a:ext uri="{FF2B5EF4-FFF2-40B4-BE49-F238E27FC236}">
+                <a16:creationId xmlns:a16="http://schemas.microsoft.com/office/drawing/2014/main" id="{2C8730CB-1F02-F440-8745-99394CE621AB}"/>
+              </a:ext>
+            </a:extLst>
+          </p:cNvPr>
+          <p:cNvSpPr/>
+          <p:nvPr/>
+        </p:nvSpPr>
+        <p:spPr>
+          <a:xfrm>
+            <a:off x="5808325" y="976044"/>
+            <a:ext cx="1979488" cy="482886"/>
+          </a:xfrm>
+          <a:prstGeom prst="downArrowCallout">
+            <a:avLst>
+              <a:gd name="adj1" fmla="val 13236"/>
+              <a:gd name="adj2" fmla="val 25000"/>
+              <a:gd name="adj3" fmla="val 25000"/>
+              <a:gd name="adj4" fmla="val 64977"/>
+            </a:avLst>
+          </a:prstGeom>
+        </p:spPr>
+        <p:style>
+          <a:lnRef idx="2">
+            <a:schemeClr val="accent1">
+              <a:shade val="50000"/>
+            </a:schemeClr>
+          </a:lnRef>
+          <a:fillRef idx="1">
+            <a:schemeClr val="accent1"/>
+          </a:fillRef>
+          <a:effectRef idx="0">
+            <a:schemeClr val="accent1"/>
+          </a:effectRef>
+          <a:fontRef idx="minor">
+            <a:schemeClr val="lt1"/>
+          </a:fontRef>
+        </p:style>
+        <p:txBody>
+          <a:bodyPr rtlCol="0" anchor="ctr"/>
+          <a:lstStyle/>
+          <a:p>
+            <a:pPr algn="ctr"/>
             <a:r>
               <a:rPr lang="en-US" dirty="0"/>
-              <a:t>Does AGREE Analysis Actually Fire an Event?</a:t>
+              <a:t>No output event</a:t>
+            </a:r>
+          </a:p>
+        </p:txBody>
+      </p:sp>
+      <p:sp>
+        <p:nvSpPr>
+          <p:cNvPr id="11" name="Down Arrow Callout 10">
+            <a:extLst>
+              <a:ext uri="{FF2B5EF4-FFF2-40B4-BE49-F238E27FC236}">
+                <a16:creationId xmlns:a16="http://schemas.microsoft.com/office/drawing/2014/main" id="{2C19806F-9153-F94A-8454-D7C8E098B2C7}"/>
+              </a:ext>
+            </a:extLst>
+          </p:cNvPr>
+          <p:cNvSpPr/>
+          <p:nvPr/>
+        </p:nvSpPr>
+        <p:spPr>
+          <a:xfrm>
+            <a:off x="7327188" y="2470933"/>
+            <a:ext cx="1979488" cy="482886"/>
+          </a:xfrm>
+          <a:prstGeom prst="downArrowCallout">
+            <a:avLst>
+              <a:gd name="adj1" fmla="val 13236"/>
+              <a:gd name="adj2" fmla="val 25000"/>
+              <a:gd name="adj3" fmla="val 25000"/>
+              <a:gd name="adj4" fmla="val 64977"/>
+            </a:avLst>
+          </a:prstGeom>
+        </p:spPr>
+        <p:style>
+          <a:lnRef idx="2">
+            <a:schemeClr val="accent1">
+              <a:shade val="50000"/>
+            </a:schemeClr>
+          </a:lnRef>
+          <a:fillRef idx="1">
+            <a:schemeClr val="accent1"/>
+          </a:fillRef>
+          <a:effectRef idx="0">
+            <a:schemeClr val="accent1"/>
+          </a:effectRef>
+          <a:fontRef idx="minor">
+            <a:schemeClr val="lt1"/>
+          </a:fontRef>
+        </p:style>
+        <p:txBody>
+          <a:bodyPr rtlCol="0" anchor="ctr"/>
+          <a:lstStyle/>
+          <a:p>
+            <a:pPr algn="ctr"/>
+            <a:r>
+              <a:rPr lang="en-US" dirty="0"/>
+              <a:t>Output high</a:t>
             </a:r>
           </a:p>
         </p:txBody>
@@ -5667,7 +6282,441 @@
 </p:sld>
 </file>
 
-<file path=ppt/slides/slide13.xml><?xml version="1.0" encoding="utf-8"?>
+<file path=ppt/slides/slide14.xml><?xml version="1.0" encoding="utf-8"?>
+<p:sld xmlns:a="http://schemas.openxmlformats.org/drawingml/2006/main" xmlns:r="http://schemas.openxmlformats.org/officeDocument/2006/relationships" xmlns:p="http://schemas.openxmlformats.org/presentationml/2006/main">
+  <p:cSld>
+    <p:spTree>
+      <p:nvGrpSpPr>
+        <p:cNvPr id="1" name=""/>
+        <p:cNvGrpSpPr/>
+        <p:nvPr/>
+      </p:nvGrpSpPr>
+      <p:grpSpPr>
+        <a:xfrm>
+          <a:off x="0" y="0"/>
+          <a:ext cx="0" cy="0"/>
+          <a:chOff x="0" y="0"/>
+          <a:chExt cx="0" cy="0"/>
+        </a:xfrm>
+      </p:grpSpPr>
+      <p:pic>
+        <p:nvPicPr>
+          <p:cNvPr id="3" name="Picture 2">
+            <a:extLst>
+              <a:ext uri="{FF2B5EF4-FFF2-40B4-BE49-F238E27FC236}">
+                <a16:creationId xmlns:a16="http://schemas.microsoft.com/office/drawing/2014/main" id="{414FC208-5FE8-394C-951F-4DC4D8D73355}"/>
+              </a:ext>
+            </a:extLst>
+          </p:cNvPr>
+          <p:cNvPicPr>
+            <a:picLocks noChangeAspect="1"/>
+          </p:cNvPicPr>
+          <p:nvPr/>
+        </p:nvPicPr>
+        <p:blipFill>
+          <a:blip r:embed="rId3"/>
+          <a:stretch>
+            <a:fillRect/>
+          </a:stretch>
+        </p:blipFill>
+        <p:spPr>
+          <a:xfrm>
+            <a:off x="1044663" y="-282185"/>
+            <a:ext cx="10113072" cy="7694729"/>
+          </a:xfrm>
+          <a:prstGeom prst="rect">
+            <a:avLst/>
+          </a:prstGeom>
+        </p:spPr>
+      </p:pic>
+      <p:sp>
+        <p:nvSpPr>
+          <p:cNvPr id="9" name="Down Arrow Callout 8">
+            <a:extLst>
+              <a:ext uri="{FF2B5EF4-FFF2-40B4-BE49-F238E27FC236}">
+                <a16:creationId xmlns:a16="http://schemas.microsoft.com/office/drawing/2014/main" id="{2C8730CB-1F02-F440-8745-99394CE621AB}"/>
+              </a:ext>
+            </a:extLst>
+          </p:cNvPr>
+          <p:cNvSpPr/>
+          <p:nvPr/>
+        </p:nvSpPr>
+        <p:spPr>
+          <a:xfrm>
+            <a:off x="5808325" y="976044"/>
+            <a:ext cx="1979488" cy="482886"/>
+          </a:xfrm>
+          <a:prstGeom prst="downArrowCallout">
+            <a:avLst>
+              <a:gd name="adj1" fmla="val 13236"/>
+              <a:gd name="adj2" fmla="val 25000"/>
+              <a:gd name="adj3" fmla="val 25000"/>
+              <a:gd name="adj4" fmla="val 64977"/>
+            </a:avLst>
+          </a:prstGeom>
+        </p:spPr>
+        <p:style>
+          <a:lnRef idx="2">
+            <a:schemeClr val="accent1">
+              <a:shade val="50000"/>
+            </a:schemeClr>
+          </a:lnRef>
+          <a:fillRef idx="1">
+            <a:schemeClr val="accent1"/>
+          </a:fillRef>
+          <a:effectRef idx="0">
+            <a:schemeClr val="accent1"/>
+          </a:effectRef>
+          <a:fontRef idx="minor">
+            <a:schemeClr val="lt1"/>
+          </a:fontRef>
+        </p:style>
+        <p:txBody>
+          <a:bodyPr rtlCol="0" anchor="ctr"/>
+          <a:lstStyle/>
+          <a:p>
+            <a:pPr algn="ctr"/>
+            <a:r>
+              <a:rPr lang="en-US" dirty="0"/>
+              <a:t>No output event</a:t>
+            </a:r>
+          </a:p>
+        </p:txBody>
+      </p:sp>
+      <p:sp>
+        <p:nvSpPr>
+          <p:cNvPr id="10" name="Up Arrow Callout 9">
+            <a:extLst>
+              <a:ext uri="{FF2B5EF4-FFF2-40B4-BE49-F238E27FC236}">
+                <a16:creationId xmlns:a16="http://schemas.microsoft.com/office/drawing/2014/main" id="{9A2D72FC-19A3-B24B-919C-08F0E4A7C6DE}"/>
+              </a:ext>
+            </a:extLst>
+          </p:cNvPr>
+          <p:cNvSpPr/>
+          <p:nvPr/>
+        </p:nvSpPr>
+        <p:spPr>
+          <a:xfrm>
+            <a:off x="6616560" y="3299159"/>
+            <a:ext cx="2116473" cy="536825"/>
+          </a:xfrm>
+          <a:prstGeom prst="upArrowCallout">
+            <a:avLst>
+              <a:gd name="adj1" fmla="val 17345"/>
+              <a:gd name="adj2" fmla="val 25000"/>
+              <a:gd name="adj3" fmla="val 25000"/>
+              <a:gd name="adj4" fmla="val 64977"/>
+            </a:avLst>
+          </a:prstGeom>
+        </p:spPr>
+        <p:style>
+          <a:lnRef idx="2">
+            <a:schemeClr val="accent1">
+              <a:shade val="50000"/>
+            </a:schemeClr>
+          </a:lnRef>
+          <a:fillRef idx="1">
+            <a:schemeClr val="accent1"/>
+          </a:fillRef>
+          <a:effectRef idx="0">
+            <a:schemeClr val="accent1"/>
+          </a:effectRef>
+          <a:fontRef idx="minor">
+            <a:schemeClr val="lt1"/>
+          </a:fontRef>
+        </p:style>
+        <p:txBody>
+          <a:bodyPr rtlCol="0" anchor="ctr"/>
+          <a:lstStyle/>
+          <a:p>
+            <a:pPr algn="ctr"/>
+            <a:r>
+              <a:rPr lang="en-US" dirty="0"/>
+              <a:t>Should fail on event</a:t>
+            </a:r>
+          </a:p>
+        </p:txBody>
+      </p:sp>
+      <p:sp>
+        <p:nvSpPr>
+          <p:cNvPr id="7" name="Down Arrow Callout 6">
+            <a:extLst>
+              <a:ext uri="{FF2B5EF4-FFF2-40B4-BE49-F238E27FC236}">
+                <a16:creationId xmlns:a16="http://schemas.microsoft.com/office/drawing/2014/main" id="{709DB4D8-174C-1043-AD81-C7A92A9E6F38}"/>
+              </a:ext>
+            </a:extLst>
+          </p:cNvPr>
+          <p:cNvSpPr/>
+          <p:nvPr/>
+        </p:nvSpPr>
+        <p:spPr>
+          <a:xfrm>
+            <a:off x="7327188" y="2470933"/>
+            <a:ext cx="1979488" cy="482886"/>
+          </a:xfrm>
+          <a:prstGeom prst="downArrowCallout">
+            <a:avLst>
+              <a:gd name="adj1" fmla="val 13236"/>
+              <a:gd name="adj2" fmla="val 25000"/>
+              <a:gd name="adj3" fmla="val 25000"/>
+              <a:gd name="adj4" fmla="val 64977"/>
+            </a:avLst>
+          </a:prstGeom>
+        </p:spPr>
+        <p:style>
+          <a:lnRef idx="2">
+            <a:schemeClr val="accent1">
+              <a:shade val="50000"/>
+            </a:schemeClr>
+          </a:lnRef>
+          <a:fillRef idx="1">
+            <a:schemeClr val="accent1"/>
+          </a:fillRef>
+          <a:effectRef idx="0">
+            <a:schemeClr val="accent1"/>
+          </a:effectRef>
+          <a:fontRef idx="minor">
+            <a:schemeClr val="lt1"/>
+          </a:fontRef>
+        </p:style>
+        <p:txBody>
+          <a:bodyPr rtlCol="0" anchor="ctr"/>
+          <a:lstStyle/>
+          <a:p>
+            <a:pPr algn="ctr"/>
+            <a:r>
+              <a:rPr lang="en-US" dirty="0"/>
+              <a:t>Output high</a:t>
+            </a:r>
+          </a:p>
+        </p:txBody>
+      </p:sp>
+      <p:sp>
+        <p:nvSpPr>
+          <p:cNvPr id="4" name="Left Arrow Callout 3">
+            <a:extLst>
+              <a:ext uri="{FF2B5EF4-FFF2-40B4-BE49-F238E27FC236}">
+                <a16:creationId xmlns:a16="http://schemas.microsoft.com/office/drawing/2014/main" id="{75C3B9EC-3967-1E42-9D5F-D56D12E91300}"/>
+              </a:ext>
+            </a:extLst>
+          </p:cNvPr>
+          <p:cNvSpPr/>
+          <p:nvPr/>
+        </p:nvSpPr>
+        <p:spPr>
+          <a:xfrm>
+            <a:off x="8096037" y="5614566"/>
+            <a:ext cx="1335640" cy="349322"/>
+          </a:xfrm>
+          <a:prstGeom prst="leftArrowCallout">
+            <a:avLst/>
+          </a:prstGeom>
+        </p:spPr>
+        <p:style>
+          <a:lnRef idx="2">
+            <a:schemeClr val="accent1">
+              <a:shade val="50000"/>
+            </a:schemeClr>
+          </a:lnRef>
+          <a:fillRef idx="1">
+            <a:schemeClr val="accent1"/>
+          </a:fillRef>
+          <a:effectRef idx="0">
+            <a:schemeClr val="accent1"/>
+          </a:effectRef>
+          <a:fontRef idx="minor">
+            <a:schemeClr val="lt1"/>
+          </a:fontRef>
+        </p:style>
+        <p:txBody>
+          <a:bodyPr rtlCol="0" anchor="ctr"/>
+          <a:lstStyle/>
+          <a:p>
+            <a:pPr algn="ctr"/>
+            <a:r>
+              <a:rPr lang="en-US" dirty="0"/>
+              <a:t>Bad!</a:t>
+            </a:r>
+          </a:p>
+        </p:txBody>
+      </p:sp>
+    </p:spTree>
+    <p:extLst>
+      <p:ext uri="{BB962C8B-B14F-4D97-AF65-F5344CB8AC3E}">
+        <p14:creationId xmlns:p14="http://schemas.microsoft.com/office/powerpoint/2010/main" val="2876577173"/>
+      </p:ext>
+    </p:extLst>
+  </p:cSld>
+  <p:clrMapOvr>
+    <a:masterClrMapping/>
+  </p:clrMapOvr>
+</p:sld>
+</file>
+
+<file path=ppt/slides/slide15.xml><?xml version="1.0" encoding="utf-8"?>
+<p:sld xmlns:a="http://schemas.openxmlformats.org/drawingml/2006/main" xmlns:r="http://schemas.openxmlformats.org/officeDocument/2006/relationships" xmlns:p="http://schemas.openxmlformats.org/presentationml/2006/main">
+  <p:cSld>
+    <p:spTree>
+      <p:nvGrpSpPr>
+        <p:cNvPr id="1" name=""/>
+        <p:cNvGrpSpPr/>
+        <p:nvPr/>
+      </p:nvGrpSpPr>
+      <p:grpSpPr>
+        <a:xfrm>
+          <a:off x="0" y="0"/>
+          <a:ext cx="0" cy="0"/>
+          <a:chOff x="0" y="0"/>
+          <a:chExt cx="0" cy="0"/>
+        </a:xfrm>
+      </p:grpSpPr>
+      <p:pic>
+        <p:nvPicPr>
+          <p:cNvPr id="3" name="Picture 2">
+            <a:extLst>
+              <a:ext uri="{FF2B5EF4-FFF2-40B4-BE49-F238E27FC236}">
+                <a16:creationId xmlns:a16="http://schemas.microsoft.com/office/drawing/2014/main" id="{C59CFC92-C48F-9E48-B636-0892B27A8106}"/>
+              </a:ext>
+            </a:extLst>
+          </p:cNvPr>
+          <p:cNvPicPr>
+            <a:picLocks noChangeAspect="1"/>
+          </p:cNvPicPr>
+          <p:nvPr/>
+        </p:nvPicPr>
+        <p:blipFill>
+          <a:blip r:embed="rId3"/>
+          <a:stretch>
+            <a:fillRect/>
+          </a:stretch>
+        </p:blipFill>
+        <p:spPr>
+          <a:xfrm>
+            <a:off x="1036394" y="-237055"/>
+            <a:ext cx="10119211" cy="7699400"/>
+          </a:xfrm>
+          <a:prstGeom prst="rect">
+            <a:avLst/>
+          </a:prstGeom>
+        </p:spPr>
+      </p:pic>
+      <p:sp>
+        <p:nvSpPr>
+          <p:cNvPr id="4" name="Down Arrow Callout 3">
+            <a:extLst>
+              <a:ext uri="{FF2B5EF4-FFF2-40B4-BE49-F238E27FC236}">
+                <a16:creationId xmlns:a16="http://schemas.microsoft.com/office/drawing/2014/main" id="{FFBEF033-2431-2543-A145-1C12ABCB4F20}"/>
+              </a:ext>
+            </a:extLst>
+          </p:cNvPr>
+          <p:cNvSpPr/>
+          <p:nvPr/>
+        </p:nvSpPr>
+        <p:spPr>
+          <a:xfrm>
+            <a:off x="7017015" y="1060124"/>
+            <a:ext cx="2410767" cy="482886"/>
+          </a:xfrm>
+          <a:prstGeom prst="downArrowCallout">
+            <a:avLst>
+              <a:gd name="adj1" fmla="val 13236"/>
+              <a:gd name="adj2" fmla="val 25000"/>
+              <a:gd name="adj3" fmla="val 25000"/>
+              <a:gd name="adj4" fmla="val 64977"/>
+            </a:avLst>
+          </a:prstGeom>
+        </p:spPr>
+        <p:style>
+          <a:lnRef idx="2">
+            <a:schemeClr val="accent1">
+              <a:shade val="50000"/>
+            </a:schemeClr>
+          </a:lnRef>
+          <a:fillRef idx="1">
+            <a:schemeClr val="accent1"/>
+          </a:fillRef>
+          <a:effectRef idx="0">
+            <a:schemeClr val="accent1"/>
+          </a:effectRef>
+          <a:fontRef idx="minor">
+            <a:schemeClr val="lt1"/>
+          </a:fontRef>
+        </p:style>
+        <p:txBody>
+          <a:bodyPr rtlCol="0" anchor="ctr"/>
+          <a:lstStyle/>
+          <a:p>
+            <a:pPr algn="ctr"/>
+            <a:r>
+              <a:rPr lang="en-US" dirty="0"/>
+              <a:t>Output event toggles</a:t>
+            </a:r>
+          </a:p>
+        </p:txBody>
+      </p:sp>
+      <p:sp>
+        <p:nvSpPr>
+          <p:cNvPr id="7" name="Left Arrow Callout 6">
+            <a:extLst>
+              <a:ext uri="{FF2B5EF4-FFF2-40B4-BE49-F238E27FC236}">
+                <a16:creationId xmlns:a16="http://schemas.microsoft.com/office/drawing/2014/main" id="{ADAD622C-10CA-3144-8470-0CC0E0670782}"/>
+              </a:ext>
+            </a:extLst>
+          </p:cNvPr>
+          <p:cNvSpPr/>
+          <p:nvPr/>
+        </p:nvSpPr>
+        <p:spPr>
+          <a:xfrm>
+            <a:off x="8222159" y="5656606"/>
+            <a:ext cx="1335640" cy="349322"/>
+          </a:xfrm>
+          <a:prstGeom prst="leftArrowCallout">
+            <a:avLst/>
+          </a:prstGeom>
+        </p:spPr>
+        <p:style>
+          <a:lnRef idx="2">
+            <a:schemeClr val="accent1">
+              <a:shade val="50000"/>
+            </a:schemeClr>
+          </a:lnRef>
+          <a:fillRef idx="1">
+            <a:schemeClr val="accent1"/>
+          </a:fillRef>
+          <a:effectRef idx="0">
+            <a:schemeClr val="accent1"/>
+          </a:effectRef>
+          <a:fontRef idx="minor">
+            <a:schemeClr val="lt1"/>
+          </a:fontRef>
+        </p:style>
+        <p:txBody>
+          <a:bodyPr rtlCol="0" anchor="ctr"/>
+          <a:lstStyle/>
+          <a:p>
+            <a:pPr algn="ctr"/>
+            <a:r>
+              <a:rPr lang="en-US" dirty="0"/>
+              <a:t>Good</a:t>
+            </a:r>
+          </a:p>
+        </p:txBody>
+      </p:sp>
+    </p:spTree>
+    <p:extLst>
+      <p:ext uri="{BB962C8B-B14F-4D97-AF65-F5344CB8AC3E}">
+        <p14:creationId xmlns:p14="http://schemas.microsoft.com/office/powerpoint/2010/main" val="3692534651"/>
+      </p:ext>
+    </p:extLst>
+  </p:cSld>
+  <p:clrMapOvr>
+    <a:masterClrMapping/>
+  </p:clrMapOvr>
+</p:sld>
+</file>
+
+<file path=ppt/slides/slide16.xml><?xml version="1.0" encoding="utf-8"?>
 <p:sld xmlns:a="http://schemas.openxmlformats.org/drawingml/2006/main" xmlns:r="http://schemas.openxmlformats.org/officeDocument/2006/relationships" xmlns:p="http://schemas.openxmlformats.org/presentationml/2006/main">
   <p:cSld>
     <p:spTree>
@@ -5777,7 +6826,7 @@
 </p:sld>
 </file>
 
-<file path=ppt/slides/slide14.xml><?xml version="1.0" encoding="utf-8"?>
+<file path=ppt/slides/slide17.xml><?xml version="1.0" encoding="utf-8"?>
 <p:sld xmlns:a="http://schemas.openxmlformats.org/drawingml/2006/main" xmlns:r="http://schemas.openxmlformats.org/officeDocument/2006/relationships" xmlns:p="http://schemas.openxmlformats.org/presentationml/2006/main">
   <p:cSld>
     <p:spTree>
@@ -5934,7 +6983,7 @@
 </p:sld>
 </file>
 
-<file path=ppt/slides/slide15.xml><?xml version="1.0" encoding="utf-8"?>
+<file path=ppt/slides/slide18.xml><?xml version="1.0" encoding="utf-8"?>
 <p:sld xmlns:a="http://schemas.openxmlformats.org/drawingml/2006/main" xmlns:r="http://schemas.openxmlformats.org/officeDocument/2006/relationships" xmlns:p="http://schemas.openxmlformats.org/presentationml/2006/main">
   <p:cSld>
     <p:spTree>
@@ -7721,7 +8770,7 @@
 </p:sld>
 </file>
 
-<file path=ppt/slides/slide16.xml><?xml version="1.0" encoding="utf-8"?>
+<file path=ppt/slides/slide19.xml><?xml version="1.0" encoding="utf-8"?>
 <p:sld xmlns:a="http://schemas.openxmlformats.org/drawingml/2006/main" xmlns:r="http://schemas.openxmlformats.org/officeDocument/2006/relationships" xmlns:p="http://schemas.openxmlformats.org/presentationml/2006/main">
   <p:cSld>
     <p:spTree>

</xml_diff>

<commit_message>
Add proposal to witness events
</commit_message>
<xml_diff>
--- a/TA2/AGREE_event_ports/agree_event_semantics.pptx
+++ b/TA2/AGREE_event_ports/agree_event_semantics.pptx
@@ -5,7 +5,7 @@
     <p:sldMasterId id="2147483648" r:id="rId1"/>
   </p:sldMasterIdLst>
   <p:notesMasterIdLst>
-    <p:notesMasterId r:id="rId21"/>
+    <p:notesMasterId r:id="rId22"/>
   </p:notesMasterIdLst>
   <p:sldIdLst>
     <p:sldId id="256" r:id="rId2"/>
@@ -23,10 +23,11 @@
     <p:sldId id="271" r:id="rId14"/>
     <p:sldId id="273" r:id="rId15"/>
     <p:sldId id="274" r:id="rId16"/>
-    <p:sldId id="263" r:id="rId17"/>
-    <p:sldId id="264" r:id="rId18"/>
-    <p:sldId id="265" r:id="rId19"/>
-    <p:sldId id="266" r:id="rId20"/>
+    <p:sldId id="275" r:id="rId17"/>
+    <p:sldId id="263" r:id="rId18"/>
+    <p:sldId id="264" r:id="rId19"/>
+    <p:sldId id="265" r:id="rId20"/>
+    <p:sldId id="266" r:id="rId21"/>
   </p:sldIdLst>
   <p:sldSz cx="12192000" cy="6858000"/>
   <p:notesSz cx="6858000" cy="9144000"/>
@@ -215,7 +216,7 @@
           <a:p>
             <a:fld id="{87FA293F-2570-1640-B15A-D887954EBFB5}" type="datetimeFigureOut">
               <a:rPr lang="en-US" smtClean="0"/>
-              <a:t>6/10/19</a:t>
+              <a:t>6/11/19</a:t>
             </a:fld>
             <a:endParaRPr lang="en-US"/>
           </a:p>
@@ -621,68 +622,21 @@
           <a:bodyPr/>
           <a:lstStyle/>
           <a:p>
-            <a:pPr marL="0" indent="0">
-              <a:buNone/>
-            </a:pPr>
-            <a:r>
-              <a:rPr lang="en-US" dirty="0"/>
-              <a:t>The formal semantics would enable us to</a:t>
-            </a:r>
-          </a:p>
-          <a:p>
-            <a:pPr marL="228600" indent="-228600">
-              <a:buAutoNum type="arabicPeriod"/>
-            </a:pPr>
-            <a:endParaRPr lang="en-US" dirty="0"/>
-          </a:p>
-          <a:p>
-            <a:pPr marL="228600" indent="-228600">
-              <a:buAutoNum type="arabicPeriod"/>
-            </a:pPr>
-            <a:r>
-              <a:rPr lang="en-US" dirty="0"/>
-              <a:t>Verify that </a:t>
-            </a:r>
-            <a:r>
-              <a:rPr lang="en-US" dirty="0" err="1"/>
-              <a:t>Filter.Impl</a:t>
-            </a:r>
-            <a:r>
-              <a:rPr lang="en-US" dirty="0"/>
-              <a:t> satisfies the Filter contract</a:t>
-            </a:r>
-          </a:p>
-          <a:p>
-            <a:pPr marL="228600" indent="-228600">
-              <a:buAutoNum type="arabicPeriod"/>
-            </a:pPr>
-            <a:r>
-              <a:rPr lang="en-US" dirty="0"/>
-              <a:t>Compile </a:t>
-            </a:r>
-            <a:r>
-              <a:rPr lang="en-US" dirty="0" err="1"/>
-              <a:t>Filter.Impl</a:t>
-            </a:r>
-            <a:r>
-              <a:rPr lang="en-US" dirty="0"/>
-              <a:t> down to actual code for the filter</a:t>
-            </a:r>
-          </a:p>
-          <a:p>
-            <a:pPr marL="228600" indent="-228600">
-              <a:buAutoNum type="arabicPeriod"/>
-            </a:pPr>
-            <a:endParaRPr lang="en-US" dirty="0"/>
-          </a:p>
-          <a:p>
             <a:pPr marL="171450" indent="-171450">
               <a:buFont typeface="Arial" panose="020B0604020202020204" pitchFamily="34" charset="0"/>
               <a:buChar char="•"/>
             </a:pPr>
             <a:r>
               <a:rPr lang="en-US" dirty="0"/>
-              <a:t>AGREE is a simple language…</a:t>
+              <a:t>event_out1(…) is a </a:t>
+            </a:r>
+            <a:r>
+              <a:rPr lang="en-US" dirty="0" err="1"/>
+              <a:t>fuction</a:t>
+            </a:r>
+            <a:r>
+              <a:rPr lang="en-US" dirty="0"/>
+              <a:t> defined over input and output values that determine when the output should fire.</a:t>
             </a:r>
           </a:p>
           <a:p>
@@ -692,7 +646,7 @@
             </a:pPr>
             <a:r>
               <a:rPr lang="en-US" dirty="0"/>
-              <a:t>Would need to give more control to specifying output event behavior in the implementation.</a:t>
+              <a:t>Constraint_out1(…) is a function defined over input and output values that determine what the output should look at the time the output event fires.</a:t>
             </a:r>
           </a:p>
           <a:p>
@@ -702,19 +656,10 @@
             </a:pPr>
             <a:r>
               <a:rPr lang="en-US" dirty="0"/>
-              <a:t>Would need something more than contracts to indicate the implementation does more than just meet the contract---liveness maybe?</a:t>
-            </a:r>
-          </a:p>
-          <a:p>
-            <a:pPr marL="0" indent="0">
-              <a:buNone/>
-            </a:pPr>
-            <a:endParaRPr lang="en-US" dirty="0"/>
-          </a:p>
-          <a:p>
-            <a:pPr marL="0" indent="0">
-              <a:buNone/>
-            </a:pPr>
+              <a:t>Only include input event ports in the condition trigger as with assume statements.</a:t>
+            </a:r>
+          </a:p>
+          <a:p>
             <a:endParaRPr lang="en-US" dirty="0"/>
           </a:p>
         </p:txBody>
@@ -736,7 +681,185 @@
           <a:p>
             <a:fld id="{B222266E-AA87-A247-8974-081C5A3E2A21}" type="slidenum">
               <a:rPr lang="en-US" smtClean="0"/>
-              <a:t>18</a:t>
+              <a:t>16</a:t>
+            </a:fld>
+            <a:endParaRPr lang="en-US"/>
+          </a:p>
+        </p:txBody>
+      </p:sp>
+    </p:spTree>
+    <p:extLst>
+      <p:ext uri="{BB962C8B-B14F-4D97-AF65-F5344CB8AC3E}">
+        <p14:creationId xmlns:p14="http://schemas.microsoft.com/office/powerpoint/2010/main" val="2549199224"/>
+      </p:ext>
+    </p:extLst>
+  </p:cSld>
+  <p:clrMapOvr>
+    <a:masterClrMapping/>
+  </p:clrMapOvr>
+</p:notes>
+</file>
+
+<file path=ppt/notesSlides/notesSlide11.xml><?xml version="1.0" encoding="utf-8"?>
+<p:notes xmlns:a="http://schemas.openxmlformats.org/drawingml/2006/main" xmlns:r="http://schemas.openxmlformats.org/officeDocument/2006/relationships" xmlns:p="http://schemas.openxmlformats.org/presentationml/2006/main">
+  <p:cSld>
+    <p:spTree>
+      <p:nvGrpSpPr>
+        <p:cNvPr id="1" name=""/>
+        <p:cNvGrpSpPr/>
+        <p:nvPr/>
+      </p:nvGrpSpPr>
+      <p:grpSpPr>
+        <a:xfrm>
+          <a:off x="0" y="0"/>
+          <a:ext cx="0" cy="0"/>
+          <a:chOff x="0" y="0"/>
+          <a:chExt cx="0" cy="0"/>
+        </a:xfrm>
+      </p:grpSpPr>
+      <p:sp>
+        <p:nvSpPr>
+          <p:cNvPr id="2" name="Slide Image Placeholder 1"/>
+          <p:cNvSpPr>
+            <a:spLocks noGrp="1" noRot="1" noChangeAspect="1"/>
+          </p:cNvSpPr>
+          <p:nvPr>
+            <p:ph type="sldImg"/>
+          </p:nvPr>
+        </p:nvSpPr>
+        <p:spPr/>
+      </p:sp>
+      <p:sp>
+        <p:nvSpPr>
+          <p:cNvPr id="3" name="Notes Placeholder 2"/>
+          <p:cNvSpPr>
+            <a:spLocks noGrp="1"/>
+          </p:cNvSpPr>
+          <p:nvPr>
+            <p:ph type="body" idx="1"/>
+          </p:nvPr>
+        </p:nvSpPr>
+        <p:spPr/>
+        <p:txBody>
+          <a:bodyPr/>
+          <a:lstStyle/>
+          <a:p>
+            <a:pPr marL="0" indent="0">
+              <a:buNone/>
+            </a:pPr>
+            <a:r>
+              <a:rPr lang="en-US" dirty="0"/>
+              <a:t>The formal semantics would enable us to</a:t>
+            </a:r>
+          </a:p>
+          <a:p>
+            <a:pPr marL="228600" indent="-228600">
+              <a:buAutoNum type="arabicPeriod"/>
+            </a:pPr>
+            <a:endParaRPr lang="en-US" dirty="0"/>
+          </a:p>
+          <a:p>
+            <a:pPr marL="228600" indent="-228600">
+              <a:buAutoNum type="arabicPeriod"/>
+            </a:pPr>
+            <a:r>
+              <a:rPr lang="en-US" dirty="0"/>
+              <a:t>Verify that </a:t>
+            </a:r>
+            <a:r>
+              <a:rPr lang="en-US" dirty="0" err="1"/>
+              <a:t>Filter.Impl</a:t>
+            </a:r>
+            <a:r>
+              <a:rPr lang="en-US" dirty="0"/>
+              <a:t> satisfies the Filter contract</a:t>
+            </a:r>
+          </a:p>
+          <a:p>
+            <a:pPr marL="228600" indent="-228600">
+              <a:buAutoNum type="arabicPeriod"/>
+            </a:pPr>
+            <a:r>
+              <a:rPr lang="en-US" dirty="0"/>
+              <a:t>Compile </a:t>
+            </a:r>
+            <a:r>
+              <a:rPr lang="en-US" dirty="0" err="1"/>
+              <a:t>Filter.Impl</a:t>
+            </a:r>
+            <a:r>
+              <a:rPr lang="en-US" dirty="0"/>
+              <a:t> down to actual code for the filter</a:t>
+            </a:r>
+          </a:p>
+          <a:p>
+            <a:pPr marL="228600" indent="-228600">
+              <a:buAutoNum type="arabicPeriod"/>
+            </a:pPr>
+            <a:endParaRPr lang="en-US" dirty="0"/>
+          </a:p>
+          <a:p>
+            <a:pPr marL="171450" indent="-171450">
+              <a:buFont typeface="Arial" panose="020B0604020202020204" pitchFamily="34" charset="0"/>
+              <a:buChar char="•"/>
+            </a:pPr>
+            <a:r>
+              <a:rPr lang="en-US" dirty="0"/>
+              <a:t>AGREE is a simple language…</a:t>
+            </a:r>
+          </a:p>
+          <a:p>
+            <a:pPr marL="171450" indent="-171450">
+              <a:buFont typeface="Arial" panose="020B0604020202020204" pitchFamily="34" charset="0"/>
+              <a:buChar char="•"/>
+            </a:pPr>
+            <a:r>
+              <a:rPr lang="en-US" dirty="0"/>
+              <a:t>Would need to give more control to specifying output event behavior in the implementation.</a:t>
+            </a:r>
+          </a:p>
+          <a:p>
+            <a:pPr marL="171450" indent="-171450">
+              <a:buFont typeface="Arial" panose="020B0604020202020204" pitchFamily="34" charset="0"/>
+              <a:buChar char="•"/>
+            </a:pPr>
+            <a:r>
+              <a:rPr lang="en-US" dirty="0"/>
+              <a:t>Would need something more than contracts to indicate the implementation does more than just meet the contract---liveness maybe?</a:t>
+            </a:r>
+          </a:p>
+          <a:p>
+            <a:pPr marL="0" indent="0">
+              <a:buNone/>
+            </a:pPr>
+            <a:endParaRPr lang="en-US" dirty="0"/>
+          </a:p>
+          <a:p>
+            <a:pPr marL="0" indent="0">
+              <a:buNone/>
+            </a:pPr>
+            <a:endParaRPr lang="en-US" dirty="0"/>
+          </a:p>
+        </p:txBody>
+      </p:sp>
+      <p:sp>
+        <p:nvSpPr>
+          <p:cNvPr id="4" name="Slide Number Placeholder 3"/>
+          <p:cNvSpPr>
+            <a:spLocks noGrp="1"/>
+          </p:cNvSpPr>
+          <p:nvPr>
+            <p:ph type="sldNum" sz="quarter" idx="5"/>
+          </p:nvPr>
+        </p:nvSpPr>
+        <p:spPr/>
+        <p:txBody>
+          <a:bodyPr/>
+          <a:lstStyle/>
+          <a:p>
+            <a:fld id="{B222266E-AA87-A247-8974-081C5A3E2A21}" type="slidenum">
+              <a:rPr lang="en-US" smtClean="0"/>
+              <a:t>19</a:t>
             </a:fld>
             <a:endParaRPr lang="en-US"/>
           </a:p>
@@ -1689,7 +1812,7 @@
           <a:p>
             <a:fld id="{FE7C9C46-6442-644D-91E7-84A2E77E7B1F}" type="datetimeFigureOut">
               <a:rPr lang="en-US" smtClean="0"/>
-              <a:t>6/10/19</a:t>
+              <a:t>6/11/19</a:t>
             </a:fld>
             <a:endParaRPr lang="en-US"/>
           </a:p>
@@ -1887,7 +2010,7 @@
           <a:p>
             <a:fld id="{FE7C9C46-6442-644D-91E7-84A2E77E7B1F}" type="datetimeFigureOut">
               <a:rPr lang="en-US" smtClean="0"/>
-              <a:t>6/10/19</a:t>
+              <a:t>6/11/19</a:t>
             </a:fld>
             <a:endParaRPr lang="en-US"/>
           </a:p>
@@ -2095,7 +2218,7 @@
           <a:p>
             <a:fld id="{FE7C9C46-6442-644D-91E7-84A2E77E7B1F}" type="datetimeFigureOut">
               <a:rPr lang="en-US" smtClean="0"/>
-              <a:t>6/10/19</a:t>
+              <a:t>6/11/19</a:t>
             </a:fld>
             <a:endParaRPr lang="en-US"/>
           </a:p>
@@ -2293,7 +2416,7 @@
           <a:p>
             <a:fld id="{FE7C9C46-6442-644D-91E7-84A2E77E7B1F}" type="datetimeFigureOut">
               <a:rPr lang="en-US" smtClean="0"/>
-              <a:t>6/10/19</a:t>
+              <a:t>6/11/19</a:t>
             </a:fld>
             <a:endParaRPr lang="en-US"/>
           </a:p>
@@ -2568,7 +2691,7 @@
           <a:p>
             <a:fld id="{FE7C9C46-6442-644D-91E7-84A2E77E7B1F}" type="datetimeFigureOut">
               <a:rPr lang="en-US" smtClean="0"/>
-              <a:t>6/10/19</a:t>
+              <a:t>6/11/19</a:t>
             </a:fld>
             <a:endParaRPr lang="en-US"/>
           </a:p>
@@ -2833,7 +2956,7 @@
           <a:p>
             <a:fld id="{FE7C9C46-6442-644D-91E7-84A2E77E7B1F}" type="datetimeFigureOut">
               <a:rPr lang="en-US" smtClean="0"/>
-              <a:t>6/10/19</a:t>
+              <a:t>6/11/19</a:t>
             </a:fld>
             <a:endParaRPr lang="en-US"/>
           </a:p>
@@ -3245,7 +3368,7 @@
           <a:p>
             <a:fld id="{FE7C9C46-6442-644D-91E7-84A2E77E7B1F}" type="datetimeFigureOut">
               <a:rPr lang="en-US" smtClean="0"/>
-              <a:t>6/10/19</a:t>
+              <a:t>6/11/19</a:t>
             </a:fld>
             <a:endParaRPr lang="en-US"/>
           </a:p>
@@ -3386,7 +3509,7 @@
           <a:p>
             <a:fld id="{FE7C9C46-6442-644D-91E7-84A2E77E7B1F}" type="datetimeFigureOut">
               <a:rPr lang="en-US" smtClean="0"/>
-              <a:t>6/10/19</a:t>
+              <a:t>6/11/19</a:t>
             </a:fld>
             <a:endParaRPr lang="en-US"/>
           </a:p>
@@ -3499,7 +3622,7 @@
           <a:p>
             <a:fld id="{FE7C9C46-6442-644D-91E7-84A2E77E7B1F}" type="datetimeFigureOut">
               <a:rPr lang="en-US" smtClean="0"/>
-              <a:t>6/10/19</a:t>
+              <a:t>6/11/19</a:t>
             </a:fld>
             <a:endParaRPr lang="en-US"/>
           </a:p>
@@ -3810,7 +3933,7 @@
           <a:p>
             <a:fld id="{FE7C9C46-6442-644D-91E7-84A2E77E7B1F}" type="datetimeFigureOut">
               <a:rPr lang="en-US" smtClean="0"/>
-              <a:t>6/10/19</a:t>
+              <a:t>6/11/19</a:t>
             </a:fld>
             <a:endParaRPr lang="en-US"/>
           </a:p>
@@ -4098,7 +4221,7 @@
           <a:p>
             <a:fld id="{FE7C9C46-6442-644D-91E7-84A2E77E7B1F}" type="datetimeFigureOut">
               <a:rPr lang="en-US" smtClean="0"/>
-              <a:t>6/10/19</a:t>
+              <a:t>6/11/19</a:t>
             </a:fld>
             <a:endParaRPr lang="en-US"/>
           </a:p>
@@ -4339,7 +4462,7 @@
           <a:p>
             <a:fld id="{FE7C9C46-6442-644D-91E7-84A2E77E7B1F}" type="datetimeFigureOut">
               <a:rPr lang="en-US" smtClean="0"/>
-              <a:t>6/10/19</a:t>
+              <a:t>6/11/19</a:t>
             </a:fld>
             <a:endParaRPr lang="en-US"/>
           </a:p>
@@ -6738,6 +6861,2269 @@
           <p:cNvPr id="2" name="Title 1">
             <a:extLst>
               <a:ext uri="{FF2B5EF4-FFF2-40B4-BE49-F238E27FC236}">
+                <a16:creationId xmlns:a16="http://schemas.microsoft.com/office/drawing/2014/main" id="{04505474-43F8-2B4F-939C-FB82BA56B29D}"/>
+              </a:ext>
+            </a:extLst>
+          </p:cNvPr>
+          <p:cNvSpPr>
+            <a:spLocks noGrp="1"/>
+          </p:cNvSpPr>
+          <p:nvPr>
+            <p:ph type="title"/>
+          </p:nvPr>
+        </p:nvSpPr>
+        <p:spPr>
+          <a:xfrm>
+            <a:off x="838200" y="365125"/>
+            <a:ext cx="10515600" cy="1325563"/>
+          </a:xfrm>
+        </p:spPr>
+        <p:txBody>
+          <a:bodyPr/>
+          <a:lstStyle/>
+          <a:p>
+            <a:r>
+              <a:rPr lang="en-US" dirty="0"/>
+              <a:t>Modified AGREE Semantics to Witness Event</a:t>
+            </a:r>
+          </a:p>
+        </p:txBody>
+      </p:sp>
+      <p:grpSp>
+        <p:nvGrpSpPr>
+          <p:cNvPr id="106" name="Group 105">
+            <a:extLst>
+              <a:ext uri="{FF2B5EF4-FFF2-40B4-BE49-F238E27FC236}">
+                <a16:creationId xmlns:a16="http://schemas.microsoft.com/office/drawing/2014/main" id="{6980F156-7E22-D541-949D-9E4AA4231EF0}"/>
+              </a:ext>
+            </a:extLst>
+          </p:cNvPr>
+          <p:cNvGrpSpPr/>
+          <p:nvPr/>
+        </p:nvGrpSpPr>
+        <p:grpSpPr>
+          <a:xfrm>
+            <a:off x="3458818" y="1809959"/>
+            <a:ext cx="4646551" cy="1878495"/>
+            <a:chOff x="3458818" y="1809959"/>
+            <a:chExt cx="4646551" cy="1878495"/>
+          </a:xfrm>
+        </p:grpSpPr>
+        <p:sp>
+          <p:nvSpPr>
+            <p:cNvPr id="6" name="Parallelogram 5">
+              <a:extLst>
+                <a:ext uri="{FF2B5EF4-FFF2-40B4-BE49-F238E27FC236}">
+                  <a16:creationId xmlns:a16="http://schemas.microsoft.com/office/drawing/2014/main" id="{5909D995-3C2F-5348-9B45-8A83DAF5A959}"/>
+                </a:ext>
+              </a:extLst>
+            </p:cNvPr>
+            <p:cNvSpPr/>
+            <p:nvPr/>
+          </p:nvSpPr>
+          <p:spPr>
+            <a:xfrm>
+              <a:off x="4174436" y="1809959"/>
+              <a:ext cx="3150704" cy="1878495"/>
+            </a:xfrm>
+            <a:prstGeom prst="parallelogram">
+              <a:avLst/>
+            </a:prstGeom>
+            <a:noFill/>
+            <a:ln w="38100">
+              <a:prstDash val="dash"/>
+            </a:ln>
+          </p:spPr>
+          <p:style>
+            <a:lnRef idx="2">
+              <a:schemeClr val="accent1">
+                <a:shade val="50000"/>
+              </a:schemeClr>
+            </a:lnRef>
+            <a:fillRef idx="1">
+              <a:schemeClr val="accent1"/>
+            </a:fillRef>
+            <a:effectRef idx="0">
+              <a:schemeClr val="accent1"/>
+            </a:effectRef>
+            <a:fontRef idx="minor">
+              <a:schemeClr val="lt1"/>
+            </a:fontRef>
+          </p:style>
+          <p:txBody>
+            <a:bodyPr rtlCol="0" anchor="ctr"/>
+            <a:lstStyle/>
+            <a:p>
+              <a:pPr algn="ctr"/>
+              <a:endParaRPr lang="en-US"/>
+            </a:p>
+          </p:txBody>
+        </p:sp>
+        <p:grpSp>
+          <p:nvGrpSpPr>
+            <p:cNvPr id="11" name="Group 10">
+              <a:extLst>
+                <a:ext uri="{FF2B5EF4-FFF2-40B4-BE49-F238E27FC236}">
+                  <a16:creationId xmlns:a16="http://schemas.microsoft.com/office/drawing/2014/main" id="{191FE920-6157-BA4B-B48E-4CA8AB7C8460}"/>
+                </a:ext>
+              </a:extLst>
+            </p:cNvPr>
+            <p:cNvGrpSpPr/>
+            <p:nvPr/>
+          </p:nvGrpSpPr>
+          <p:grpSpPr>
+            <a:xfrm>
+              <a:off x="4239047" y="1945173"/>
+              <a:ext cx="318052" cy="347868"/>
+              <a:chOff x="3677478" y="1948070"/>
+              <a:chExt cx="318052" cy="347868"/>
+            </a:xfrm>
+          </p:grpSpPr>
+          <p:sp>
+            <p:nvSpPr>
+              <p:cNvPr id="7" name="Triangle 6">
+                <a:extLst>
+                  <a:ext uri="{FF2B5EF4-FFF2-40B4-BE49-F238E27FC236}">
+                    <a16:creationId xmlns:a16="http://schemas.microsoft.com/office/drawing/2014/main" id="{38D2CF44-D668-1343-BAF0-3E7151F9469D}"/>
+                  </a:ext>
+                </a:extLst>
+              </p:cNvPr>
+              <p:cNvSpPr/>
+              <p:nvPr/>
+            </p:nvSpPr>
+            <p:spPr>
+              <a:xfrm rot="5400000">
+                <a:off x="3687417" y="2017643"/>
+                <a:ext cx="188844" cy="208722"/>
+              </a:xfrm>
+              <a:prstGeom prst="triangle">
+                <a:avLst/>
+              </a:prstGeom>
+            </p:spPr>
+            <p:style>
+              <a:lnRef idx="2">
+                <a:schemeClr val="accent1">
+                  <a:shade val="50000"/>
+                </a:schemeClr>
+              </a:lnRef>
+              <a:fillRef idx="1">
+                <a:schemeClr val="accent1"/>
+              </a:fillRef>
+              <a:effectRef idx="0">
+                <a:schemeClr val="accent1"/>
+              </a:effectRef>
+              <a:fontRef idx="minor">
+                <a:schemeClr val="lt1"/>
+              </a:fontRef>
+            </p:style>
+            <p:txBody>
+              <a:bodyPr rtlCol="0" anchor="ctr"/>
+              <a:lstStyle/>
+              <a:p>
+                <a:pPr algn="ctr"/>
+                <a:endParaRPr lang="en-US"/>
+              </a:p>
+            </p:txBody>
+          </p:sp>
+          <p:cxnSp>
+            <p:nvCxnSpPr>
+              <p:cNvPr id="9" name="Straight Connector 8">
+                <a:extLst>
+                  <a:ext uri="{FF2B5EF4-FFF2-40B4-BE49-F238E27FC236}">
+                    <a16:creationId xmlns:a16="http://schemas.microsoft.com/office/drawing/2014/main" id="{19C3F07B-9D03-9042-8E4D-A77539308427}"/>
+                  </a:ext>
+                </a:extLst>
+              </p:cNvPr>
+              <p:cNvCxnSpPr/>
+              <p:nvPr/>
+            </p:nvCxnSpPr>
+            <p:spPr>
+              <a:xfrm>
+                <a:off x="3677478" y="1948070"/>
+                <a:ext cx="318052" cy="173934"/>
+              </a:xfrm>
+              <a:prstGeom prst="line">
+                <a:avLst/>
+              </a:prstGeom>
+            </p:spPr>
+            <p:style>
+              <a:lnRef idx="1">
+                <a:schemeClr val="accent1"/>
+              </a:lnRef>
+              <a:fillRef idx="0">
+                <a:schemeClr val="accent1"/>
+              </a:fillRef>
+              <a:effectRef idx="0">
+                <a:schemeClr val="accent1"/>
+              </a:effectRef>
+              <a:fontRef idx="minor">
+                <a:schemeClr val="tx1"/>
+              </a:fontRef>
+            </p:style>
+          </p:cxnSp>
+          <p:cxnSp>
+            <p:nvCxnSpPr>
+              <p:cNvPr id="10" name="Straight Connector 9">
+                <a:extLst>
+                  <a:ext uri="{FF2B5EF4-FFF2-40B4-BE49-F238E27FC236}">
+                    <a16:creationId xmlns:a16="http://schemas.microsoft.com/office/drawing/2014/main" id="{BA70F391-A7F2-294D-A202-1A5F49745756}"/>
+                  </a:ext>
+                </a:extLst>
+              </p:cNvPr>
+              <p:cNvCxnSpPr>
+                <a:cxnSpLocks/>
+              </p:cNvCxnSpPr>
+              <p:nvPr/>
+            </p:nvCxnSpPr>
+            <p:spPr>
+              <a:xfrm flipH="1">
+                <a:off x="3677478" y="2122004"/>
+                <a:ext cx="318052" cy="173934"/>
+              </a:xfrm>
+              <a:prstGeom prst="line">
+                <a:avLst/>
+              </a:prstGeom>
+            </p:spPr>
+            <p:style>
+              <a:lnRef idx="1">
+                <a:schemeClr val="accent1"/>
+              </a:lnRef>
+              <a:fillRef idx="0">
+                <a:schemeClr val="accent1"/>
+              </a:fillRef>
+              <a:effectRef idx="0">
+                <a:schemeClr val="accent1"/>
+              </a:effectRef>
+              <a:fontRef idx="minor">
+                <a:schemeClr val="tx1"/>
+              </a:fontRef>
+            </p:style>
+          </p:cxnSp>
+        </p:grpSp>
+        <p:grpSp>
+          <p:nvGrpSpPr>
+            <p:cNvPr id="16" name="Group 15">
+              <a:extLst>
+                <a:ext uri="{FF2B5EF4-FFF2-40B4-BE49-F238E27FC236}">
+                  <a16:creationId xmlns:a16="http://schemas.microsoft.com/office/drawing/2014/main" id="{59388E19-3926-CC4E-867D-3EE27B5F989D}"/>
+                </a:ext>
+              </a:extLst>
+            </p:cNvPr>
+            <p:cNvGrpSpPr/>
+            <p:nvPr/>
+          </p:nvGrpSpPr>
+          <p:grpSpPr>
+            <a:xfrm>
+              <a:off x="4239047" y="2516156"/>
+              <a:ext cx="318052" cy="347868"/>
+              <a:chOff x="3677478" y="1948070"/>
+              <a:chExt cx="318052" cy="347868"/>
+            </a:xfrm>
+          </p:grpSpPr>
+          <p:sp>
+            <p:nvSpPr>
+              <p:cNvPr id="17" name="Triangle 16">
+                <a:extLst>
+                  <a:ext uri="{FF2B5EF4-FFF2-40B4-BE49-F238E27FC236}">
+                    <a16:creationId xmlns:a16="http://schemas.microsoft.com/office/drawing/2014/main" id="{DA9F1EFC-6432-6448-BA05-73ADFF939B53}"/>
+                  </a:ext>
+                </a:extLst>
+              </p:cNvPr>
+              <p:cNvSpPr/>
+              <p:nvPr/>
+            </p:nvSpPr>
+            <p:spPr>
+              <a:xfrm rot="5400000">
+                <a:off x="3687417" y="2017643"/>
+                <a:ext cx="188844" cy="208722"/>
+              </a:xfrm>
+              <a:prstGeom prst="triangle">
+                <a:avLst/>
+              </a:prstGeom>
+            </p:spPr>
+            <p:style>
+              <a:lnRef idx="2">
+                <a:schemeClr val="accent1">
+                  <a:shade val="50000"/>
+                </a:schemeClr>
+              </a:lnRef>
+              <a:fillRef idx="1">
+                <a:schemeClr val="accent1"/>
+              </a:fillRef>
+              <a:effectRef idx="0">
+                <a:schemeClr val="accent1"/>
+              </a:effectRef>
+              <a:fontRef idx="minor">
+                <a:schemeClr val="lt1"/>
+              </a:fontRef>
+            </p:style>
+            <p:txBody>
+              <a:bodyPr rtlCol="0" anchor="ctr"/>
+              <a:lstStyle/>
+              <a:p>
+                <a:pPr algn="ctr"/>
+                <a:endParaRPr lang="en-US"/>
+              </a:p>
+            </p:txBody>
+          </p:sp>
+          <p:cxnSp>
+            <p:nvCxnSpPr>
+              <p:cNvPr id="18" name="Straight Connector 17">
+                <a:extLst>
+                  <a:ext uri="{FF2B5EF4-FFF2-40B4-BE49-F238E27FC236}">
+                    <a16:creationId xmlns:a16="http://schemas.microsoft.com/office/drawing/2014/main" id="{95872332-0FDE-2346-A448-6598DB1A606F}"/>
+                  </a:ext>
+                </a:extLst>
+              </p:cNvPr>
+              <p:cNvCxnSpPr/>
+              <p:nvPr/>
+            </p:nvCxnSpPr>
+            <p:spPr>
+              <a:xfrm>
+                <a:off x="3677478" y="1948070"/>
+                <a:ext cx="318052" cy="173934"/>
+              </a:xfrm>
+              <a:prstGeom prst="line">
+                <a:avLst/>
+              </a:prstGeom>
+            </p:spPr>
+            <p:style>
+              <a:lnRef idx="1">
+                <a:schemeClr val="accent1"/>
+              </a:lnRef>
+              <a:fillRef idx="0">
+                <a:schemeClr val="accent1"/>
+              </a:fillRef>
+              <a:effectRef idx="0">
+                <a:schemeClr val="accent1"/>
+              </a:effectRef>
+              <a:fontRef idx="minor">
+                <a:schemeClr val="tx1"/>
+              </a:fontRef>
+            </p:style>
+          </p:cxnSp>
+          <p:cxnSp>
+            <p:nvCxnSpPr>
+              <p:cNvPr id="19" name="Straight Connector 18">
+                <a:extLst>
+                  <a:ext uri="{FF2B5EF4-FFF2-40B4-BE49-F238E27FC236}">
+                    <a16:creationId xmlns:a16="http://schemas.microsoft.com/office/drawing/2014/main" id="{35E48B44-405C-A74D-8246-1E58D44E1ABB}"/>
+                  </a:ext>
+                </a:extLst>
+              </p:cNvPr>
+              <p:cNvCxnSpPr>
+                <a:cxnSpLocks/>
+              </p:cNvCxnSpPr>
+              <p:nvPr/>
+            </p:nvCxnSpPr>
+            <p:spPr>
+              <a:xfrm flipH="1">
+                <a:off x="3677478" y="2122004"/>
+                <a:ext cx="318052" cy="173934"/>
+              </a:xfrm>
+              <a:prstGeom prst="line">
+                <a:avLst/>
+              </a:prstGeom>
+            </p:spPr>
+            <p:style>
+              <a:lnRef idx="1">
+                <a:schemeClr val="accent1"/>
+              </a:lnRef>
+              <a:fillRef idx="0">
+                <a:schemeClr val="accent1"/>
+              </a:fillRef>
+              <a:effectRef idx="0">
+                <a:schemeClr val="accent1"/>
+              </a:effectRef>
+              <a:fontRef idx="minor">
+                <a:schemeClr val="tx1"/>
+              </a:fontRef>
+            </p:style>
+          </p:cxnSp>
+        </p:grpSp>
+        <p:grpSp>
+          <p:nvGrpSpPr>
+            <p:cNvPr id="20" name="Group 19">
+              <a:extLst>
+                <a:ext uri="{FF2B5EF4-FFF2-40B4-BE49-F238E27FC236}">
+                  <a16:creationId xmlns:a16="http://schemas.microsoft.com/office/drawing/2014/main" id="{90551795-0412-A24E-AC7C-07E8F1772378}"/>
+                </a:ext>
+              </a:extLst>
+            </p:cNvPr>
+            <p:cNvGrpSpPr/>
+            <p:nvPr/>
+          </p:nvGrpSpPr>
+          <p:grpSpPr>
+            <a:xfrm>
+              <a:off x="4239047" y="3135522"/>
+              <a:ext cx="318052" cy="347868"/>
+              <a:chOff x="3677478" y="1948070"/>
+              <a:chExt cx="318052" cy="347868"/>
+            </a:xfrm>
+          </p:grpSpPr>
+          <p:sp>
+            <p:nvSpPr>
+              <p:cNvPr id="21" name="Triangle 20">
+                <a:extLst>
+                  <a:ext uri="{FF2B5EF4-FFF2-40B4-BE49-F238E27FC236}">
+                    <a16:creationId xmlns:a16="http://schemas.microsoft.com/office/drawing/2014/main" id="{0E19EBD8-FFE8-4E4E-A15E-8C7B384D0DB1}"/>
+                  </a:ext>
+                </a:extLst>
+              </p:cNvPr>
+              <p:cNvSpPr/>
+              <p:nvPr/>
+            </p:nvSpPr>
+            <p:spPr>
+              <a:xfrm rot="5400000">
+                <a:off x="3687417" y="2017643"/>
+                <a:ext cx="188844" cy="208722"/>
+              </a:xfrm>
+              <a:prstGeom prst="triangle">
+                <a:avLst/>
+              </a:prstGeom>
+            </p:spPr>
+            <p:style>
+              <a:lnRef idx="2">
+                <a:schemeClr val="accent1">
+                  <a:shade val="50000"/>
+                </a:schemeClr>
+              </a:lnRef>
+              <a:fillRef idx="1">
+                <a:schemeClr val="accent1"/>
+              </a:fillRef>
+              <a:effectRef idx="0">
+                <a:schemeClr val="accent1"/>
+              </a:effectRef>
+              <a:fontRef idx="minor">
+                <a:schemeClr val="lt1"/>
+              </a:fontRef>
+            </p:style>
+            <p:txBody>
+              <a:bodyPr rtlCol="0" anchor="ctr"/>
+              <a:lstStyle/>
+              <a:p>
+                <a:pPr algn="ctr"/>
+                <a:endParaRPr lang="en-US"/>
+              </a:p>
+            </p:txBody>
+          </p:sp>
+          <p:cxnSp>
+            <p:nvCxnSpPr>
+              <p:cNvPr id="22" name="Straight Connector 21">
+                <a:extLst>
+                  <a:ext uri="{FF2B5EF4-FFF2-40B4-BE49-F238E27FC236}">
+                    <a16:creationId xmlns:a16="http://schemas.microsoft.com/office/drawing/2014/main" id="{89C0AB78-6A16-E440-B23A-3F7BFC7F4034}"/>
+                  </a:ext>
+                </a:extLst>
+              </p:cNvPr>
+              <p:cNvCxnSpPr/>
+              <p:nvPr/>
+            </p:nvCxnSpPr>
+            <p:spPr>
+              <a:xfrm>
+                <a:off x="3677478" y="1948070"/>
+                <a:ext cx="318052" cy="173934"/>
+              </a:xfrm>
+              <a:prstGeom prst="line">
+                <a:avLst/>
+              </a:prstGeom>
+            </p:spPr>
+            <p:style>
+              <a:lnRef idx="1">
+                <a:schemeClr val="accent1"/>
+              </a:lnRef>
+              <a:fillRef idx="0">
+                <a:schemeClr val="accent1"/>
+              </a:fillRef>
+              <a:effectRef idx="0">
+                <a:schemeClr val="accent1"/>
+              </a:effectRef>
+              <a:fontRef idx="minor">
+                <a:schemeClr val="tx1"/>
+              </a:fontRef>
+            </p:style>
+          </p:cxnSp>
+          <p:cxnSp>
+            <p:nvCxnSpPr>
+              <p:cNvPr id="23" name="Straight Connector 22">
+                <a:extLst>
+                  <a:ext uri="{FF2B5EF4-FFF2-40B4-BE49-F238E27FC236}">
+                    <a16:creationId xmlns:a16="http://schemas.microsoft.com/office/drawing/2014/main" id="{33FA9CBF-5D07-454C-B676-BF9A7D493F7C}"/>
+                  </a:ext>
+                </a:extLst>
+              </p:cNvPr>
+              <p:cNvCxnSpPr>
+                <a:cxnSpLocks/>
+              </p:cNvCxnSpPr>
+              <p:nvPr/>
+            </p:nvCxnSpPr>
+            <p:spPr>
+              <a:xfrm flipH="1">
+                <a:off x="3677478" y="2122004"/>
+                <a:ext cx="318052" cy="173934"/>
+              </a:xfrm>
+              <a:prstGeom prst="line">
+                <a:avLst/>
+              </a:prstGeom>
+            </p:spPr>
+            <p:style>
+              <a:lnRef idx="1">
+                <a:schemeClr val="accent1"/>
+              </a:lnRef>
+              <a:fillRef idx="0">
+                <a:schemeClr val="accent1"/>
+              </a:fillRef>
+              <a:effectRef idx="0">
+                <a:schemeClr val="accent1"/>
+              </a:effectRef>
+              <a:fontRef idx="minor">
+                <a:schemeClr val="tx1"/>
+              </a:fontRef>
+            </p:style>
+          </p:cxnSp>
+        </p:grpSp>
+        <p:grpSp>
+          <p:nvGrpSpPr>
+            <p:cNvPr id="24" name="Group 23">
+              <a:extLst>
+                <a:ext uri="{FF2B5EF4-FFF2-40B4-BE49-F238E27FC236}">
+                  <a16:creationId xmlns:a16="http://schemas.microsoft.com/office/drawing/2014/main" id="{2DDAFD8F-8BBC-EA49-8599-C9DEC32C6E6B}"/>
+                </a:ext>
+              </a:extLst>
+            </p:cNvPr>
+            <p:cNvGrpSpPr/>
+            <p:nvPr/>
+          </p:nvGrpSpPr>
+          <p:grpSpPr>
+            <a:xfrm>
+              <a:off x="7007088" y="1946208"/>
+              <a:ext cx="318052" cy="347868"/>
+              <a:chOff x="3677478" y="1948070"/>
+              <a:chExt cx="318052" cy="347868"/>
+            </a:xfrm>
+          </p:grpSpPr>
+          <p:sp>
+            <p:nvSpPr>
+              <p:cNvPr id="25" name="Triangle 24">
+                <a:extLst>
+                  <a:ext uri="{FF2B5EF4-FFF2-40B4-BE49-F238E27FC236}">
+                    <a16:creationId xmlns:a16="http://schemas.microsoft.com/office/drawing/2014/main" id="{7912B98C-F978-D246-A81A-F9DED9650AD4}"/>
+                  </a:ext>
+                </a:extLst>
+              </p:cNvPr>
+              <p:cNvSpPr/>
+              <p:nvPr/>
+            </p:nvSpPr>
+            <p:spPr>
+              <a:xfrm rot="5400000">
+                <a:off x="3687417" y="2017643"/>
+                <a:ext cx="188844" cy="208722"/>
+              </a:xfrm>
+              <a:prstGeom prst="triangle">
+                <a:avLst/>
+              </a:prstGeom>
+            </p:spPr>
+            <p:style>
+              <a:lnRef idx="2">
+                <a:schemeClr val="accent1">
+                  <a:shade val="50000"/>
+                </a:schemeClr>
+              </a:lnRef>
+              <a:fillRef idx="1">
+                <a:schemeClr val="accent1"/>
+              </a:fillRef>
+              <a:effectRef idx="0">
+                <a:schemeClr val="accent1"/>
+              </a:effectRef>
+              <a:fontRef idx="minor">
+                <a:schemeClr val="lt1"/>
+              </a:fontRef>
+            </p:style>
+            <p:txBody>
+              <a:bodyPr rtlCol="0" anchor="ctr"/>
+              <a:lstStyle/>
+              <a:p>
+                <a:pPr algn="ctr"/>
+                <a:endParaRPr lang="en-US"/>
+              </a:p>
+            </p:txBody>
+          </p:sp>
+          <p:cxnSp>
+            <p:nvCxnSpPr>
+              <p:cNvPr id="26" name="Straight Connector 25">
+                <a:extLst>
+                  <a:ext uri="{FF2B5EF4-FFF2-40B4-BE49-F238E27FC236}">
+                    <a16:creationId xmlns:a16="http://schemas.microsoft.com/office/drawing/2014/main" id="{D0F1F33A-0F63-EB44-B530-E281735CD014}"/>
+                  </a:ext>
+                </a:extLst>
+              </p:cNvPr>
+              <p:cNvCxnSpPr/>
+              <p:nvPr/>
+            </p:nvCxnSpPr>
+            <p:spPr>
+              <a:xfrm>
+                <a:off x="3677478" y="1948070"/>
+                <a:ext cx="318052" cy="173934"/>
+              </a:xfrm>
+              <a:prstGeom prst="line">
+                <a:avLst/>
+              </a:prstGeom>
+            </p:spPr>
+            <p:style>
+              <a:lnRef idx="1">
+                <a:schemeClr val="accent1"/>
+              </a:lnRef>
+              <a:fillRef idx="0">
+                <a:schemeClr val="accent1"/>
+              </a:fillRef>
+              <a:effectRef idx="0">
+                <a:schemeClr val="accent1"/>
+              </a:effectRef>
+              <a:fontRef idx="minor">
+                <a:schemeClr val="tx1"/>
+              </a:fontRef>
+            </p:style>
+          </p:cxnSp>
+          <p:cxnSp>
+            <p:nvCxnSpPr>
+              <p:cNvPr id="27" name="Straight Connector 26">
+                <a:extLst>
+                  <a:ext uri="{FF2B5EF4-FFF2-40B4-BE49-F238E27FC236}">
+                    <a16:creationId xmlns:a16="http://schemas.microsoft.com/office/drawing/2014/main" id="{CF976F18-2FE1-C244-86DB-C217D2008B74}"/>
+                  </a:ext>
+                </a:extLst>
+              </p:cNvPr>
+              <p:cNvCxnSpPr>
+                <a:cxnSpLocks/>
+              </p:cNvCxnSpPr>
+              <p:nvPr/>
+            </p:nvCxnSpPr>
+            <p:spPr>
+              <a:xfrm flipH="1">
+                <a:off x="3677478" y="2122004"/>
+                <a:ext cx="318052" cy="173934"/>
+              </a:xfrm>
+              <a:prstGeom prst="line">
+                <a:avLst/>
+              </a:prstGeom>
+            </p:spPr>
+            <p:style>
+              <a:lnRef idx="1">
+                <a:schemeClr val="accent1"/>
+              </a:lnRef>
+              <a:fillRef idx="0">
+                <a:schemeClr val="accent1"/>
+              </a:fillRef>
+              <a:effectRef idx="0">
+                <a:schemeClr val="accent1"/>
+              </a:effectRef>
+              <a:fontRef idx="minor">
+                <a:schemeClr val="tx1"/>
+              </a:fontRef>
+            </p:style>
+          </p:cxnSp>
+        </p:grpSp>
+        <p:grpSp>
+          <p:nvGrpSpPr>
+            <p:cNvPr id="28" name="Group 27">
+              <a:extLst>
+                <a:ext uri="{FF2B5EF4-FFF2-40B4-BE49-F238E27FC236}">
+                  <a16:creationId xmlns:a16="http://schemas.microsoft.com/office/drawing/2014/main" id="{FF56436B-754B-F746-9405-E47DC5BCDE50}"/>
+                </a:ext>
+              </a:extLst>
+            </p:cNvPr>
+            <p:cNvGrpSpPr/>
+            <p:nvPr/>
+          </p:nvGrpSpPr>
+          <p:grpSpPr>
+            <a:xfrm>
+              <a:off x="7007088" y="2517191"/>
+              <a:ext cx="318052" cy="347868"/>
+              <a:chOff x="3677478" y="1948070"/>
+              <a:chExt cx="318052" cy="347868"/>
+            </a:xfrm>
+          </p:grpSpPr>
+          <p:sp>
+            <p:nvSpPr>
+              <p:cNvPr id="29" name="Triangle 28">
+                <a:extLst>
+                  <a:ext uri="{FF2B5EF4-FFF2-40B4-BE49-F238E27FC236}">
+                    <a16:creationId xmlns:a16="http://schemas.microsoft.com/office/drawing/2014/main" id="{DED38342-6DF2-D945-9DD3-2CD8D23E94CD}"/>
+                  </a:ext>
+                </a:extLst>
+              </p:cNvPr>
+              <p:cNvSpPr/>
+              <p:nvPr/>
+            </p:nvSpPr>
+            <p:spPr>
+              <a:xfrm rot="5400000">
+                <a:off x="3687417" y="2017643"/>
+                <a:ext cx="188844" cy="208722"/>
+              </a:xfrm>
+              <a:prstGeom prst="triangle">
+                <a:avLst/>
+              </a:prstGeom>
+            </p:spPr>
+            <p:style>
+              <a:lnRef idx="2">
+                <a:schemeClr val="accent1">
+                  <a:shade val="50000"/>
+                </a:schemeClr>
+              </a:lnRef>
+              <a:fillRef idx="1">
+                <a:schemeClr val="accent1"/>
+              </a:fillRef>
+              <a:effectRef idx="0">
+                <a:schemeClr val="accent1"/>
+              </a:effectRef>
+              <a:fontRef idx="minor">
+                <a:schemeClr val="lt1"/>
+              </a:fontRef>
+            </p:style>
+            <p:txBody>
+              <a:bodyPr rtlCol="0" anchor="ctr"/>
+              <a:lstStyle/>
+              <a:p>
+                <a:pPr algn="ctr"/>
+                <a:endParaRPr lang="en-US"/>
+              </a:p>
+            </p:txBody>
+          </p:sp>
+          <p:cxnSp>
+            <p:nvCxnSpPr>
+              <p:cNvPr id="30" name="Straight Connector 29">
+                <a:extLst>
+                  <a:ext uri="{FF2B5EF4-FFF2-40B4-BE49-F238E27FC236}">
+                    <a16:creationId xmlns:a16="http://schemas.microsoft.com/office/drawing/2014/main" id="{B55D81B2-28E9-2341-A6C0-B0B8D7803039}"/>
+                  </a:ext>
+                </a:extLst>
+              </p:cNvPr>
+              <p:cNvCxnSpPr/>
+              <p:nvPr/>
+            </p:nvCxnSpPr>
+            <p:spPr>
+              <a:xfrm>
+                <a:off x="3677478" y="1948070"/>
+                <a:ext cx="318052" cy="173934"/>
+              </a:xfrm>
+              <a:prstGeom prst="line">
+                <a:avLst/>
+              </a:prstGeom>
+            </p:spPr>
+            <p:style>
+              <a:lnRef idx="1">
+                <a:schemeClr val="accent1"/>
+              </a:lnRef>
+              <a:fillRef idx="0">
+                <a:schemeClr val="accent1"/>
+              </a:fillRef>
+              <a:effectRef idx="0">
+                <a:schemeClr val="accent1"/>
+              </a:effectRef>
+              <a:fontRef idx="minor">
+                <a:schemeClr val="tx1"/>
+              </a:fontRef>
+            </p:style>
+          </p:cxnSp>
+          <p:cxnSp>
+            <p:nvCxnSpPr>
+              <p:cNvPr id="31" name="Straight Connector 30">
+                <a:extLst>
+                  <a:ext uri="{FF2B5EF4-FFF2-40B4-BE49-F238E27FC236}">
+                    <a16:creationId xmlns:a16="http://schemas.microsoft.com/office/drawing/2014/main" id="{732C3D54-5814-0C49-89DA-CA0FCB2FEA20}"/>
+                  </a:ext>
+                </a:extLst>
+              </p:cNvPr>
+              <p:cNvCxnSpPr>
+                <a:cxnSpLocks/>
+              </p:cNvCxnSpPr>
+              <p:nvPr/>
+            </p:nvCxnSpPr>
+            <p:spPr>
+              <a:xfrm flipH="1">
+                <a:off x="3677478" y="2122004"/>
+                <a:ext cx="318052" cy="173934"/>
+              </a:xfrm>
+              <a:prstGeom prst="line">
+                <a:avLst/>
+              </a:prstGeom>
+            </p:spPr>
+            <p:style>
+              <a:lnRef idx="1">
+                <a:schemeClr val="accent1"/>
+              </a:lnRef>
+              <a:fillRef idx="0">
+                <a:schemeClr val="accent1"/>
+              </a:fillRef>
+              <a:effectRef idx="0">
+                <a:schemeClr val="accent1"/>
+              </a:effectRef>
+              <a:fontRef idx="minor">
+                <a:schemeClr val="tx1"/>
+              </a:fontRef>
+            </p:style>
+          </p:cxnSp>
+        </p:grpSp>
+        <p:grpSp>
+          <p:nvGrpSpPr>
+            <p:cNvPr id="32" name="Group 31">
+              <a:extLst>
+                <a:ext uri="{FF2B5EF4-FFF2-40B4-BE49-F238E27FC236}">
+                  <a16:creationId xmlns:a16="http://schemas.microsoft.com/office/drawing/2014/main" id="{070279F8-0CF6-3546-ACEF-7B85B3A71CD7}"/>
+                </a:ext>
+              </a:extLst>
+            </p:cNvPr>
+            <p:cNvGrpSpPr/>
+            <p:nvPr/>
+          </p:nvGrpSpPr>
+          <p:grpSpPr>
+            <a:xfrm>
+              <a:off x="7007088" y="3136557"/>
+              <a:ext cx="318052" cy="347868"/>
+              <a:chOff x="3677478" y="1948070"/>
+              <a:chExt cx="318052" cy="347868"/>
+            </a:xfrm>
+          </p:grpSpPr>
+          <p:sp>
+            <p:nvSpPr>
+              <p:cNvPr id="33" name="Triangle 32">
+                <a:extLst>
+                  <a:ext uri="{FF2B5EF4-FFF2-40B4-BE49-F238E27FC236}">
+                    <a16:creationId xmlns:a16="http://schemas.microsoft.com/office/drawing/2014/main" id="{A94C4831-4A64-D549-85DB-E8C373A3FE28}"/>
+                  </a:ext>
+                </a:extLst>
+              </p:cNvPr>
+              <p:cNvSpPr/>
+              <p:nvPr/>
+            </p:nvSpPr>
+            <p:spPr>
+              <a:xfrm rot="5400000">
+                <a:off x="3687417" y="2017643"/>
+                <a:ext cx="188844" cy="208722"/>
+              </a:xfrm>
+              <a:prstGeom prst="triangle">
+                <a:avLst/>
+              </a:prstGeom>
+            </p:spPr>
+            <p:style>
+              <a:lnRef idx="2">
+                <a:schemeClr val="accent1">
+                  <a:shade val="50000"/>
+                </a:schemeClr>
+              </a:lnRef>
+              <a:fillRef idx="1">
+                <a:schemeClr val="accent1"/>
+              </a:fillRef>
+              <a:effectRef idx="0">
+                <a:schemeClr val="accent1"/>
+              </a:effectRef>
+              <a:fontRef idx="minor">
+                <a:schemeClr val="lt1"/>
+              </a:fontRef>
+            </p:style>
+            <p:txBody>
+              <a:bodyPr rtlCol="0" anchor="ctr"/>
+              <a:lstStyle/>
+              <a:p>
+                <a:pPr algn="ctr"/>
+                <a:endParaRPr lang="en-US"/>
+              </a:p>
+            </p:txBody>
+          </p:sp>
+          <p:cxnSp>
+            <p:nvCxnSpPr>
+              <p:cNvPr id="34" name="Straight Connector 33">
+                <a:extLst>
+                  <a:ext uri="{FF2B5EF4-FFF2-40B4-BE49-F238E27FC236}">
+                    <a16:creationId xmlns:a16="http://schemas.microsoft.com/office/drawing/2014/main" id="{174245C8-CC9B-4F46-9C88-393CE98B82EB}"/>
+                  </a:ext>
+                </a:extLst>
+              </p:cNvPr>
+              <p:cNvCxnSpPr/>
+              <p:nvPr/>
+            </p:nvCxnSpPr>
+            <p:spPr>
+              <a:xfrm>
+                <a:off x="3677478" y="1948070"/>
+                <a:ext cx="318052" cy="173934"/>
+              </a:xfrm>
+              <a:prstGeom prst="line">
+                <a:avLst/>
+              </a:prstGeom>
+            </p:spPr>
+            <p:style>
+              <a:lnRef idx="1">
+                <a:schemeClr val="accent1"/>
+              </a:lnRef>
+              <a:fillRef idx="0">
+                <a:schemeClr val="accent1"/>
+              </a:fillRef>
+              <a:effectRef idx="0">
+                <a:schemeClr val="accent1"/>
+              </a:effectRef>
+              <a:fontRef idx="minor">
+                <a:schemeClr val="tx1"/>
+              </a:fontRef>
+            </p:style>
+          </p:cxnSp>
+          <p:cxnSp>
+            <p:nvCxnSpPr>
+              <p:cNvPr id="35" name="Straight Connector 34">
+                <a:extLst>
+                  <a:ext uri="{FF2B5EF4-FFF2-40B4-BE49-F238E27FC236}">
+                    <a16:creationId xmlns:a16="http://schemas.microsoft.com/office/drawing/2014/main" id="{F9228FD5-212B-B643-8F9F-41CA1A58EBBE}"/>
+                  </a:ext>
+                </a:extLst>
+              </p:cNvPr>
+              <p:cNvCxnSpPr>
+                <a:cxnSpLocks/>
+              </p:cNvCxnSpPr>
+              <p:nvPr/>
+            </p:nvCxnSpPr>
+            <p:spPr>
+              <a:xfrm flipH="1">
+                <a:off x="3677478" y="2122004"/>
+                <a:ext cx="318052" cy="173934"/>
+              </a:xfrm>
+              <a:prstGeom prst="line">
+                <a:avLst/>
+              </a:prstGeom>
+            </p:spPr>
+            <p:style>
+              <a:lnRef idx="1">
+                <a:schemeClr val="accent1"/>
+              </a:lnRef>
+              <a:fillRef idx="0">
+                <a:schemeClr val="accent1"/>
+              </a:fillRef>
+              <a:effectRef idx="0">
+                <a:schemeClr val="accent1"/>
+              </a:effectRef>
+              <a:fontRef idx="minor">
+                <a:schemeClr val="tx1"/>
+              </a:fontRef>
+            </p:style>
+          </p:cxnSp>
+        </p:grpSp>
+        <p:sp>
+          <p:nvSpPr>
+            <p:cNvPr id="36" name="TextBox 35">
+              <a:extLst>
+                <a:ext uri="{FF2B5EF4-FFF2-40B4-BE49-F238E27FC236}">
+                  <a16:creationId xmlns:a16="http://schemas.microsoft.com/office/drawing/2014/main" id="{5D52C813-EE5E-0449-B995-A25E7AA1FE38}"/>
+                </a:ext>
+              </a:extLst>
+            </p:cNvPr>
+            <p:cNvSpPr txBox="1"/>
+            <p:nvPr/>
+          </p:nvSpPr>
+          <p:spPr>
+            <a:xfrm>
+              <a:off x="4583610" y="1947901"/>
+              <a:ext cx="675861" cy="369332"/>
+            </a:xfrm>
+            <a:prstGeom prst="rect">
+              <a:avLst/>
+            </a:prstGeom>
+            <a:noFill/>
+          </p:spPr>
+          <p:txBody>
+            <a:bodyPr wrap="square" rtlCol="0">
+              <a:spAutoFit/>
+            </a:bodyPr>
+            <a:lstStyle/>
+            <a:p>
+              <a:r>
+                <a:rPr lang="en-US" dirty="0"/>
+                <a:t>in</a:t>
+              </a:r>
+              <a:r>
+                <a:rPr lang="en-US" baseline="-25000" dirty="0"/>
+                <a:t>1</a:t>
+              </a:r>
+            </a:p>
+          </p:txBody>
+        </p:sp>
+        <p:sp>
+          <p:nvSpPr>
+            <p:cNvPr id="37" name="TextBox 36">
+              <a:extLst>
+                <a:ext uri="{FF2B5EF4-FFF2-40B4-BE49-F238E27FC236}">
+                  <a16:creationId xmlns:a16="http://schemas.microsoft.com/office/drawing/2014/main" id="{6D747D3D-9567-8E45-9246-ED6F14972F17}"/>
+                </a:ext>
+              </a:extLst>
+            </p:cNvPr>
+            <p:cNvSpPr txBox="1"/>
+            <p:nvPr/>
+          </p:nvSpPr>
+          <p:spPr>
+            <a:xfrm>
+              <a:off x="4591899" y="2499439"/>
+              <a:ext cx="675861" cy="369332"/>
+            </a:xfrm>
+            <a:prstGeom prst="rect">
+              <a:avLst/>
+            </a:prstGeom>
+            <a:noFill/>
+          </p:spPr>
+          <p:txBody>
+            <a:bodyPr wrap="square" rtlCol="0">
+              <a:spAutoFit/>
+            </a:bodyPr>
+            <a:lstStyle/>
+            <a:p>
+              <a:r>
+                <a:rPr lang="en-US" dirty="0"/>
+                <a:t>in</a:t>
+              </a:r>
+              <a:r>
+                <a:rPr lang="en-US" baseline="-25000" dirty="0"/>
+                <a:t>2</a:t>
+              </a:r>
+            </a:p>
+          </p:txBody>
+        </p:sp>
+        <p:sp>
+          <p:nvSpPr>
+            <p:cNvPr id="38" name="TextBox 37">
+              <a:extLst>
+                <a:ext uri="{FF2B5EF4-FFF2-40B4-BE49-F238E27FC236}">
+                  <a16:creationId xmlns:a16="http://schemas.microsoft.com/office/drawing/2014/main" id="{BCEF47A8-5892-5742-857F-1D236EE50AC1}"/>
+                </a:ext>
+              </a:extLst>
+            </p:cNvPr>
+            <p:cNvSpPr txBox="1"/>
+            <p:nvPr/>
+          </p:nvSpPr>
+          <p:spPr>
+            <a:xfrm>
+              <a:off x="4583610" y="3133109"/>
+              <a:ext cx="675861" cy="369332"/>
+            </a:xfrm>
+            <a:prstGeom prst="rect">
+              <a:avLst/>
+            </a:prstGeom>
+            <a:noFill/>
+          </p:spPr>
+          <p:txBody>
+            <a:bodyPr wrap="square" rtlCol="0">
+              <a:spAutoFit/>
+            </a:bodyPr>
+            <a:lstStyle/>
+            <a:p>
+              <a:r>
+                <a:rPr lang="en-US" dirty="0"/>
+                <a:t>in</a:t>
+              </a:r>
+              <a:r>
+                <a:rPr lang="en-US" baseline="-25000" dirty="0"/>
+                <a:t>n</a:t>
+              </a:r>
+            </a:p>
+          </p:txBody>
+        </p:sp>
+        <p:grpSp>
+          <p:nvGrpSpPr>
+            <p:cNvPr id="42" name="Group 41">
+              <a:extLst>
+                <a:ext uri="{FF2B5EF4-FFF2-40B4-BE49-F238E27FC236}">
+                  <a16:creationId xmlns:a16="http://schemas.microsoft.com/office/drawing/2014/main" id="{96DB6516-C271-8540-A366-FD7425D88C22}"/>
+                </a:ext>
+              </a:extLst>
+            </p:cNvPr>
+            <p:cNvGrpSpPr/>
+            <p:nvPr/>
+          </p:nvGrpSpPr>
+          <p:grpSpPr>
+            <a:xfrm>
+              <a:off x="4692940" y="2863926"/>
+              <a:ext cx="49696" cy="274028"/>
+              <a:chOff x="2206487" y="2764770"/>
+              <a:chExt cx="49696" cy="274028"/>
+            </a:xfrm>
+          </p:grpSpPr>
+          <p:sp>
+            <p:nvSpPr>
+              <p:cNvPr id="39" name="Oval 38">
+                <a:extLst>
+                  <a:ext uri="{FF2B5EF4-FFF2-40B4-BE49-F238E27FC236}">
+                    <a16:creationId xmlns:a16="http://schemas.microsoft.com/office/drawing/2014/main" id="{CA750024-EBBF-D64D-9927-B5ACDDC7DD0C}"/>
+                  </a:ext>
+                </a:extLst>
+              </p:cNvPr>
+              <p:cNvSpPr/>
+              <p:nvPr/>
+            </p:nvSpPr>
+            <p:spPr>
+              <a:xfrm>
+                <a:off x="2206487" y="2764770"/>
+                <a:ext cx="49696" cy="45719"/>
+              </a:xfrm>
+              <a:prstGeom prst="ellipse">
+                <a:avLst/>
+              </a:prstGeom>
+            </p:spPr>
+            <p:style>
+              <a:lnRef idx="2">
+                <a:schemeClr val="accent1">
+                  <a:shade val="50000"/>
+                </a:schemeClr>
+              </a:lnRef>
+              <a:fillRef idx="1">
+                <a:schemeClr val="accent1"/>
+              </a:fillRef>
+              <a:effectRef idx="0">
+                <a:schemeClr val="accent1"/>
+              </a:effectRef>
+              <a:fontRef idx="minor">
+                <a:schemeClr val="lt1"/>
+              </a:fontRef>
+            </p:style>
+            <p:txBody>
+              <a:bodyPr rtlCol="0" anchor="ctr"/>
+              <a:lstStyle/>
+              <a:p>
+                <a:pPr algn="ctr"/>
+                <a:endParaRPr lang="en-US"/>
+              </a:p>
+            </p:txBody>
+          </p:sp>
+          <p:sp>
+            <p:nvSpPr>
+              <p:cNvPr id="40" name="Oval 39">
+                <a:extLst>
+                  <a:ext uri="{FF2B5EF4-FFF2-40B4-BE49-F238E27FC236}">
+                    <a16:creationId xmlns:a16="http://schemas.microsoft.com/office/drawing/2014/main" id="{0A85A070-EB76-8F47-8A44-B5D81E5E7BBF}"/>
+                  </a:ext>
+                </a:extLst>
+              </p:cNvPr>
+              <p:cNvSpPr/>
+              <p:nvPr/>
+            </p:nvSpPr>
+            <p:spPr>
+              <a:xfrm>
+                <a:off x="2206487" y="2874611"/>
+                <a:ext cx="49696" cy="45719"/>
+              </a:xfrm>
+              <a:prstGeom prst="ellipse">
+                <a:avLst/>
+              </a:prstGeom>
+            </p:spPr>
+            <p:style>
+              <a:lnRef idx="2">
+                <a:schemeClr val="accent1">
+                  <a:shade val="50000"/>
+                </a:schemeClr>
+              </a:lnRef>
+              <a:fillRef idx="1">
+                <a:schemeClr val="accent1"/>
+              </a:fillRef>
+              <a:effectRef idx="0">
+                <a:schemeClr val="accent1"/>
+              </a:effectRef>
+              <a:fontRef idx="minor">
+                <a:schemeClr val="lt1"/>
+              </a:fontRef>
+            </p:style>
+            <p:txBody>
+              <a:bodyPr rtlCol="0" anchor="ctr"/>
+              <a:lstStyle/>
+              <a:p>
+                <a:pPr algn="ctr"/>
+                <a:endParaRPr lang="en-US"/>
+              </a:p>
+            </p:txBody>
+          </p:sp>
+          <p:sp>
+            <p:nvSpPr>
+              <p:cNvPr id="41" name="Oval 40">
+                <a:extLst>
+                  <a:ext uri="{FF2B5EF4-FFF2-40B4-BE49-F238E27FC236}">
+                    <a16:creationId xmlns:a16="http://schemas.microsoft.com/office/drawing/2014/main" id="{9EEA8161-0354-7E49-BC87-1696795B4E75}"/>
+                  </a:ext>
+                </a:extLst>
+              </p:cNvPr>
+              <p:cNvSpPr/>
+              <p:nvPr/>
+            </p:nvSpPr>
+            <p:spPr>
+              <a:xfrm>
+                <a:off x="2206487" y="2993079"/>
+                <a:ext cx="49696" cy="45719"/>
+              </a:xfrm>
+              <a:prstGeom prst="ellipse">
+                <a:avLst/>
+              </a:prstGeom>
+            </p:spPr>
+            <p:style>
+              <a:lnRef idx="2">
+                <a:schemeClr val="accent1">
+                  <a:shade val="50000"/>
+                </a:schemeClr>
+              </a:lnRef>
+              <a:fillRef idx="1">
+                <a:schemeClr val="accent1"/>
+              </a:fillRef>
+              <a:effectRef idx="0">
+                <a:schemeClr val="accent1"/>
+              </a:effectRef>
+              <a:fontRef idx="minor">
+                <a:schemeClr val="lt1"/>
+              </a:fontRef>
+            </p:style>
+            <p:txBody>
+              <a:bodyPr rtlCol="0" anchor="ctr"/>
+              <a:lstStyle/>
+              <a:p>
+                <a:pPr algn="ctr"/>
+                <a:endParaRPr lang="en-US"/>
+              </a:p>
+            </p:txBody>
+          </p:sp>
+        </p:grpSp>
+        <p:sp>
+          <p:nvSpPr>
+            <p:cNvPr id="43" name="TextBox 42">
+              <a:extLst>
+                <a:ext uri="{FF2B5EF4-FFF2-40B4-BE49-F238E27FC236}">
+                  <a16:creationId xmlns:a16="http://schemas.microsoft.com/office/drawing/2014/main" id="{3C90CBA2-DCBD-E646-B347-F7390AE7B6B5}"/>
+                </a:ext>
+              </a:extLst>
+            </p:cNvPr>
+            <p:cNvSpPr txBox="1"/>
+            <p:nvPr/>
+          </p:nvSpPr>
+          <p:spPr>
+            <a:xfrm>
+              <a:off x="6216945" y="1941277"/>
+              <a:ext cx="675861" cy="369332"/>
+            </a:xfrm>
+            <a:prstGeom prst="rect">
+              <a:avLst/>
+            </a:prstGeom>
+            <a:noFill/>
+          </p:spPr>
+          <p:txBody>
+            <a:bodyPr wrap="square" rtlCol="0">
+              <a:spAutoFit/>
+            </a:bodyPr>
+            <a:lstStyle/>
+            <a:p>
+              <a:pPr algn="r"/>
+              <a:r>
+                <a:rPr lang="en-US" dirty="0"/>
+                <a:t>out</a:t>
+              </a:r>
+              <a:r>
+                <a:rPr lang="en-US" baseline="-25000" dirty="0"/>
+                <a:t>1</a:t>
+              </a:r>
+            </a:p>
+          </p:txBody>
+        </p:sp>
+        <p:sp>
+          <p:nvSpPr>
+            <p:cNvPr id="44" name="TextBox 43">
+              <a:extLst>
+                <a:ext uri="{FF2B5EF4-FFF2-40B4-BE49-F238E27FC236}">
+                  <a16:creationId xmlns:a16="http://schemas.microsoft.com/office/drawing/2014/main" id="{F5FDA4F8-7651-F441-8471-FE6D19BB1CB0}"/>
+                </a:ext>
+              </a:extLst>
+            </p:cNvPr>
+            <p:cNvSpPr txBox="1"/>
+            <p:nvPr/>
+          </p:nvSpPr>
+          <p:spPr>
+            <a:xfrm>
+              <a:off x="6225234" y="2492815"/>
+              <a:ext cx="675861" cy="369332"/>
+            </a:xfrm>
+            <a:prstGeom prst="rect">
+              <a:avLst/>
+            </a:prstGeom>
+            <a:noFill/>
+          </p:spPr>
+          <p:txBody>
+            <a:bodyPr wrap="square" rtlCol="0">
+              <a:spAutoFit/>
+            </a:bodyPr>
+            <a:lstStyle/>
+            <a:p>
+              <a:pPr algn="r"/>
+              <a:r>
+                <a:rPr lang="en-US" dirty="0"/>
+                <a:t>out</a:t>
+              </a:r>
+              <a:r>
+                <a:rPr lang="en-US" baseline="-25000" dirty="0"/>
+                <a:t>2</a:t>
+              </a:r>
+            </a:p>
+          </p:txBody>
+        </p:sp>
+        <p:sp>
+          <p:nvSpPr>
+            <p:cNvPr id="45" name="TextBox 44">
+              <a:extLst>
+                <a:ext uri="{FF2B5EF4-FFF2-40B4-BE49-F238E27FC236}">
+                  <a16:creationId xmlns:a16="http://schemas.microsoft.com/office/drawing/2014/main" id="{EF5DC856-C70F-1347-A6D4-8A051134F6F8}"/>
+                </a:ext>
+              </a:extLst>
+            </p:cNvPr>
+            <p:cNvSpPr txBox="1"/>
+            <p:nvPr/>
+          </p:nvSpPr>
+          <p:spPr>
+            <a:xfrm>
+              <a:off x="6216945" y="3126485"/>
+              <a:ext cx="675861" cy="369332"/>
+            </a:xfrm>
+            <a:prstGeom prst="rect">
+              <a:avLst/>
+            </a:prstGeom>
+            <a:noFill/>
+          </p:spPr>
+          <p:txBody>
+            <a:bodyPr wrap="square" rtlCol="0">
+              <a:spAutoFit/>
+            </a:bodyPr>
+            <a:lstStyle/>
+            <a:p>
+              <a:pPr algn="r"/>
+              <a:r>
+                <a:rPr lang="en-US" dirty="0" err="1"/>
+                <a:t>out</a:t>
+              </a:r>
+              <a:r>
+                <a:rPr lang="en-US" baseline="-25000" dirty="0" err="1"/>
+                <a:t>m</a:t>
+              </a:r>
+              <a:endParaRPr lang="en-US" baseline="-25000" dirty="0"/>
+            </a:p>
+          </p:txBody>
+        </p:sp>
+        <p:grpSp>
+          <p:nvGrpSpPr>
+            <p:cNvPr id="46" name="Group 45">
+              <a:extLst>
+                <a:ext uri="{FF2B5EF4-FFF2-40B4-BE49-F238E27FC236}">
+                  <a16:creationId xmlns:a16="http://schemas.microsoft.com/office/drawing/2014/main" id="{01B46584-359B-A94F-B185-E5D1A20558F7}"/>
+                </a:ext>
+              </a:extLst>
+            </p:cNvPr>
+            <p:cNvGrpSpPr/>
+            <p:nvPr/>
+          </p:nvGrpSpPr>
+          <p:grpSpPr>
+            <a:xfrm>
+              <a:off x="6326275" y="2857302"/>
+              <a:ext cx="49696" cy="274028"/>
+              <a:chOff x="2206487" y="2764770"/>
+              <a:chExt cx="49696" cy="274028"/>
+            </a:xfrm>
+          </p:grpSpPr>
+          <p:sp>
+            <p:nvSpPr>
+              <p:cNvPr id="47" name="Oval 46">
+                <a:extLst>
+                  <a:ext uri="{FF2B5EF4-FFF2-40B4-BE49-F238E27FC236}">
+                    <a16:creationId xmlns:a16="http://schemas.microsoft.com/office/drawing/2014/main" id="{CE69D686-D1C8-EA41-8A32-3CE03956AB99}"/>
+                  </a:ext>
+                </a:extLst>
+              </p:cNvPr>
+              <p:cNvSpPr/>
+              <p:nvPr/>
+            </p:nvSpPr>
+            <p:spPr>
+              <a:xfrm>
+                <a:off x="2206487" y="2764770"/>
+                <a:ext cx="49696" cy="45719"/>
+              </a:xfrm>
+              <a:prstGeom prst="ellipse">
+                <a:avLst/>
+              </a:prstGeom>
+            </p:spPr>
+            <p:style>
+              <a:lnRef idx="2">
+                <a:schemeClr val="accent1">
+                  <a:shade val="50000"/>
+                </a:schemeClr>
+              </a:lnRef>
+              <a:fillRef idx="1">
+                <a:schemeClr val="accent1"/>
+              </a:fillRef>
+              <a:effectRef idx="0">
+                <a:schemeClr val="accent1"/>
+              </a:effectRef>
+              <a:fontRef idx="minor">
+                <a:schemeClr val="lt1"/>
+              </a:fontRef>
+            </p:style>
+            <p:txBody>
+              <a:bodyPr rtlCol="0" anchor="ctr"/>
+              <a:lstStyle/>
+              <a:p>
+                <a:pPr algn="r"/>
+                <a:endParaRPr lang="en-US"/>
+              </a:p>
+            </p:txBody>
+          </p:sp>
+          <p:sp>
+            <p:nvSpPr>
+              <p:cNvPr id="48" name="Oval 47">
+                <a:extLst>
+                  <a:ext uri="{FF2B5EF4-FFF2-40B4-BE49-F238E27FC236}">
+                    <a16:creationId xmlns:a16="http://schemas.microsoft.com/office/drawing/2014/main" id="{4935B9BF-51D0-6C42-A1C2-9ED8D50D8FCC}"/>
+                  </a:ext>
+                </a:extLst>
+              </p:cNvPr>
+              <p:cNvSpPr/>
+              <p:nvPr/>
+            </p:nvSpPr>
+            <p:spPr>
+              <a:xfrm>
+                <a:off x="2206487" y="2874611"/>
+                <a:ext cx="49696" cy="45719"/>
+              </a:xfrm>
+              <a:prstGeom prst="ellipse">
+                <a:avLst/>
+              </a:prstGeom>
+            </p:spPr>
+            <p:style>
+              <a:lnRef idx="2">
+                <a:schemeClr val="accent1">
+                  <a:shade val="50000"/>
+                </a:schemeClr>
+              </a:lnRef>
+              <a:fillRef idx="1">
+                <a:schemeClr val="accent1"/>
+              </a:fillRef>
+              <a:effectRef idx="0">
+                <a:schemeClr val="accent1"/>
+              </a:effectRef>
+              <a:fontRef idx="minor">
+                <a:schemeClr val="lt1"/>
+              </a:fontRef>
+            </p:style>
+            <p:txBody>
+              <a:bodyPr rtlCol="0" anchor="ctr"/>
+              <a:lstStyle/>
+              <a:p>
+                <a:pPr algn="r"/>
+                <a:endParaRPr lang="en-US"/>
+              </a:p>
+            </p:txBody>
+          </p:sp>
+          <p:sp>
+            <p:nvSpPr>
+              <p:cNvPr id="49" name="Oval 48">
+                <a:extLst>
+                  <a:ext uri="{FF2B5EF4-FFF2-40B4-BE49-F238E27FC236}">
+                    <a16:creationId xmlns:a16="http://schemas.microsoft.com/office/drawing/2014/main" id="{D2022AF9-AA9C-4044-A69D-C54F2356D5A4}"/>
+                  </a:ext>
+                </a:extLst>
+              </p:cNvPr>
+              <p:cNvSpPr/>
+              <p:nvPr/>
+            </p:nvSpPr>
+            <p:spPr>
+              <a:xfrm>
+                <a:off x="2206487" y="2993079"/>
+                <a:ext cx="49696" cy="45719"/>
+              </a:xfrm>
+              <a:prstGeom prst="ellipse">
+                <a:avLst/>
+              </a:prstGeom>
+            </p:spPr>
+            <p:style>
+              <a:lnRef idx="2">
+                <a:schemeClr val="accent1">
+                  <a:shade val="50000"/>
+                </a:schemeClr>
+              </a:lnRef>
+              <a:fillRef idx="1">
+                <a:schemeClr val="accent1"/>
+              </a:fillRef>
+              <a:effectRef idx="0">
+                <a:schemeClr val="accent1"/>
+              </a:effectRef>
+              <a:fontRef idx="minor">
+                <a:schemeClr val="lt1"/>
+              </a:fontRef>
+            </p:style>
+            <p:txBody>
+              <a:bodyPr rtlCol="0" anchor="ctr"/>
+              <a:lstStyle/>
+              <a:p>
+                <a:pPr algn="r"/>
+                <a:endParaRPr lang="en-US"/>
+              </a:p>
+            </p:txBody>
+          </p:sp>
+        </p:grpSp>
+        <p:cxnSp>
+          <p:nvCxnSpPr>
+            <p:cNvPr id="53" name="Straight Connector 52">
+              <a:extLst>
+                <a:ext uri="{FF2B5EF4-FFF2-40B4-BE49-F238E27FC236}">
+                  <a16:creationId xmlns:a16="http://schemas.microsoft.com/office/drawing/2014/main" id="{D5A80C60-5B88-714B-936C-7B0FBD2AC9F7}"/>
+                </a:ext>
+              </a:extLst>
+            </p:cNvPr>
+            <p:cNvCxnSpPr>
+              <a:endCxn id="7" idx="3"/>
+            </p:cNvCxnSpPr>
+            <p:nvPr/>
+          </p:nvCxnSpPr>
+          <p:spPr>
+            <a:xfrm>
+              <a:off x="3458818" y="2119107"/>
+              <a:ext cx="780229" cy="0"/>
+            </a:xfrm>
+            <a:prstGeom prst="line">
+              <a:avLst/>
+            </a:prstGeom>
+          </p:spPr>
+          <p:style>
+            <a:lnRef idx="1">
+              <a:schemeClr val="accent1"/>
+            </a:lnRef>
+            <a:fillRef idx="0">
+              <a:schemeClr val="accent1"/>
+            </a:fillRef>
+            <a:effectRef idx="0">
+              <a:schemeClr val="accent1"/>
+            </a:effectRef>
+            <a:fontRef idx="minor">
+              <a:schemeClr val="tx1"/>
+            </a:fontRef>
+          </p:style>
+        </p:cxnSp>
+        <p:cxnSp>
+          <p:nvCxnSpPr>
+            <p:cNvPr id="54" name="Straight Connector 53">
+              <a:extLst>
+                <a:ext uri="{FF2B5EF4-FFF2-40B4-BE49-F238E27FC236}">
+                  <a16:creationId xmlns:a16="http://schemas.microsoft.com/office/drawing/2014/main" id="{C76A9D06-13EA-9347-BBD9-22E11B809F9E}"/>
+                </a:ext>
+              </a:extLst>
+            </p:cNvPr>
+            <p:cNvCxnSpPr/>
+            <p:nvPr/>
+          </p:nvCxnSpPr>
+          <p:spPr>
+            <a:xfrm>
+              <a:off x="3458818" y="2690090"/>
+              <a:ext cx="780229" cy="0"/>
+            </a:xfrm>
+            <a:prstGeom prst="line">
+              <a:avLst/>
+            </a:prstGeom>
+          </p:spPr>
+          <p:style>
+            <a:lnRef idx="1">
+              <a:schemeClr val="accent1"/>
+            </a:lnRef>
+            <a:fillRef idx="0">
+              <a:schemeClr val="accent1"/>
+            </a:fillRef>
+            <a:effectRef idx="0">
+              <a:schemeClr val="accent1"/>
+            </a:effectRef>
+            <a:fontRef idx="minor">
+              <a:schemeClr val="tx1"/>
+            </a:fontRef>
+          </p:style>
+        </p:cxnSp>
+        <p:cxnSp>
+          <p:nvCxnSpPr>
+            <p:cNvPr id="55" name="Straight Connector 54">
+              <a:extLst>
+                <a:ext uri="{FF2B5EF4-FFF2-40B4-BE49-F238E27FC236}">
+                  <a16:creationId xmlns:a16="http://schemas.microsoft.com/office/drawing/2014/main" id="{C25860E2-38DE-CA49-A450-3DE2DF6D84DA}"/>
+                </a:ext>
+              </a:extLst>
+            </p:cNvPr>
+            <p:cNvCxnSpPr/>
+            <p:nvPr/>
+          </p:nvCxnSpPr>
+          <p:spPr>
+            <a:xfrm>
+              <a:off x="3458818" y="3298378"/>
+              <a:ext cx="780229" cy="0"/>
+            </a:xfrm>
+            <a:prstGeom prst="line">
+              <a:avLst/>
+            </a:prstGeom>
+          </p:spPr>
+          <p:style>
+            <a:lnRef idx="1">
+              <a:schemeClr val="accent1"/>
+            </a:lnRef>
+            <a:fillRef idx="0">
+              <a:schemeClr val="accent1"/>
+            </a:fillRef>
+            <a:effectRef idx="0">
+              <a:schemeClr val="accent1"/>
+            </a:effectRef>
+            <a:fontRef idx="minor">
+              <a:schemeClr val="tx1"/>
+            </a:fontRef>
+          </p:style>
+        </p:cxnSp>
+        <p:cxnSp>
+          <p:nvCxnSpPr>
+            <p:cNvPr id="56" name="Straight Connector 55">
+              <a:extLst>
+                <a:ext uri="{FF2B5EF4-FFF2-40B4-BE49-F238E27FC236}">
+                  <a16:creationId xmlns:a16="http://schemas.microsoft.com/office/drawing/2014/main" id="{EEC84CC5-E604-0F43-94F6-A99719619366}"/>
+                </a:ext>
+              </a:extLst>
+            </p:cNvPr>
+            <p:cNvCxnSpPr/>
+            <p:nvPr/>
+          </p:nvCxnSpPr>
+          <p:spPr>
+            <a:xfrm>
+              <a:off x="7325140" y="2113516"/>
+              <a:ext cx="780229" cy="0"/>
+            </a:xfrm>
+            <a:prstGeom prst="line">
+              <a:avLst/>
+            </a:prstGeom>
+          </p:spPr>
+          <p:style>
+            <a:lnRef idx="1">
+              <a:schemeClr val="accent1"/>
+            </a:lnRef>
+            <a:fillRef idx="0">
+              <a:schemeClr val="accent1"/>
+            </a:fillRef>
+            <a:effectRef idx="0">
+              <a:schemeClr val="accent1"/>
+            </a:effectRef>
+            <a:fontRef idx="minor">
+              <a:schemeClr val="tx1"/>
+            </a:fontRef>
+          </p:style>
+        </p:cxnSp>
+        <p:cxnSp>
+          <p:nvCxnSpPr>
+            <p:cNvPr id="57" name="Straight Connector 56">
+              <a:extLst>
+                <a:ext uri="{FF2B5EF4-FFF2-40B4-BE49-F238E27FC236}">
+                  <a16:creationId xmlns:a16="http://schemas.microsoft.com/office/drawing/2014/main" id="{B82B307D-C6F9-C940-824C-C0FEB1D44C07}"/>
+                </a:ext>
+              </a:extLst>
+            </p:cNvPr>
+            <p:cNvCxnSpPr/>
+            <p:nvPr/>
+          </p:nvCxnSpPr>
+          <p:spPr>
+            <a:xfrm>
+              <a:off x="7325140" y="2684499"/>
+              <a:ext cx="780229" cy="0"/>
+            </a:xfrm>
+            <a:prstGeom prst="line">
+              <a:avLst/>
+            </a:prstGeom>
+          </p:spPr>
+          <p:style>
+            <a:lnRef idx="1">
+              <a:schemeClr val="accent1"/>
+            </a:lnRef>
+            <a:fillRef idx="0">
+              <a:schemeClr val="accent1"/>
+            </a:fillRef>
+            <a:effectRef idx="0">
+              <a:schemeClr val="accent1"/>
+            </a:effectRef>
+            <a:fontRef idx="minor">
+              <a:schemeClr val="tx1"/>
+            </a:fontRef>
+          </p:style>
+        </p:cxnSp>
+        <p:cxnSp>
+          <p:nvCxnSpPr>
+            <p:cNvPr id="58" name="Straight Connector 57">
+              <a:extLst>
+                <a:ext uri="{FF2B5EF4-FFF2-40B4-BE49-F238E27FC236}">
+                  <a16:creationId xmlns:a16="http://schemas.microsoft.com/office/drawing/2014/main" id="{FD9CF092-FFE7-7049-B409-FA5E185E7512}"/>
+                </a:ext>
+              </a:extLst>
+            </p:cNvPr>
+            <p:cNvCxnSpPr/>
+            <p:nvPr/>
+          </p:nvCxnSpPr>
+          <p:spPr>
+            <a:xfrm>
+              <a:off x="7325140" y="3292787"/>
+              <a:ext cx="780229" cy="0"/>
+            </a:xfrm>
+            <a:prstGeom prst="line">
+              <a:avLst/>
+            </a:prstGeom>
+          </p:spPr>
+          <p:style>
+            <a:lnRef idx="1">
+              <a:schemeClr val="accent1"/>
+            </a:lnRef>
+            <a:fillRef idx="0">
+              <a:schemeClr val="accent1"/>
+            </a:fillRef>
+            <a:effectRef idx="0">
+              <a:schemeClr val="accent1"/>
+            </a:effectRef>
+            <a:fontRef idx="minor">
+              <a:schemeClr val="tx1"/>
+            </a:fontRef>
+          </p:style>
+        </p:cxnSp>
+      </p:grpSp>
+      <p:sp>
+        <p:nvSpPr>
+          <p:cNvPr id="105" name="TextBox 104">
+            <a:extLst>
+              <a:ext uri="{FF2B5EF4-FFF2-40B4-BE49-F238E27FC236}">
+                <a16:creationId xmlns:a16="http://schemas.microsoft.com/office/drawing/2014/main" id="{0A4EB2E2-68B6-7B4E-8FEF-1AB53D094CC1}"/>
+              </a:ext>
+            </a:extLst>
+          </p:cNvPr>
+          <p:cNvSpPr txBox="1"/>
+          <p:nvPr/>
+        </p:nvSpPr>
+        <p:spPr>
+          <a:xfrm>
+            <a:off x="69574" y="3882027"/>
+            <a:ext cx="12122426" cy="3416320"/>
+          </a:xfrm>
+          <a:prstGeom prst="rect">
+            <a:avLst/>
+          </a:prstGeom>
+          <a:noFill/>
+        </p:spPr>
+        <p:txBody>
+          <a:bodyPr wrap="square" rtlCol="0">
+            <a:spAutoFit/>
+          </a:bodyPr>
+          <a:lstStyle/>
+          <a:p>
+            <a:r>
+              <a:rPr lang="en-US" dirty="0">
+                <a:solidFill>
+                  <a:schemeClr val="accent6"/>
+                </a:solidFill>
+                <a:latin typeface="Lucida Console" panose="020B0609040504020204" pitchFamily="49" charset="0"/>
+              </a:rPr>
+              <a:t>-- Define when out</a:t>
+            </a:r>
+            <a:r>
+              <a:rPr lang="en-US" baseline="-25000" dirty="0">
+                <a:solidFill>
+                  <a:schemeClr val="accent6"/>
+                </a:solidFill>
+                <a:latin typeface="Lucida Console" panose="020B0609040504020204" pitchFamily="49" charset="0"/>
+              </a:rPr>
+              <a:t>1</a:t>
+            </a:r>
+            <a:r>
+              <a:rPr lang="en-US" dirty="0">
+                <a:solidFill>
+                  <a:schemeClr val="accent6"/>
+                </a:solidFill>
+                <a:latin typeface="Lucida Console" panose="020B0609040504020204" pitchFamily="49" charset="0"/>
+              </a:rPr>
+              <a:t> fires relative to input and output events and values</a:t>
+            </a:r>
+          </a:p>
+          <a:p>
+            <a:r>
+              <a:rPr lang="en-US" b="1" dirty="0">
+                <a:solidFill>
+                  <a:srgbClr val="7030A0"/>
+                </a:solidFill>
+                <a:latin typeface="Lucida Console" panose="020B0609040504020204" pitchFamily="49" charset="0"/>
+              </a:rPr>
+              <a:t>guarantee</a:t>
+            </a:r>
+            <a:r>
+              <a:rPr lang="en-US" dirty="0">
+                <a:latin typeface="Lucida Console" panose="020B0609040504020204" pitchFamily="49" charset="0"/>
+              </a:rPr>
+              <a:t> event_out</a:t>
+            </a:r>
+            <a:r>
+              <a:rPr lang="en-US" baseline="-25000" dirty="0">
+                <a:latin typeface="Lucida Console" panose="020B0609040504020204" pitchFamily="49" charset="0"/>
+              </a:rPr>
+              <a:t>1</a:t>
+            </a:r>
+            <a:r>
+              <a:rPr lang="en-US" dirty="0">
+                <a:latin typeface="Lucida Console" panose="020B0609040504020204" pitchFamily="49" charset="0"/>
+              </a:rPr>
+              <a:t> </a:t>
+            </a:r>
+            <a:r>
+              <a:rPr lang="en-US" dirty="0">
+                <a:solidFill>
+                  <a:schemeClr val="accent1"/>
+                </a:solidFill>
+                <a:latin typeface="Lucida Console" panose="020B0609040504020204" pitchFamily="49" charset="0"/>
+              </a:rPr>
+              <a:t>”out</a:t>
+            </a:r>
+            <a:r>
+              <a:rPr lang="en-US" baseline="-25000" dirty="0">
+                <a:solidFill>
+                  <a:schemeClr val="accent1"/>
+                </a:solidFill>
+                <a:latin typeface="Lucida Console" panose="020B0609040504020204" pitchFamily="49" charset="0"/>
+              </a:rPr>
+              <a:t>1</a:t>
+            </a:r>
+            <a:r>
+              <a:rPr lang="en-US" dirty="0">
+                <a:solidFill>
+                  <a:schemeClr val="accent1"/>
+                </a:solidFill>
+                <a:latin typeface="Lucida Console" panose="020B0609040504020204" pitchFamily="49" charset="0"/>
+              </a:rPr>
+              <a:t> event condition”</a:t>
+            </a:r>
+            <a:r>
+              <a:rPr lang="en-US" dirty="0">
+                <a:latin typeface="Lucida Console" panose="020B0609040504020204" pitchFamily="49" charset="0"/>
+              </a:rPr>
+              <a:t>: </a:t>
+            </a:r>
+          </a:p>
+          <a:p>
+            <a:r>
+              <a:rPr lang="en-US" dirty="0">
+                <a:latin typeface="Lucida Console" panose="020B0609040504020204" pitchFamily="49" charset="0"/>
+              </a:rPr>
+              <a:t>  event(out</a:t>
+            </a:r>
+            <a:r>
+              <a:rPr lang="en-US" baseline="-25000" dirty="0">
+                <a:latin typeface="Lucida Console" panose="020B0609040504020204" pitchFamily="49" charset="0"/>
+              </a:rPr>
+              <a:t>1</a:t>
+            </a:r>
+            <a:r>
+              <a:rPr lang="en-US" dirty="0">
+                <a:latin typeface="Lucida Console" panose="020B0609040504020204" pitchFamily="49" charset="0"/>
+              </a:rPr>
+              <a:t>) &lt;=&gt; (event(</a:t>
+            </a:r>
+            <a:r>
+              <a:rPr lang="en-US" dirty="0" err="1">
+                <a:latin typeface="Lucida Console" panose="020B0609040504020204" pitchFamily="49" charset="0"/>
+              </a:rPr>
+              <a:t>in</a:t>
+            </a:r>
+            <a:r>
+              <a:rPr lang="en-US" baseline="-25000" dirty="0" err="1">
+                <a:latin typeface="Lucida Console" panose="020B0609040504020204" pitchFamily="49" charset="0"/>
+              </a:rPr>
+              <a:t>i</a:t>
+            </a:r>
+            <a:r>
+              <a:rPr lang="en-US" dirty="0">
+                <a:latin typeface="Lucida Console" panose="020B0609040504020204" pitchFamily="49" charset="0"/>
+              </a:rPr>
+              <a:t>) and … and event(</a:t>
+            </a:r>
+            <a:r>
+              <a:rPr lang="en-US" dirty="0" err="1">
+                <a:latin typeface="Lucida Console" panose="020B0609040504020204" pitchFamily="49" charset="0"/>
+              </a:rPr>
+              <a:t>out</a:t>
+            </a:r>
+            <a:r>
+              <a:rPr lang="en-US" baseline="-25000" dirty="0" err="1">
+                <a:latin typeface="Lucida Console" panose="020B0609040504020204" pitchFamily="49" charset="0"/>
+              </a:rPr>
+              <a:t>j</a:t>
+            </a:r>
+            <a:r>
+              <a:rPr lang="en-US" dirty="0">
+                <a:latin typeface="Lucida Console" panose="020B0609040504020204" pitchFamily="49" charset="0"/>
+              </a:rPr>
+              <a:t>) and … and event_out</a:t>
+            </a:r>
+            <a:r>
+              <a:rPr lang="en-US" baseline="-25000" dirty="0">
+                <a:latin typeface="Lucida Console" panose="020B0609040504020204" pitchFamily="49" charset="0"/>
+              </a:rPr>
+              <a:t>1</a:t>
+            </a:r>
+            <a:r>
+              <a:rPr lang="en-US" dirty="0">
+                <a:latin typeface="Lucida Console" panose="020B0609040504020204" pitchFamily="49" charset="0"/>
+              </a:rPr>
+              <a:t>(</a:t>
+            </a:r>
+            <a:r>
+              <a:rPr lang="en-US" dirty="0" err="1">
+                <a:latin typeface="Lucida Console" panose="020B0609040504020204" pitchFamily="49" charset="0"/>
+              </a:rPr>
+              <a:t>in</a:t>
+            </a:r>
+            <a:r>
+              <a:rPr lang="en-US" baseline="-25000" dirty="0" err="1">
+                <a:latin typeface="Lucida Console" panose="020B0609040504020204" pitchFamily="49" charset="0"/>
+              </a:rPr>
+              <a:t>i</a:t>
+            </a:r>
+            <a:r>
+              <a:rPr lang="en-US" dirty="0">
+                <a:latin typeface="Lucida Console" panose="020B0609040504020204" pitchFamily="49" charset="0"/>
+              </a:rPr>
+              <a:t>,…,</a:t>
+            </a:r>
+            <a:r>
+              <a:rPr lang="en-US" dirty="0" err="1">
+                <a:latin typeface="Lucida Console" panose="020B0609040504020204" pitchFamily="49" charset="0"/>
+              </a:rPr>
+              <a:t>out</a:t>
+            </a:r>
+            <a:r>
+              <a:rPr lang="en-US" baseline="-25000" dirty="0" err="1">
+                <a:latin typeface="Lucida Console" panose="020B0609040504020204" pitchFamily="49" charset="0"/>
+              </a:rPr>
+              <a:t>j</a:t>
+            </a:r>
+            <a:r>
+              <a:rPr lang="en-US" dirty="0">
+                <a:latin typeface="Lucida Console" panose="020B0609040504020204" pitchFamily="49" charset="0"/>
+              </a:rPr>
+              <a:t>,…));</a:t>
+            </a:r>
+          </a:p>
+          <a:p>
+            <a:endParaRPr lang="en-US" dirty="0">
+              <a:latin typeface="Lucida Console" panose="020B0609040504020204" pitchFamily="49" charset="0"/>
+            </a:endParaRPr>
+          </a:p>
+          <a:p>
+            <a:r>
+              <a:rPr lang="en-US" dirty="0">
+                <a:solidFill>
+                  <a:schemeClr val="accent6"/>
+                </a:solidFill>
+                <a:latin typeface="Lucida Console" panose="020B0609040504020204" pitchFamily="49" charset="0"/>
+              </a:rPr>
+              <a:t>-- Define constraints on the value of out</a:t>
+            </a:r>
+            <a:r>
+              <a:rPr lang="en-US" baseline="-25000" dirty="0">
+                <a:solidFill>
+                  <a:schemeClr val="accent6"/>
+                </a:solidFill>
+                <a:latin typeface="Lucida Console" panose="020B0609040504020204" pitchFamily="49" charset="0"/>
+              </a:rPr>
+              <a:t>1</a:t>
+            </a:r>
+            <a:r>
+              <a:rPr lang="en-US" dirty="0">
+                <a:solidFill>
+                  <a:schemeClr val="accent6"/>
+                </a:solidFill>
+                <a:latin typeface="Lucida Console" panose="020B0609040504020204" pitchFamily="49" charset="0"/>
+              </a:rPr>
+              <a:t> at the time of its event</a:t>
+            </a:r>
+          </a:p>
+          <a:p>
+            <a:r>
+              <a:rPr lang="en-US" b="1" dirty="0">
+                <a:solidFill>
+                  <a:srgbClr val="7030A0"/>
+                </a:solidFill>
+                <a:latin typeface="Lucida Console" panose="020B0609040504020204" pitchFamily="49" charset="0"/>
+              </a:rPr>
+              <a:t>guarantee</a:t>
+            </a:r>
+            <a:r>
+              <a:rPr lang="en-US" dirty="0">
+                <a:latin typeface="Lucida Console" panose="020B0609040504020204" pitchFamily="49" charset="0"/>
+              </a:rPr>
+              <a:t> constraint_out</a:t>
+            </a:r>
+            <a:r>
+              <a:rPr lang="en-US" baseline="-25000" dirty="0">
+                <a:latin typeface="Lucida Console" panose="020B0609040504020204" pitchFamily="49" charset="0"/>
+              </a:rPr>
+              <a:t>1</a:t>
+            </a:r>
+            <a:r>
+              <a:rPr lang="en-US" dirty="0">
+                <a:latin typeface="Lucida Console" panose="020B0609040504020204" pitchFamily="49" charset="0"/>
+              </a:rPr>
+              <a:t> </a:t>
+            </a:r>
+            <a:r>
+              <a:rPr lang="en-US" dirty="0">
+                <a:solidFill>
+                  <a:schemeClr val="accent1"/>
+                </a:solidFill>
+                <a:latin typeface="Lucida Console" panose="020B0609040504020204" pitchFamily="49" charset="0"/>
+              </a:rPr>
+              <a:t>”out</a:t>
+            </a:r>
+            <a:r>
+              <a:rPr lang="en-US" baseline="-25000" dirty="0">
+                <a:solidFill>
+                  <a:schemeClr val="accent1"/>
+                </a:solidFill>
+                <a:latin typeface="Lucida Console" panose="020B0609040504020204" pitchFamily="49" charset="0"/>
+              </a:rPr>
+              <a:t>1</a:t>
+            </a:r>
+            <a:r>
+              <a:rPr lang="en-US" dirty="0">
+                <a:solidFill>
+                  <a:schemeClr val="accent1"/>
+                </a:solidFill>
+                <a:latin typeface="Lucida Console" panose="020B0609040504020204" pitchFamily="49" charset="0"/>
+              </a:rPr>
+              <a:t> constraint at event”</a:t>
+            </a:r>
+            <a:r>
+              <a:rPr lang="en-US" dirty="0">
+                <a:latin typeface="Lucida Console" panose="020B0609040504020204" pitchFamily="49" charset="0"/>
+              </a:rPr>
+              <a:t>: </a:t>
+            </a:r>
+          </a:p>
+          <a:p>
+            <a:r>
+              <a:rPr lang="en-US" dirty="0">
+                <a:latin typeface="Lucida Console" panose="020B0609040504020204" pitchFamily="49" charset="0"/>
+              </a:rPr>
+              <a:t>  (event(out</a:t>
+            </a:r>
+            <a:r>
+              <a:rPr lang="en-US" baseline="-25000" dirty="0">
+                <a:latin typeface="Lucida Console" panose="020B0609040504020204" pitchFamily="49" charset="0"/>
+              </a:rPr>
+              <a:t>1</a:t>
+            </a:r>
+            <a:r>
+              <a:rPr lang="en-US" dirty="0">
+                <a:latin typeface="Lucida Console" panose="020B0609040504020204" pitchFamily="49" charset="0"/>
+              </a:rPr>
+              <a:t>) and event(</a:t>
+            </a:r>
+            <a:r>
+              <a:rPr lang="en-US" dirty="0" err="1">
+                <a:latin typeface="Lucida Console" panose="020B0609040504020204" pitchFamily="49" charset="0"/>
+              </a:rPr>
+              <a:t>out</a:t>
+            </a:r>
+            <a:r>
+              <a:rPr lang="en-US" baseline="-25000" dirty="0" err="1">
+                <a:latin typeface="Lucida Console" panose="020B0609040504020204" pitchFamily="49" charset="0"/>
+              </a:rPr>
+              <a:t>j</a:t>
+            </a:r>
+            <a:r>
+              <a:rPr lang="en-US" dirty="0">
+                <a:latin typeface="Lucida Console" panose="020B0609040504020204" pitchFamily="49" charset="0"/>
+              </a:rPr>
+              <a:t>) and …)  =&gt;  constaint_out</a:t>
+            </a:r>
+            <a:r>
+              <a:rPr lang="en-US" baseline="-25000" dirty="0">
+                <a:latin typeface="Lucida Console" panose="020B0609040504020204" pitchFamily="49" charset="0"/>
+              </a:rPr>
+              <a:t>1</a:t>
+            </a:r>
+            <a:r>
+              <a:rPr lang="en-US" dirty="0">
+                <a:latin typeface="Lucida Console" panose="020B0609040504020204" pitchFamily="49" charset="0"/>
+              </a:rPr>
+              <a:t>(</a:t>
+            </a:r>
+            <a:r>
+              <a:rPr lang="en-US" dirty="0" err="1">
+                <a:latin typeface="Lucida Console" panose="020B0609040504020204" pitchFamily="49" charset="0"/>
+              </a:rPr>
+              <a:t>in</a:t>
+            </a:r>
+            <a:r>
+              <a:rPr lang="en-US" baseline="-25000" dirty="0" err="1">
+                <a:latin typeface="Lucida Console" panose="020B0609040504020204" pitchFamily="49" charset="0"/>
+              </a:rPr>
+              <a:t>i</a:t>
+            </a:r>
+            <a:r>
+              <a:rPr lang="en-US" dirty="0">
+                <a:latin typeface="Lucida Console" panose="020B0609040504020204" pitchFamily="49" charset="0"/>
+              </a:rPr>
+              <a:t>,…,</a:t>
+            </a:r>
+            <a:r>
+              <a:rPr lang="en-US" dirty="0" err="1">
+                <a:latin typeface="Lucida Console" panose="020B0609040504020204" pitchFamily="49" charset="0"/>
+              </a:rPr>
+              <a:t>out</a:t>
+            </a:r>
+            <a:r>
+              <a:rPr lang="en-US" baseline="-25000" dirty="0" err="1">
+                <a:latin typeface="Lucida Console" panose="020B0609040504020204" pitchFamily="49" charset="0"/>
+              </a:rPr>
+              <a:t>j</a:t>
+            </a:r>
+            <a:r>
+              <a:rPr lang="en-US" dirty="0">
+                <a:latin typeface="Lucida Console" panose="020B0609040504020204" pitchFamily="49" charset="0"/>
+              </a:rPr>
+              <a:t>,…);</a:t>
+            </a:r>
+          </a:p>
+          <a:p>
+            <a:endParaRPr lang="en-US" dirty="0">
+              <a:latin typeface="Lucida Console" panose="020B0609040504020204" pitchFamily="49" charset="0"/>
+            </a:endParaRPr>
+          </a:p>
+          <a:p>
+            <a:r>
+              <a:rPr lang="en-US" dirty="0">
+                <a:solidFill>
+                  <a:schemeClr val="accent6"/>
+                </a:solidFill>
+                <a:latin typeface="Lucida Console" panose="020B0609040504020204" pitchFamily="49" charset="0"/>
+              </a:rPr>
+              <a:t>-- Witness out event condition (should fail)</a:t>
+            </a:r>
+          </a:p>
+          <a:p>
+            <a:r>
+              <a:rPr lang="en-US" b="1" dirty="0">
+                <a:solidFill>
+                  <a:srgbClr val="7030A0"/>
+                </a:solidFill>
+                <a:latin typeface="Lucida Console" panose="020B0609040504020204" pitchFamily="49" charset="0"/>
+              </a:rPr>
+              <a:t>guarantee</a:t>
+            </a:r>
+            <a:r>
+              <a:rPr lang="en-US" dirty="0">
+                <a:latin typeface="Lucida Console" panose="020B0609040504020204" pitchFamily="49" charset="0"/>
+              </a:rPr>
+              <a:t> globally_no_event_out</a:t>
+            </a:r>
+            <a:r>
+              <a:rPr lang="en-US" baseline="-25000" dirty="0">
+                <a:latin typeface="Lucida Console" panose="020B0609040504020204" pitchFamily="49" charset="0"/>
+              </a:rPr>
+              <a:t>1</a:t>
+            </a:r>
+            <a:r>
+              <a:rPr lang="en-US" dirty="0">
+                <a:latin typeface="Lucida Console" panose="020B0609040504020204" pitchFamily="49" charset="0"/>
+              </a:rPr>
+              <a:t> </a:t>
+            </a:r>
+            <a:r>
+              <a:rPr lang="en-US" dirty="0">
+                <a:solidFill>
+                  <a:schemeClr val="accent1"/>
+                </a:solidFill>
+                <a:latin typeface="Lucida Console" panose="020B0609040504020204" pitchFamily="49" charset="0"/>
+              </a:rPr>
+              <a:t>”[] not(event(out</a:t>
+            </a:r>
+            <a:r>
+              <a:rPr lang="en-US" baseline="-25000" dirty="0">
+                <a:solidFill>
+                  <a:schemeClr val="accent1"/>
+                </a:solidFill>
+                <a:latin typeface="Lucida Console" panose="020B0609040504020204" pitchFamily="49" charset="0"/>
+              </a:rPr>
+              <a:t>1</a:t>
+            </a:r>
+            <a:r>
+              <a:rPr lang="en-US" dirty="0">
+                <a:solidFill>
+                  <a:schemeClr val="accent1"/>
+                </a:solidFill>
+                <a:latin typeface="Lucida Console" panose="020B0609040504020204" pitchFamily="49" charset="0"/>
+              </a:rPr>
+              <a:t>))”</a:t>
+            </a:r>
+            <a:r>
+              <a:rPr lang="en-US" dirty="0">
+                <a:latin typeface="Lucida Console" panose="020B0609040504020204" pitchFamily="49" charset="0"/>
+              </a:rPr>
+              <a:t>: not(event(out</a:t>
+            </a:r>
+            <a:r>
+              <a:rPr lang="en-US" baseline="-25000" dirty="0">
+                <a:latin typeface="Lucida Console" panose="020B0609040504020204" pitchFamily="49" charset="0"/>
+              </a:rPr>
+              <a:t>1</a:t>
+            </a:r>
+            <a:r>
+              <a:rPr lang="en-US" dirty="0">
+                <a:latin typeface="Lucida Console" panose="020B0609040504020204" pitchFamily="49" charset="0"/>
+              </a:rPr>
+              <a:t>));</a:t>
+            </a:r>
+          </a:p>
+          <a:p>
+            <a:endParaRPr lang="en-US" dirty="0">
+              <a:latin typeface="Lucida Console" panose="020B0609040504020204" pitchFamily="49" charset="0"/>
+            </a:endParaRPr>
+          </a:p>
+          <a:p>
+            <a:r>
+              <a:rPr lang="en-US" dirty="0">
+                <a:latin typeface="Lucida Console" panose="020B0609040504020204" pitchFamily="49" charset="0"/>
+              </a:rPr>
+              <a:t> </a:t>
+            </a:r>
+          </a:p>
+        </p:txBody>
+      </p:sp>
+    </p:spTree>
+    <p:extLst>
+      <p:ext uri="{BB962C8B-B14F-4D97-AF65-F5344CB8AC3E}">
+        <p14:creationId xmlns:p14="http://schemas.microsoft.com/office/powerpoint/2010/main" val="3350222108"/>
+      </p:ext>
+    </p:extLst>
+  </p:cSld>
+  <p:clrMapOvr>
+    <a:masterClrMapping/>
+  </p:clrMapOvr>
+</p:sld>
+</file>
+
+<file path=ppt/slides/slide17.xml><?xml version="1.0" encoding="utf-8"?>
+<p:sld xmlns:a="http://schemas.openxmlformats.org/drawingml/2006/main" xmlns:r="http://schemas.openxmlformats.org/officeDocument/2006/relationships" xmlns:p="http://schemas.openxmlformats.org/presentationml/2006/main">
+  <p:cSld>
+    <p:spTree>
+      <p:nvGrpSpPr>
+        <p:cNvPr id="1" name=""/>
+        <p:cNvGrpSpPr/>
+        <p:nvPr/>
+      </p:nvGrpSpPr>
+      <p:grpSpPr>
+        <a:xfrm>
+          <a:off x="0" y="0"/>
+          <a:ext cx="0" cy="0"/>
+          <a:chOff x="0" y="0"/>
+          <a:chExt cx="0" cy="0"/>
+        </a:xfrm>
+      </p:grpSpPr>
+      <p:sp>
+        <p:nvSpPr>
+          <p:cNvPr id="2" name="Title 1">
+            <a:extLst>
+              <a:ext uri="{FF2B5EF4-FFF2-40B4-BE49-F238E27FC236}">
                 <a16:creationId xmlns:a16="http://schemas.microsoft.com/office/drawing/2014/main" id="{EA7180C1-6B04-1F4C-A1F2-9CF23B6ED9A7}"/>
               </a:ext>
             </a:extLst>
@@ -6826,7 +9212,7 @@
 </p:sld>
 </file>
 
-<file path=ppt/slides/slide17.xml><?xml version="1.0" encoding="utf-8"?>
+<file path=ppt/slides/slide18.xml><?xml version="1.0" encoding="utf-8"?>
 <p:sld xmlns:a="http://schemas.openxmlformats.org/drawingml/2006/main" xmlns:r="http://schemas.openxmlformats.org/officeDocument/2006/relationships" xmlns:p="http://schemas.openxmlformats.org/presentationml/2006/main">
   <p:cSld>
     <p:spTree>
@@ -6983,7 +9369,7 @@
 </p:sld>
 </file>
 
-<file path=ppt/slides/slide18.xml><?xml version="1.0" encoding="utf-8"?>
+<file path=ppt/slides/slide19.xml><?xml version="1.0" encoding="utf-8"?>
 <p:sld xmlns:a="http://schemas.openxmlformats.org/drawingml/2006/main" xmlns:r="http://schemas.openxmlformats.org/officeDocument/2006/relationships" xmlns:p="http://schemas.openxmlformats.org/presentationml/2006/main">
   <p:cSld>
     <p:spTree>
@@ -8761,112 +11147,6 @@
     <p:extLst>
       <p:ext uri="{BB962C8B-B14F-4D97-AF65-F5344CB8AC3E}">
         <p14:creationId xmlns:p14="http://schemas.microsoft.com/office/powerpoint/2010/main" val="3150354050"/>
-      </p:ext>
-    </p:extLst>
-  </p:cSld>
-  <p:clrMapOvr>
-    <a:masterClrMapping/>
-  </p:clrMapOvr>
-</p:sld>
-</file>
-
-<file path=ppt/slides/slide19.xml><?xml version="1.0" encoding="utf-8"?>
-<p:sld xmlns:a="http://schemas.openxmlformats.org/drawingml/2006/main" xmlns:r="http://schemas.openxmlformats.org/officeDocument/2006/relationships" xmlns:p="http://schemas.openxmlformats.org/presentationml/2006/main">
-  <p:cSld>
-    <p:spTree>
-      <p:nvGrpSpPr>
-        <p:cNvPr id="1" name=""/>
-        <p:cNvGrpSpPr/>
-        <p:nvPr/>
-      </p:nvGrpSpPr>
-      <p:grpSpPr>
-        <a:xfrm>
-          <a:off x="0" y="0"/>
-          <a:ext cx="0" cy="0"/>
-          <a:chOff x="0" y="0"/>
-          <a:chExt cx="0" cy="0"/>
-        </a:xfrm>
-      </p:grpSpPr>
-      <p:sp>
-        <p:nvSpPr>
-          <p:cNvPr id="2" name="Title 1">
-            <a:extLst>
-              <a:ext uri="{FF2B5EF4-FFF2-40B4-BE49-F238E27FC236}">
-                <a16:creationId xmlns:a16="http://schemas.microsoft.com/office/drawing/2014/main" id="{6683D628-700C-5940-A6C0-A85344D7B3CD}"/>
-              </a:ext>
-            </a:extLst>
-          </p:cNvPr>
-          <p:cNvSpPr>
-            <a:spLocks noGrp="1"/>
-          </p:cNvSpPr>
-          <p:nvPr>
-            <p:ph type="title"/>
-          </p:nvPr>
-        </p:nvSpPr>
-        <p:spPr/>
-        <p:txBody>
-          <a:bodyPr/>
-          <a:lstStyle/>
-          <a:p>
-            <a:r>
-              <a:rPr lang="en-US" dirty="0"/>
-              <a:t>Other Random AGREE Things</a:t>
-            </a:r>
-          </a:p>
-        </p:txBody>
-      </p:sp>
-      <p:sp>
-        <p:nvSpPr>
-          <p:cNvPr id="3" name="Content Placeholder 2">
-            <a:extLst>
-              <a:ext uri="{FF2B5EF4-FFF2-40B4-BE49-F238E27FC236}">
-                <a16:creationId xmlns:a16="http://schemas.microsoft.com/office/drawing/2014/main" id="{2CED71DB-51FF-B243-B5CC-7FB78A424B61}"/>
-              </a:ext>
-            </a:extLst>
-          </p:cNvPr>
-          <p:cNvSpPr>
-            <a:spLocks noGrp="1"/>
-          </p:cNvSpPr>
-          <p:nvPr>
-            <p:ph idx="1"/>
-          </p:nvPr>
-        </p:nvSpPr>
-        <p:spPr/>
-        <p:txBody>
-          <a:bodyPr/>
-          <a:lstStyle/>
-          <a:p>
-            <a:r>
-              <a:rPr lang="en-US" dirty="0"/>
-              <a:t>Contracts have a global namespace</a:t>
-            </a:r>
-          </a:p>
-          <a:p>
-            <a:r>
-              <a:rPr lang="en-US" dirty="0"/>
-              <a:t>Can be solved with naming convention: </a:t>
-            </a:r>
-            <a:r>
-              <a:rPr lang="en-US" dirty="0" err="1"/>
-              <a:t>pkg_component</a:t>
-            </a:r>
-            <a:r>
-              <a:rPr lang="en-US" dirty="0"/>
-              <a:t>_*</a:t>
-            </a:r>
-          </a:p>
-          <a:p>
-            <a:r>
-              <a:rPr lang="en-US" dirty="0"/>
-              <a:t>AADL scoping would be nice though…</a:t>
-            </a:r>
-          </a:p>
-        </p:txBody>
-      </p:sp>
-    </p:spTree>
-    <p:extLst>
-      <p:ext uri="{BB962C8B-B14F-4D97-AF65-F5344CB8AC3E}">
-        <p14:creationId xmlns:p14="http://schemas.microsoft.com/office/powerpoint/2010/main" val="327252466"/>
       </p:ext>
     </p:extLst>
   </p:cSld>
@@ -8963,6 +11243,112 @@
     <p:extLst>
       <p:ext uri="{BB962C8B-B14F-4D97-AF65-F5344CB8AC3E}">
         <p14:creationId xmlns:p14="http://schemas.microsoft.com/office/powerpoint/2010/main" val="1445813240"/>
+      </p:ext>
+    </p:extLst>
+  </p:cSld>
+  <p:clrMapOvr>
+    <a:masterClrMapping/>
+  </p:clrMapOvr>
+</p:sld>
+</file>
+
+<file path=ppt/slides/slide20.xml><?xml version="1.0" encoding="utf-8"?>
+<p:sld xmlns:a="http://schemas.openxmlformats.org/drawingml/2006/main" xmlns:r="http://schemas.openxmlformats.org/officeDocument/2006/relationships" xmlns:p="http://schemas.openxmlformats.org/presentationml/2006/main">
+  <p:cSld>
+    <p:spTree>
+      <p:nvGrpSpPr>
+        <p:cNvPr id="1" name=""/>
+        <p:cNvGrpSpPr/>
+        <p:nvPr/>
+      </p:nvGrpSpPr>
+      <p:grpSpPr>
+        <a:xfrm>
+          <a:off x="0" y="0"/>
+          <a:ext cx="0" cy="0"/>
+          <a:chOff x="0" y="0"/>
+          <a:chExt cx="0" cy="0"/>
+        </a:xfrm>
+      </p:grpSpPr>
+      <p:sp>
+        <p:nvSpPr>
+          <p:cNvPr id="2" name="Title 1">
+            <a:extLst>
+              <a:ext uri="{FF2B5EF4-FFF2-40B4-BE49-F238E27FC236}">
+                <a16:creationId xmlns:a16="http://schemas.microsoft.com/office/drawing/2014/main" id="{6683D628-700C-5940-A6C0-A85344D7B3CD}"/>
+              </a:ext>
+            </a:extLst>
+          </p:cNvPr>
+          <p:cNvSpPr>
+            <a:spLocks noGrp="1"/>
+          </p:cNvSpPr>
+          <p:nvPr>
+            <p:ph type="title"/>
+          </p:nvPr>
+        </p:nvSpPr>
+        <p:spPr/>
+        <p:txBody>
+          <a:bodyPr/>
+          <a:lstStyle/>
+          <a:p>
+            <a:r>
+              <a:rPr lang="en-US" dirty="0"/>
+              <a:t>Other Random AGREE Things</a:t>
+            </a:r>
+          </a:p>
+        </p:txBody>
+      </p:sp>
+      <p:sp>
+        <p:nvSpPr>
+          <p:cNvPr id="3" name="Content Placeholder 2">
+            <a:extLst>
+              <a:ext uri="{FF2B5EF4-FFF2-40B4-BE49-F238E27FC236}">
+                <a16:creationId xmlns:a16="http://schemas.microsoft.com/office/drawing/2014/main" id="{2CED71DB-51FF-B243-B5CC-7FB78A424B61}"/>
+              </a:ext>
+            </a:extLst>
+          </p:cNvPr>
+          <p:cNvSpPr>
+            <a:spLocks noGrp="1"/>
+          </p:cNvSpPr>
+          <p:nvPr>
+            <p:ph idx="1"/>
+          </p:nvPr>
+        </p:nvSpPr>
+        <p:spPr/>
+        <p:txBody>
+          <a:bodyPr/>
+          <a:lstStyle/>
+          <a:p>
+            <a:r>
+              <a:rPr lang="en-US" dirty="0"/>
+              <a:t>Contracts have a global namespace</a:t>
+            </a:r>
+          </a:p>
+          <a:p>
+            <a:r>
+              <a:rPr lang="en-US" dirty="0"/>
+              <a:t>Can be solved with naming convention: </a:t>
+            </a:r>
+            <a:r>
+              <a:rPr lang="en-US" dirty="0" err="1"/>
+              <a:t>pkg_component</a:t>
+            </a:r>
+            <a:r>
+              <a:rPr lang="en-US" dirty="0"/>
+              <a:t>_*</a:t>
+            </a:r>
+          </a:p>
+          <a:p>
+            <a:r>
+              <a:rPr lang="en-US" dirty="0"/>
+              <a:t>AADL scoping would be nice though…</a:t>
+            </a:r>
+          </a:p>
+        </p:txBody>
+      </p:sp>
+    </p:spTree>
+    <p:extLst>
+      <p:ext uri="{BB962C8B-B14F-4D97-AF65-F5344CB8AC3E}">
+        <p14:creationId xmlns:p14="http://schemas.microsoft.com/office/powerpoint/2010/main" val="327252466"/>
       </p:ext>
     </p:extLst>
   </p:cSld>

</xml_diff>